<commit_message>
Add UML to Presentation
</commit_message>
<xml_diff>
--- a/MCTV Limited.pptx
+++ b/MCTV Limited.pptx
@@ -250,7 +250,7 @@
           <a:p>
             <a:fld id="{D42128AE-EDC0-49A1-B42D-4FCD81EA54AB}" type="datetimeFigureOut">
               <a:rPr lang="en-US" smtClean="0"/>
-              <a:t>4/10/2017</a:t>
+              <a:t>4/13/2017</a:t>
             </a:fld>
             <a:endParaRPr lang="en-US"/>
           </a:p>
@@ -418,7 +418,7 @@
           <a:p>
             <a:fld id="{D42128AE-EDC0-49A1-B42D-4FCD81EA54AB}" type="datetimeFigureOut">
               <a:rPr lang="en-US" smtClean="0"/>
-              <a:t>4/10/2017</a:t>
+              <a:t>4/13/2017</a:t>
             </a:fld>
             <a:endParaRPr lang="en-US"/>
           </a:p>
@@ -596,7 +596,7 @@
           <a:p>
             <a:fld id="{D42128AE-EDC0-49A1-B42D-4FCD81EA54AB}" type="datetimeFigureOut">
               <a:rPr lang="en-US" smtClean="0"/>
-              <a:t>4/10/2017</a:t>
+              <a:t>4/13/2017</a:t>
             </a:fld>
             <a:endParaRPr lang="en-US"/>
           </a:p>
@@ -764,7 +764,7 @@
           <a:p>
             <a:fld id="{D42128AE-EDC0-49A1-B42D-4FCD81EA54AB}" type="datetimeFigureOut">
               <a:rPr lang="en-US" smtClean="0"/>
-              <a:t>4/10/2017</a:t>
+              <a:t>4/13/2017</a:t>
             </a:fld>
             <a:endParaRPr lang="en-US"/>
           </a:p>
@@ -1009,7 +1009,7 @@
           <a:p>
             <a:fld id="{D42128AE-EDC0-49A1-B42D-4FCD81EA54AB}" type="datetimeFigureOut">
               <a:rPr lang="en-US" smtClean="0"/>
-              <a:t>4/10/2017</a:t>
+              <a:t>4/13/2017</a:t>
             </a:fld>
             <a:endParaRPr lang="en-US"/>
           </a:p>
@@ -1238,7 +1238,7 @@
           <a:p>
             <a:fld id="{D42128AE-EDC0-49A1-B42D-4FCD81EA54AB}" type="datetimeFigureOut">
               <a:rPr lang="en-US" smtClean="0"/>
-              <a:t>4/10/2017</a:t>
+              <a:t>4/13/2017</a:t>
             </a:fld>
             <a:endParaRPr lang="en-US"/>
           </a:p>
@@ -1602,7 +1602,7 @@
           <a:p>
             <a:fld id="{D42128AE-EDC0-49A1-B42D-4FCD81EA54AB}" type="datetimeFigureOut">
               <a:rPr lang="en-US" smtClean="0"/>
-              <a:t>4/10/2017</a:t>
+              <a:t>4/13/2017</a:t>
             </a:fld>
             <a:endParaRPr lang="en-US"/>
           </a:p>
@@ -1719,7 +1719,7 @@
           <a:p>
             <a:fld id="{D42128AE-EDC0-49A1-B42D-4FCD81EA54AB}" type="datetimeFigureOut">
               <a:rPr lang="en-US" smtClean="0"/>
-              <a:t>4/10/2017</a:t>
+              <a:t>4/13/2017</a:t>
             </a:fld>
             <a:endParaRPr lang="en-US"/>
           </a:p>
@@ -1814,7 +1814,7 @@
           <a:p>
             <a:fld id="{D42128AE-EDC0-49A1-B42D-4FCD81EA54AB}" type="datetimeFigureOut">
               <a:rPr lang="en-US" smtClean="0"/>
-              <a:t>4/10/2017</a:t>
+              <a:t>4/13/2017</a:t>
             </a:fld>
             <a:endParaRPr lang="en-US"/>
           </a:p>
@@ -2089,7 +2089,7 @@
           <a:p>
             <a:fld id="{D42128AE-EDC0-49A1-B42D-4FCD81EA54AB}" type="datetimeFigureOut">
               <a:rPr lang="en-US" smtClean="0"/>
-              <a:t>4/10/2017</a:t>
+              <a:t>4/13/2017</a:t>
             </a:fld>
             <a:endParaRPr lang="en-US"/>
           </a:p>
@@ -2341,7 +2341,7 @@
           <a:p>
             <a:fld id="{D42128AE-EDC0-49A1-B42D-4FCD81EA54AB}" type="datetimeFigureOut">
               <a:rPr lang="en-US" smtClean="0"/>
-              <a:t>4/10/2017</a:t>
+              <a:t>4/13/2017</a:t>
             </a:fld>
             <a:endParaRPr lang="en-US"/>
           </a:p>
@@ -2552,7 +2552,7 @@
           <a:p>
             <a:fld id="{D42128AE-EDC0-49A1-B42D-4FCD81EA54AB}" type="datetimeFigureOut">
               <a:rPr lang="en-US" smtClean="0"/>
-              <a:t>4/10/2017</a:t>
+              <a:t>4/13/2017</a:t>
             </a:fld>
             <a:endParaRPr lang="en-US"/>
           </a:p>
@@ -4144,7 +4144,43 @@
           <a:bodyPr/>
           <a:lstStyle/>
           <a:p>
-            <a:endParaRPr lang="en-US"/>
+            <a:r>
+              <a:rPr lang="en-US" dirty="0"/>
+              <a:t>Customers Table</a:t>
+            </a:r>
+          </a:p>
+          <a:p>
+            <a:r>
+              <a:rPr lang="en-US" dirty="0"/>
+              <a:t>Employees Table</a:t>
+            </a:r>
+          </a:p>
+          <a:p>
+            <a:r>
+              <a:rPr lang="en-US" dirty="0"/>
+              <a:t>Product Table</a:t>
+            </a:r>
+          </a:p>
+          <a:p>
+            <a:r>
+              <a:rPr lang="en-US" dirty="0"/>
+              <a:t>Suggestion Table</a:t>
+            </a:r>
+          </a:p>
+          <a:p>
+            <a:r>
+              <a:rPr lang="en-US" dirty="0"/>
+              <a:t>Suppliers Table</a:t>
+            </a:r>
+          </a:p>
+          <a:p>
+            <a:r>
+              <a:rPr lang="en-US" dirty="0"/>
+              <a:t>Navigation Form</a:t>
+            </a:r>
+          </a:p>
+          <a:p>
+            <a:endParaRPr lang="en-US" dirty="0"/>
           </a:p>
         </p:txBody>
       </p:sp>

</xml_diff>

<commit_message>
added Gantt chart to presentation
</commit_message>
<xml_diff>
--- a/MCTV Limited.pptx
+++ b/MCTV Limited.pptx
@@ -9,12 +9,16 @@
     <p:sldId id="257" r:id="rId3"/>
     <p:sldId id="258" r:id="rId4"/>
     <p:sldId id="259" r:id="rId5"/>
-    <p:sldId id="260" r:id="rId6"/>
-    <p:sldId id="261" r:id="rId7"/>
-    <p:sldId id="262" r:id="rId8"/>
-    <p:sldId id="263" r:id="rId9"/>
-    <p:sldId id="264" r:id="rId10"/>
-    <p:sldId id="265" r:id="rId11"/>
+    <p:sldId id="266" r:id="rId6"/>
+    <p:sldId id="267" r:id="rId7"/>
+    <p:sldId id="268" r:id="rId8"/>
+    <p:sldId id="260" r:id="rId9"/>
+    <p:sldId id="261" r:id="rId10"/>
+    <p:sldId id="262" r:id="rId11"/>
+    <p:sldId id="269" r:id="rId12"/>
+    <p:sldId id="263" r:id="rId13"/>
+    <p:sldId id="264" r:id="rId14"/>
+    <p:sldId id="265" r:id="rId15"/>
   </p:sldIdLst>
   <p:sldSz cx="12192000" cy="6858000"/>
   <p:notesSz cx="6858000" cy="9144000"/>
@@ -250,7 +254,7 @@
           <a:p>
             <a:fld id="{D42128AE-EDC0-49A1-B42D-4FCD81EA54AB}" type="datetimeFigureOut">
               <a:rPr lang="en-US" smtClean="0"/>
-              <a:t>4/13/2017</a:t>
+              <a:t>4/16/2017</a:t>
             </a:fld>
             <a:endParaRPr lang="en-US"/>
           </a:p>
@@ -418,7 +422,7 @@
           <a:p>
             <a:fld id="{D42128AE-EDC0-49A1-B42D-4FCD81EA54AB}" type="datetimeFigureOut">
               <a:rPr lang="en-US" smtClean="0"/>
-              <a:t>4/13/2017</a:t>
+              <a:t>4/16/2017</a:t>
             </a:fld>
             <a:endParaRPr lang="en-US"/>
           </a:p>
@@ -596,7 +600,7 @@
           <a:p>
             <a:fld id="{D42128AE-EDC0-49A1-B42D-4FCD81EA54AB}" type="datetimeFigureOut">
               <a:rPr lang="en-US" smtClean="0"/>
-              <a:t>4/13/2017</a:t>
+              <a:t>4/16/2017</a:t>
             </a:fld>
             <a:endParaRPr lang="en-US"/>
           </a:p>
@@ -764,7 +768,7 @@
           <a:p>
             <a:fld id="{D42128AE-EDC0-49A1-B42D-4FCD81EA54AB}" type="datetimeFigureOut">
               <a:rPr lang="en-US" smtClean="0"/>
-              <a:t>4/13/2017</a:t>
+              <a:t>4/16/2017</a:t>
             </a:fld>
             <a:endParaRPr lang="en-US"/>
           </a:p>
@@ -1009,7 +1013,7 @@
           <a:p>
             <a:fld id="{D42128AE-EDC0-49A1-B42D-4FCD81EA54AB}" type="datetimeFigureOut">
               <a:rPr lang="en-US" smtClean="0"/>
-              <a:t>4/13/2017</a:t>
+              <a:t>4/16/2017</a:t>
             </a:fld>
             <a:endParaRPr lang="en-US"/>
           </a:p>
@@ -1238,7 +1242,7 @@
           <a:p>
             <a:fld id="{D42128AE-EDC0-49A1-B42D-4FCD81EA54AB}" type="datetimeFigureOut">
               <a:rPr lang="en-US" smtClean="0"/>
-              <a:t>4/13/2017</a:t>
+              <a:t>4/16/2017</a:t>
             </a:fld>
             <a:endParaRPr lang="en-US"/>
           </a:p>
@@ -1602,7 +1606,7 @@
           <a:p>
             <a:fld id="{D42128AE-EDC0-49A1-B42D-4FCD81EA54AB}" type="datetimeFigureOut">
               <a:rPr lang="en-US" smtClean="0"/>
-              <a:t>4/13/2017</a:t>
+              <a:t>4/16/2017</a:t>
             </a:fld>
             <a:endParaRPr lang="en-US"/>
           </a:p>
@@ -1719,7 +1723,7 @@
           <a:p>
             <a:fld id="{D42128AE-EDC0-49A1-B42D-4FCD81EA54AB}" type="datetimeFigureOut">
               <a:rPr lang="en-US" smtClean="0"/>
-              <a:t>4/13/2017</a:t>
+              <a:t>4/16/2017</a:t>
             </a:fld>
             <a:endParaRPr lang="en-US"/>
           </a:p>
@@ -1814,7 +1818,7 @@
           <a:p>
             <a:fld id="{D42128AE-EDC0-49A1-B42D-4FCD81EA54AB}" type="datetimeFigureOut">
               <a:rPr lang="en-US" smtClean="0"/>
-              <a:t>4/13/2017</a:t>
+              <a:t>4/16/2017</a:t>
             </a:fld>
             <a:endParaRPr lang="en-US"/>
           </a:p>
@@ -2089,7 +2093,7 @@
           <a:p>
             <a:fld id="{D42128AE-EDC0-49A1-B42D-4FCD81EA54AB}" type="datetimeFigureOut">
               <a:rPr lang="en-US" smtClean="0"/>
-              <a:t>4/13/2017</a:t>
+              <a:t>4/16/2017</a:t>
             </a:fld>
             <a:endParaRPr lang="en-US"/>
           </a:p>
@@ -2341,7 +2345,7 @@
           <a:p>
             <a:fld id="{D42128AE-EDC0-49A1-B42D-4FCD81EA54AB}" type="datetimeFigureOut">
               <a:rPr lang="en-US" smtClean="0"/>
-              <a:t>4/13/2017</a:t>
+              <a:t>4/16/2017</a:t>
             </a:fld>
             <a:endParaRPr lang="en-US"/>
           </a:p>
@@ -2552,7 +2556,7 @@
           <a:p>
             <a:fld id="{D42128AE-EDC0-49A1-B42D-4FCD81EA54AB}" type="datetimeFigureOut">
               <a:rPr lang="en-US" smtClean="0"/>
-              <a:t>4/13/2017</a:t>
+              <a:t>4/16/2017</a:t>
             </a:fld>
             <a:endParaRPr lang="en-US"/>
           </a:p>
@@ -3367,6 +3371,446 @@
           <a:lstStyle/>
           <a:p>
             <a:r>
+              <a:rPr lang="en-GB" dirty="0"/>
+              <a:t>UML chart</a:t>
+            </a:r>
+            <a:endParaRPr lang="en-US" dirty="0"/>
+          </a:p>
+        </p:txBody>
+      </p:sp>
+      <p:sp>
+        <p:nvSpPr>
+          <p:cNvPr id="3" name="Content Placeholder 2"/>
+          <p:cNvSpPr>
+            <a:spLocks noGrp="1"/>
+          </p:cNvSpPr>
+          <p:nvPr>
+            <p:ph idx="1"/>
+          </p:nvPr>
+        </p:nvSpPr>
+        <p:spPr/>
+        <p:txBody>
+          <a:bodyPr/>
+          <a:lstStyle/>
+          <a:p>
+            <a:r>
+              <a:rPr lang="en-US" dirty="0"/>
+              <a:t>Customers Table</a:t>
+            </a:r>
+          </a:p>
+          <a:p>
+            <a:r>
+              <a:rPr lang="en-US" dirty="0"/>
+              <a:t>Employees Table</a:t>
+            </a:r>
+          </a:p>
+          <a:p>
+            <a:r>
+              <a:rPr lang="en-US" dirty="0"/>
+              <a:t>Products Table</a:t>
+            </a:r>
+          </a:p>
+          <a:p>
+            <a:r>
+              <a:rPr lang="en-US" dirty="0"/>
+              <a:t>Suggestions Table</a:t>
+            </a:r>
+          </a:p>
+          <a:p>
+            <a:r>
+              <a:rPr lang="en-US" dirty="0"/>
+              <a:t>Suppliers Table</a:t>
+            </a:r>
+          </a:p>
+          <a:p>
+            <a:r>
+              <a:rPr lang="en-US" dirty="0"/>
+              <a:t>Navigation Form</a:t>
+            </a:r>
+          </a:p>
+          <a:p>
+            <a:endParaRPr lang="en-US" dirty="0"/>
+          </a:p>
+        </p:txBody>
+      </p:sp>
+      <p:sp>
+        <p:nvSpPr>
+          <p:cNvPr id="4" name="TextBox 3"/>
+          <p:cNvSpPr txBox="1"/>
+          <p:nvPr/>
+        </p:nvSpPr>
+        <p:spPr>
+          <a:xfrm>
+            <a:off x="10323443" y="658574"/>
+            <a:ext cx="861392" cy="369332"/>
+          </a:xfrm>
+          <a:prstGeom prst="rect">
+            <a:avLst/>
+          </a:prstGeom>
+          <a:noFill/>
+        </p:spPr>
+        <p:txBody>
+          <a:bodyPr wrap="square" rtlCol="0">
+            <a:spAutoFit/>
+          </a:bodyPr>
+          <a:lstStyle/>
+          <a:p>
+            <a:r>
+              <a:rPr lang="en-GB" dirty="0"/>
+              <a:t>Grigor</a:t>
+            </a:r>
+          </a:p>
+        </p:txBody>
+      </p:sp>
+    </p:spTree>
+    <p:extLst>
+      <p:ext uri="{BB962C8B-B14F-4D97-AF65-F5344CB8AC3E}">
+        <p14:creationId xmlns:p14="http://schemas.microsoft.com/office/powerpoint/2010/main" val="1248061747"/>
+      </p:ext>
+    </p:extLst>
+  </p:cSld>
+  <p:clrMapOvr>
+    <a:masterClrMapping/>
+  </p:clrMapOvr>
+</p:sld>
+</file>
+
+<file path=ppt/slides/slide11.xml><?xml version="1.0" encoding="utf-8"?>
+<p:sld xmlns:a="http://schemas.openxmlformats.org/drawingml/2006/main" xmlns:r="http://schemas.openxmlformats.org/officeDocument/2006/relationships" xmlns:p="http://schemas.openxmlformats.org/presentationml/2006/main">
+  <p:cSld>
+    <p:spTree>
+      <p:nvGrpSpPr>
+        <p:cNvPr id="1" name=""/>
+        <p:cNvGrpSpPr/>
+        <p:nvPr/>
+      </p:nvGrpSpPr>
+      <p:grpSpPr>
+        <a:xfrm>
+          <a:off x="0" y="0"/>
+          <a:ext cx="0" cy="0"/>
+          <a:chOff x="0" y="0"/>
+          <a:chExt cx="0" cy="0"/>
+        </a:xfrm>
+      </p:grpSpPr>
+      <p:sp>
+        <p:nvSpPr>
+          <p:cNvPr id="2" name="Title 1"/>
+          <p:cNvSpPr>
+            <a:spLocks noGrp="1"/>
+          </p:cNvSpPr>
+          <p:nvPr>
+            <p:ph type="title"/>
+          </p:nvPr>
+        </p:nvSpPr>
+        <p:spPr/>
+        <p:txBody>
+          <a:bodyPr/>
+          <a:lstStyle/>
+          <a:p>
+            <a:r>
+              <a:rPr lang="en-GB" dirty="0"/>
+              <a:t>UML Chart</a:t>
+            </a:r>
+          </a:p>
+        </p:txBody>
+      </p:sp>
+      <p:sp>
+        <p:nvSpPr>
+          <p:cNvPr id="3" name="Content Placeholder 2"/>
+          <p:cNvSpPr>
+            <a:spLocks noGrp="1"/>
+          </p:cNvSpPr>
+          <p:nvPr>
+            <p:ph idx="1"/>
+          </p:nvPr>
+        </p:nvSpPr>
+        <p:spPr/>
+        <p:txBody>
+          <a:bodyPr/>
+          <a:lstStyle/>
+          <a:p>
+            <a:endParaRPr lang="en-GB" dirty="0"/>
+          </a:p>
+        </p:txBody>
+      </p:sp>
+    </p:spTree>
+    <p:extLst>
+      <p:ext uri="{BB962C8B-B14F-4D97-AF65-F5344CB8AC3E}">
+        <p14:creationId xmlns:p14="http://schemas.microsoft.com/office/powerpoint/2010/main" val="2232451369"/>
+      </p:ext>
+    </p:extLst>
+  </p:cSld>
+  <p:clrMapOvr>
+    <a:masterClrMapping/>
+  </p:clrMapOvr>
+</p:sld>
+</file>
+
+<file path=ppt/slides/slide12.xml><?xml version="1.0" encoding="utf-8"?>
+<p:sld xmlns:a="http://schemas.openxmlformats.org/drawingml/2006/main" xmlns:r="http://schemas.openxmlformats.org/officeDocument/2006/relationships" xmlns:p="http://schemas.openxmlformats.org/presentationml/2006/main">
+  <p:cSld>
+    <p:spTree>
+      <p:nvGrpSpPr>
+        <p:cNvPr id="1" name=""/>
+        <p:cNvGrpSpPr/>
+        <p:nvPr/>
+      </p:nvGrpSpPr>
+      <p:grpSpPr>
+        <a:xfrm>
+          <a:off x="0" y="0"/>
+          <a:ext cx="0" cy="0"/>
+          <a:chOff x="0" y="0"/>
+          <a:chExt cx="0" cy="0"/>
+        </a:xfrm>
+      </p:grpSpPr>
+      <p:sp>
+        <p:nvSpPr>
+          <p:cNvPr id="2" name="Title 1"/>
+          <p:cNvSpPr>
+            <a:spLocks noGrp="1"/>
+          </p:cNvSpPr>
+          <p:nvPr>
+            <p:ph type="title"/>
+          </p:nvPr>
+        </p:nvSpPr>
+        <p:spPr/>
+        <p:txBody>
+          <a:bodyPr/>
+          <a:lstStyle/>
+          <a:p>
+            <a:r>
+              <a:rPr lang="en-GB" dirty="0"/>
+              <a:t>Website</a:t>
+            </a:r>
+            <a:endParaRPr lang="en-US" dirty="0"/>
+          </a:p>
+        </p:txBody>
+      </p:sp>
+      <p:sp>
+        <p:nvSpPr>
+          <p:cNvPr id="3" name="Content Placeholder 2"/>
+          <p:cNvSpPr>
+            <a:spLocks noGrp="1"/>
+          </p:cNvSpPr>
+          <p:nvPr>
+            <p:ph idx="1"/>
+          </p:nvPr>
+        </p:nvSpPr>
+        <p:spPr/>
+        <p:txBody>
+          <a:bodyPr/>
+          <a:lstStyle/>
+          <a:p>
+            <a:r>
+              <a:rPr lang="en-US" dirty="0"/>
+              <a:t>Here we will present to you the MCTV Limited Website </a:t>
+            </a:r>
+          </a:p>
+          <a:p>
+            <a:r>
+              <a:rPr lang="en-US" dirty="0"/>
+              <a:t>Which will feature a Home page and 4 individual pages about the workers in the shop </a:t>
+            </a:r>
+          </a:p>
+        </p:txBody>
+      </p:sp>
+      <p:sp>
+        <p:nvSpPr>
+          <p:cNvPr id="4" name="TextBox 3"/>
+          <p:cNvSpPr txBox="1"/>
+          <p:nvPr/>
+        </p:nvSpPr>
+        <p:spPr>
+          <a:xfrm>
+            <a:off x="10230678" y="658574"/>
+            <a:ext cx="954156" cy="369332"/>
+          </a:xfrm>
+          <a:prstGeom prst="rect">
+            <a:avLst/>
+          </a:prstGeom>
+          <a:noFill/>
+        </p:spPr>
+        <p:txBody>
+          <a:bodyPr wrap="square" rtlCol="0">
+            <a:spAutoFit/>
+          </a:bodyPr>
+          <a:lstStyle/>
+          <a:p>
+            <a:r>
+              <a:rPr lang="en-GB" dirty="0"/>
+              <a:t>Antonio</a:t>
+            </a:r>
+          </a:p>
+        </p:txBody>
+      </p:sp>
+    </p:spTree>
+    <p:extLst>
+      <p:ext uri="{BB962C8B-B14F-4D97-AF65-F5344CB8AC3E}">
+        <p14:creationId xmlns:p14="http://schemas.microsoft.com/office/powerpoint/2010/main" val="3123563747"/>
+      </p:ext>
+    </p:extLst>
+  </p:cSld>
+  <p:clrMapOvr>
+    <a:masterClrMapping/>
+  </p:clrMapOvr>
+</p:sld>
+</file>
+
+<file path=ppt/slides/slide13.xml><?xml version="1.0" encoding="utf-8"?>
+<p:sld xmlns:a="http://schemas.openxmlformats.org/drawingml/2006/main" xmlns:r="http://schemas.openxmlformats.org/officeDocument/2006/relationships" xmlns:p="http://schemas.openxmlformats.org/presentationml/2006/main">
+  <p:cSld>
+    <p:spTree>
+      <p:nvGrpSpPr>
+        <p:cNvPr id="1" name=""/>
+        <p:cNvGrpSpPr/>
+        <p:nvPr/>
+      </p:nvGrpSpPr>
+      <p:grpSpPr>
+        <a:xfrm>
+          <a:off x="0" y="0"/>
+          <a:ext cx="0" cy="0"/>
+          <a:chOff x="0" y="0"/>
+          <a:chExt cx="0" cy="0"/>
+        </a:xfrm>
+      </p:grpSpPr>
+      <p:sp>
+        <p:nvSpPr>
+          <p:cNvPr id="2" name="Title 1"/>
+          <p:cNvSpPr>
+            <a:spLocks noGrp="1"/>
+          </p:cNvSpPr>
+          <p:nvPr>
+            <p:ph type="title"/>
+          </p:nvPr>
+        </p:nvSpPr>
+        <p:spPr/>
+        <p:txBody>
+          <a:bodyPr/>
+          <a:lstStyle/>
+          <a:p>
+            <a:r>
+              <a:rPr lang="en-GB" dirty="0"/>
+              <a:t>Conclusion</a:t>
+            </a:r>
+            <a:endParaRPr lang="en-US" dirty="0"/>
+          </a:p>
+        </p:txBody>
+      </p:sp>
+      <p:sp>
+        <p:nvSpPr>
+          <p:cNvPr id="3" name="Content Placeholder 2"/>
+          <p:cNvSpPr>
+            <a:spLocks noGrp="1"/>
+          </p:cNvSpPr>
+          <p:nvPr>
+            <p:ph idx="1"/>
+          </p:nvPr>
+        </p:nvSpPr>
+        <p:spPr/>
+        <p:txBody>
+          <a:bodyPr/>
+          <a:lstStyle/>
+          <a:p>
+            <a:r>
+              <a:rPr lang="en-US" dirty="0"/>
+              <a:t>MCTV Limited will continue to grow as a company in future </a:t>
+            </a:r>
+          </a:p>
+          <a:p>
+            <a:r>
+              <a:rPr lang="en-US" dirty="0"/>
+              <a:t>We hope that as the company moves to the cloud it will become more efficient. </a:t>
+            </a:r>
+          </a:p>
+          <a:p>
+            <a:r>
+              <a:rPr lang="en-US" dirty="0"/>
+              <a:t>As cloud technology improves further into the future we hope that MCTV limited will follow and become a larger and better company. </a:t>
+            </a:r>
+          </a:p>
+          <a:p>
+            <a:endParaRPr lang="en-US" dirty="0"/>
+          </a:p>
+          <a:p>
+            <a:endParaRPr lang="en-US" dirty="0"/>
+          </a:p>
+        </p:txBody>
+      </p:sp>
+      <p:sp>
+        <p:nvSpPr>
+          <p:cNvPr id="4" name="TextBox 3"/>
+          <p:cNvSpPr txBox="1"/>
+          <p:nvPr/>
+        </p:nvSpPr>
+        <p:spPr>
+          <a:xfrm>
+            <a:off x="10217426" y="658574"/>
+            <a:ext cx="940904" cy="369332"/>
+          </a:xfrm>
+          <a:prstGeom prst="rect">
+            <a:avLst/>
+          </a:prstGeom>
+          <a:noFill/>
+        </p:spPr>
+        <p:txBody>
+          <a:bodyPr wrap="square" rtlCol="0">
+            <a:spAutoFit/>
+          </a:bodyPr>
+          <a:lstStyle/>
+          <a:p>
+            <a:r>
+              <a:rPr lang="en-GB" dirty="0"/>
+              <a:t>Antonio</a:t>
+            </a:r>
+          </a:p>
+        </p:txBody>
+      </p:sp>
+    </p:spTree>
+    <p:extLst>
+      <p:ext uri="{BB962C8B-B14F-4D97-AF65-F5344CB8AC3E}">
+        <p14:creationId xmlns:p14="http://schemas.microsoft.com/office/powerpoint/2010/main" val="2325120104"/>
+      </p:ext>
+    </p:extLst>
+  </p:cSld>
+  <p:clrMapOvr>
+    <a:masterClrMapping/>
+  </p:clrMapOvr>
+</p:sld>
+</file>
+
+<file path=ppt/slides/slide14.xml><?xml version="1.0" encoding="utf-8"?>
+<p:sld xmlns:a="http://schemas.openxmlformats.org/drawingml/2006/main" xmlns:r="http://schemas.openxmlformats.org/officeDocument/2006/relationships" xmlns:p="http://schemas.openxmlformats.org/presentationml/2006/main">
+  <p:cSld>
+    <p:spTree>
+      <p:nvGrpSpPr>
+        <p:cNvPr id="1" name=""/>
+        <p:cNvGrpSpPr/>
+        <p:nvPr/>
+      </p:nvGrpSpPr>
+      <p:grpSpPr>
+        <a:xfrm>
+          <a:off x="0" y="0"/>
+          <a:ext cx="0" cy="0"/>
+          <a:chOff x="0" y="0"/>
+          <a:chExt cx="0" cy="0"/>
+        </a:xfrm>
+      </p:grpSpPr>
+      <p:sp>
+        <p:nvSpPr>
+          <p:cNvPr id="2" name="Title 1"/>
+          <p:cNvSpPr>
+            <a:spLocks noGrp="1"/>
+          </p:cNvSpPr>
+          <p:nvPr>
+            <p:ph type="title"/>
+          </p:nvPr>
+        </p:nvSpPr>
+        <p:spPr/>
+        <p:txBody>
+          <a:bodyPr/>
+          <a:lstStyle/>
+          <a:p>
+            <a:r>
               <a:rPr lang="en-GB"/>
               <a:t>Questions?</a:t>
             </a:r>
@@ -3814,6 +4258,21 @@
           <a:bodyPr/>
           <a:lstStyle/>
           <a:p>
+            <a:r>
+              <a:rPr lang="en-US" dirty="0"/>
+              <a:t>The Gannt charts shows the progression the group has made over the last few months and all the times it was updated</a:t>
+            </a:r>
+          </a:p>
+          <a:p>
+            <a:r>
+              <a:rPr lang="en-US" dirty="0"/>
+              <a:t>Microsoft Databases</a:t>
+            </a:r>
+          </a:p>
+          <a:p>
+            <a:endParaRPr lang="en-US" dirty="0"/>
+          </a:p>
+          <a:p>
             <a:endParaRPr lang="en-US" dirty="0"/>
           </a:p>
         </p:txBody>
@@ -3847,6 +4306,30 @@
           </a:p>
         </p:txBody>
       </p:sp>
+      <p:pic>
+        <p:nvPicPr>
+          <p:cNvPr id="5" name="Picture 4"/>
+          <p:cNvPicPr>
+            <a:picLocks noChangeAspect="1"/>
+          </p:cNvPicPr>
+          <p:nvPr/>
+        </p:nvPicPr>
+        <p:blipFill>
+          <a:blip r:embed="rId2"/>
+          <a:stretch>
+            <a:fillRect/>
+          </a:stretch>
+        </p:blipFill>
+        <p:spPr>
+          <a:xfrm>
+            <a:off x="918302" y="3233530"/>
+            <a:ext cx="10028583" cy="3419061"/>
+          </a:xfrm>
+          <a:prstGeom prst="rect">
+            <a:avLst/>
+          </a:prstGeom>
+        </p:spPr>
+      </p:pic>
     </p:spTree>
     <p:extLst>
       <p:ext uri="{BB962C8B-B14F-4D97-AF65-F5344CB8AC3E}">
@@ -3894,9 +4377,8 @@
           <a:p>
             <a:r>
               <a:rPr lang="en-GB" dirty="0"/>
-              <a:t>Individual Task</a:t>
-            </a:r>
-            <a:endParaRPr lang="en-US" dirty="0"/>
+              <a:t>Gantt Chart</a:t>
+            </a:r>
           </a:p>
         </p:txBody>
       </p:sp>
@@ -3916,69 +4398,43 @@
           <a:lstStyle/>
           <a:p>
             <a:r>
-              <a:rPr lang="en-US" dirty="0"/>
-              <a:t>Databases – Dylan Gilroy and Jack Gallaher </a:t>
-            </a:r>
-          </a:p>
-          <a:p>
-            <a:r>
-              <a:rPr lang="en-US" dirty="0"/>
-              <a:t>UML charts – Antonio Penna and Grigor Danut</a:t>
-            </a:r>
-          </a:p>
-          <a:p>
-            <a:r>
-              <a:rPr lang="en-US" dirty="0"/>
-              <a:t>WordPress – Antonio Penna and Grigor Danut</a:t>
-            </a:r>
-          </a:p>
-          <a:p>
-            <a:r>
-              <a:rPr lang="en-US" dirty="0"/>
-              <a:t>Trello – Jack Gallaher </a:t>
-            </a:r>
-          </a:p>
-          <a:p>
-            <a:r>
-              <a:rPr lang="en-US" dirty="0"/>
-              <a:t>Presentation – Antonio Penna, Grigor Daunt, Dylan Gilroy, Jack Gallaher.</a:t>
-            </a:r>
-          </a:p>
-        </p:txBody>
-      </p:sp>
-      <p:sp>
-        <p:nvSpPr>
-          <p:cNvPr id="4" name="TextBox 3"/>
-          <p:cNvSpPr txBox="1"/>
+              <a:rPr lang="en-GB" dirty="0"/>
+              <a:t>UML Charts</a:t>
+            </a:r>
+          </a:p>
+          <a:p>
+            <a:endParaRPr lang="en-GB" dirty="0"/>
+          </a:p>
+        </p:txBody>
+      </p:sp>
+      <p:pic>
+        <p:nvPicPr>
+          <p:cNvPr id="4" name="Picture 3"/>
+          <p:cNvPicPr>
+            <a:picLocks noChangeAspect="1"/>
+          </p:cNvPicPr>
           <p:nvPr/>
-        </p:nvSpPr>
+        </p:nvPicPr>
+        <p:blipFill>
+          <a:blip r:embed="rId2"/>
+          <a:stretch>
+            <a:fillRect/>
+          </a:stretch>
+        </p:blipFill>
         <p:spPr>
           <a:xfrm>
-            <a:off x="10323444" y="658574"/>
-            <a:ext cx="781878" cy="369332"/>
+            <a:off x="918302" y="2336075"/>
+            <a:ext cx="10804249" cy="3330437"/>
           </a:xfrm>
           <a:prstGeom prst="rect">
             <a:avLst/>
           </a:prstGeom>
-          <a:noFill/>
         </p:spPr>
-        <p:txBody>
-          <a:bodyPr wrap="square" rtlCol="0">
-            <a:spAutoFit/>
-          </a:bodyPr>
-          <a:lstStyle/>
-          <a:p>
-            <a:r>
-              <a:rPr lang="en-GB" dirty="0"/>
-              <a:t>Dylan</a:t>
-            </a:r>
-          </a:p>
-        </p:txBody>
-      </p:sp>
+      </p:pic>
     </p:spTree>
     <p:extLst>
       <p:ext uri="{BB962C8B-B14F-4D97-AF65-F5344CB8AC3E}">
-        <p14:creationId xmlns:p14="http://schemas.microsoft.com/office/powerpoint/2010/main" val="3738593189"/>
+        <p14:creationId xmlns:p14="http://schemas.microsoft.com/office/powerpoint/2010/main" val="1271204775"/>
       </p:ext>
     </p:extLst>
   </p:cSld>
@@ -4022,9 +4478,8 @@
           <a:p>
             <a:r>
               <a:rPr lang="en-GB" dirty="0"/>
-              <a:t>Databases</a:t>
-            </a:r>
-            <a:endParaRPr lang="en-US" dirty="0"/>
+              <a:t>Gantt Chart</a:t>
+            </a:r>
           </a:p>
         </p:txBody>
       </p:sp>
@@ -4043,43 +4498,44 @@
           <a:bodyPr/>
           <a:lstStyle/>
           <a:p>
-            <a:endParaRPr lang="en-US" dirty="0"/>
-          </a:p>
-        </p:txBody>
-      </p:sp>
-      <p:sp>
-        <p:nvSpPr>
-          <p:cNvPr id="4" name="TextBox 3"/>
-          <p:cNvSpPr txBox="1"/>
+            <a:r>
+              <a:rPr lang="en-GB" dirty="0"/>
+              <a:t>Presentation</a:t>
+            </a:r>
+          </a:p>
+          <a:p>
+            <a:endParaRPr lang="en-GB" dirty="0"/>
+          </a:p>
+        </p:txBody>
+      </p:sp>
+      <p:pic>
+        <p:nvPicPr>
+          <p:cNvPr id="5" name="Picture 4"/>
+          <p:cNvPicPr>
+            <a:picLocks noChangeAspect="1"/>
+          </p:cNvPicPr>
           <p:nvPr/>
-        </p:nvSpPr>
+        </p:nvPicPr>
+        <p:blipFill>
+          <a:blip r:embed="rId2"/>
+          <a:stretch>
+            <a:fillRect/>
+          </a:stretch>
+        </p:blipFill>
         <p:spPr>
           <a:xfrm>
-            <a:off x="10296939" y="658574"/>
-            <a:ext cx="821635" cy="369332"/>
+            <a:off x="918302" y="2457659"/>
+            <a:ext cx="9749698" cy="3598586"/>
           </a:xfrm>
           <a:prstGeom prst="rect">
             <a:avLst/>
           </a:prstGeom>
-          <a:noFill/>
         </p:spPr>
-        <p:txBody>
-          <a:bodyPr wrap="square" rtlCol="0">
-            <a:spAutoFit/>
-          </a:bodyPr>
-          <a:lstStyle/>
-          <a:p>
-            <a:r>
-              <a:rPr lang="en-GB" dirty="0"/>
-              <a:t>Grigor</a:t>
-            </a:r>
-          </a:p>
-        </p:txBody>
-      </p:sp>
+      </p:pic>
     </p:spTree>
     <p:extLst>
       <p:ext uri="{BB962C8B-B14F-4D97-AF65-F5344CB8AC3E}">
-        <p14:creationId xmlns:p14="http://schemas.microsoft.com/office/powerpoint/2010/main" val="1808812414"/>
+        <p14:creationId xmlns:p14="http://schemas.microsoft.com/office/powerpoint/2010/main" val="4049952745"/>
       </p:ext>
     </p:extLst>
   </p:cSld>
@@ -4123,9 +4579,8 @@
           <a:p>
             <a:r>
               <a:rPr lang="en-GB" dirty="0"/>
-              <a:t>UML chart</a:t>
-            </a:r>
-            <a:endParaRPr lang="en-US" dirty="0"/>
+              <a:t>Gantt Chart</a:t>
+            </a:r>
           </a:p>
         </p:txBody>
       </p:sp>
@@ -4145,78 +4600,43 @@
           <a:lstStyle/>
           <a:p>
             <a:r>
-              <a:rPr lang="en-US" dirty="0"/>
-              <a:t>Customers Table</a:t>
-            </a:r>
-          </a:p>
-          <a:p>
-            <a:r>
-              <a:rPr lang="en-US" dirty="0"/>
-              <a:t>Employees Table</a:t>
-            </a:r>
-          </a:p>
-          <a:p>
-            <a:r>
-              <a:rPr lang="en-US" dirty="0"/>
-              <a:t>Products Table</a:t>
-            </a:r>
-          </a:p>
-          <a:p>
-            <a:r>
-              <a:rPr lang="en-US" dirty="0"/>
-              <a:t>Suggestions Table</a:t>
-            </a:r>
-          </a:p>
-          <a:p>
-            <a:r>
-              <a:rPr lang="en-US" dirty="0"/>
-              <a:t>Suppliers Table</a:t>
-            </a:r>
-          </a:p>
-          <a:p>
-            <a:r>
-              <a:rPr lang="en-US" dirty="0"/>
-              <a:t>Navigation Form</a:t>
-            </a:r>
-          </a:p>
-          <a:p>
-            <a:endParaRPr lang="en-US" dirty="0"/>
-          </a:p>
-        </p:txBody>
-      </p:sp>
-      <p:sp>
-        <p:nvSpPr>
-          <p:cNvPr id="4" name="TextBox 3"/>
-          <p:cNvSpPr txBox="1"/>
+              <a:rPr lang="en-GB" dirty="0"/>
+              <a:t>Word Press</a:t>
+            </a:r>
+          </a:p>
+          <a:p>
+            <a:endParaRPr lang="en-GB" dirty="0"/>
+          </a:p>
+        </p:txBody>
+      </p:sp>
+      <p:pic>
+        <p:nvPicPr>
+          <p:cNvPr id="4" name="Picture 3"/>
+          <p:cNvPicPr>
+            <a:picLocks noChangeAspect="1"/>
+          </p:cNvPicPr>
           <p:nvPr/>
-        </p:nvSpPr>
+        </p:nvPicPr>
+        <p:blipFill>
+          <a:blip r:embed="rId2"/>
+          <a:stretch>
+            <a:fillRect/>
+          </a:stretch>
+        </p:blipFill>
         <p:spPr>
           <a:xfrm>
-            <a:off x="10323443" y="658574"/>
-            <a:ext cx="861392" cy="369332"/>
+            <a:off x="918302" y="2252662"/>
+            <a:ext cx="10279785" cy="3034955"/>
           </a:xfrm>
           <a:prstGeom prst="rect">
             <a:avLst/>
           </a:prstGeom>
-          <a:noFill/>
         </p:spPr>
-        <p:txBody>
-          <a:bodyPr wrap="square" rtlCol="0">
-            <a:spAutoFit/>
-          </a:bodyPr>
-          <a:lstStyle/>
-          <a:p>
-            <a:r>
-              <a:rPr lang="en-GB" dirty="0"/>
-              <a:t>Grigor</a:t>
-            </a:r>
-          </a:p>
-        </p:txBody>
-      </p:sp>
+      </p:pic>
     </p:spTree>
     <p:extLst>
       <p:ext uri="{BB962C8B-B14F-4D97-AF65-F5344CB8AC3E}">
-        <p14:creationId xmlns:p14="http://schemas.microsoft.com/office/powerpoint/2010/main" val="1248061747"/>
+        <p14:creationId xmlns:p14="http://schemas.microsoft.com/office/powerpoint/2010/main" val="36162383"/>
       </p:ext>
     </p:extLst>
   </p:cSld>
@@ -4260,7 +4680,7 @@
           <a:p>
             <a:r>
               <a:rPr lang="en-GB" dirty="0"/>
-              <a:t>Website</a:t>
+              <a:t>Individual Task</a:t>
             </a:r>
             <a:endParaRPr lang="en-US" dirty="0"/>
           </a:p>
@@ -4281,7 +4701,52 @@
           <a:bodyPr/>
           <a:lstStyle/>
           <a:p>
-            <a:endParaRPr lang="en-US"/>
+            <a:r>
+              <a:rPr lang="en-US" dirty="0"/>
+              <a:t>Databases – Dylan Gilroy and Jack Gallaher </a:t>
+            </a:r>
+          </a:p>
+          <a:p>
+            <a:r>
+              <a:rPr lang="en-US" dirty="0"/>
+              <a:t>UML charts – Antonio Penna and Grigor Danut</a:t>
+            </a:r>
+          </a:p>
+          <a:p>
+            <a:r>
+              <a:rPr lang="en-US" dirty="0"/>
+              <a:t>WordPress – Antonio Penna and Grigor Danut</a:t>
+            </a:r>
+          </a:p>
+          <a:p>
+            <a:r>
+              <a:rPr lang="en-US" dirty="0"/>
+              <a:t>Trello – Jack Gallaher </a:t>
+            </a:r>
+          </a:p>
+          <a:p>
+            <a:r>
+              <a:rPr lang="en-US" dirty="0"/>
+              <a:t>Presentation slides– Antonio Penna–layout, front page, introduction</a:t>
+            </a:r>
+          </a:p>
+          <a:p>
+            <a:r>
+              <a:rPr lang="en-US" dirty="0"/>
+              <a:t>Jack Gallaher-Agenda, Gantt chart, Conclusion, Last slide,</a:t>
+            </a:r>
+          </a:p>
+          <a:p>
+            <a:r>
+              <a:rPr lang="en-US" dirty="0"/>
+              <a:t>Grigor Daunt-UML charts, Website</a:t>
+            </a:r>
+          </a:p>
+          <a:p>
+            <a:r>
+              <a:rPr lang="en-US" dirty="0"/>
+              <a:t>Dylan Gilroy-Databases, individual Tasks</a:t>
+            </a:r>
           </a:p>
         </p:txBody>
       </p:sp>
@@ -4293,8 +4758,8 @@
         </p:nvSpPr>
         <p:spPr>
           <a:xfrm>
-            <a:off x="10230678" y="658574"/>
-            <a:ext cx="954156" cy="369332"/>
+            <a:off x="10323444" y="658574"/>
+            <a:ext cx="781878" cy="369332"/>
           </a:xfrm>
           <a:prstGeom prst="rect">
             <a:avLst/>
@@ -4309,7 +4774,7 @@
           <a:p>
             <a:r>
               <a:rPr lang="en-GB" dirty="0"/>
-              <a:t>Antonio</a:t>
+              <a:t>Dylan</a:t>
             </a:r>
           </a:p>
         </p:txBody>
@@ -4317,7 +4782,7 @@
     </p:spTree>
     <p:extLst>
       <p:ext uri="{BB962C8B-B14F-4D97-AF65-F5344CB8AC3E}">
-        <p14:creationId xmlns:p14="http://schemas.microsoft.com/office/powerpoint/2010/main" val="3123563747"/>
+        <p14:creationId xmlns:p14="http://schemas.microsoft.com/office/powerpoint/2010/main" val="3738593189"/>
       </p:ext>
     </p:extLst>
   </p:cSld>
@@ -4361,7 +4826,7 @@
           <a:p>
             <a:r>
               <a:rPr lang="en-GB" dirty="0"/>
-              <a:t>Conclusion</a:t>
+              <a:t>Databases</a:t>
             </a:r>
             <a:endParaRPr lang="en-US" dirty="0"/>
           </a:p>
@@ -4384,13 +4849,7 @@
           <a:p>
             <a:r>
               <a:rPr lang="en-US" dirty="0"/>
-              <a:t>MCTV Limited will continue to grow as a company in future </a:t>
-            </a:r>
-          </a:p>
-          <a:p>
-            <a:r>
-              <a:rPr lang="en-US" dirty="0"/>
-              <a:t>We hope that as the company moves to the cloud it will become more efficient. </a:t>
+              <a:t>Here we will show MCTV Limited Databases</a:t>
             </a:r>
           </a:p>
           <a:p>
@@ -4409,8 +4868,8 @@
         </p:nvSpPr>
         <p:spPr>
           <a:xfrm>
-            <a:off x="10217426" y="658574"/>
-            <a:ext cx="940904" cy="369332"/>
+            <a:off x="10296939" y="658574"/>
+            <a:ext cx="821635" cy="369332"/>
           </a:xfrm>
           <a:prstGeom prst="rect">
             <a:avLst/>
@@ -4425,7 +4884,7 @@
           <a:p>
             <a:r>
               <a:rPr lang="en-GB" dirty="0"/>
-              <a:t>Antonio</a:t>
+              <a:t>Grigor</a:t>
             </a:r>
           </a:p>
         </p:txBody>
@@ -4433,7 +4892,7 @@
     </p:spTree>
     <p:extLst>
       <p:ext uri="{BB962C8B-B14F-4D97-AF65-F5344CB8AC3E}">
-        <p14:creationId xmlns:p14="http://schemas.microsoft.com/office/powerpoint/2010/main" val="2325120104"/>
+        <p14:creationId xmlns:p14="http://schemas.microsoft.com/office/powerpoint/2010/main" val="1808812414"/>
       </p:ext>
     </p:extLst>
   </p:cSld>

</xml_diff>

<commit_message>
Add Database and UML to Presentation
</commit_message>
<xml_diff>
--- a/MCTV Limited.pptx
+++ b/MCTV Limited.pptx
@@ -13,13 +13,29 @@
     <p:sldId id="267" r:id="rId7"/>
     <p:sldId id="268" r:id="rId8"/>
     <p:sldId id="260" r:id="rId9"/>
-    <p:sldId id="270" r:id="rId10"/>
+    <p:sldId id="280" r:id="rId10"/>
     <p:sldId id="261" r:id="rId11"/>
-    <p:sldId id="262" r:id="rId12"/>
-    <p:sldId id="269" r:id="rId13"/>
-    <p:sldId id="263" r:id="rId14"/>
-    <p:sldId id="264" r:id="rId15"/>
-    <p:sldId id="265" r:id="rId16"/>
+    <p:sldId id="270" r:id="rId12"/>
+    <p:sldId id="271" r:id="rId13"/>
+    <p:sldId id="272" r:id="rId14"/>
+    <p:sldId id="274" r:id="rId15"/>
+    <p:sldId id="275" r:id="rId16"/>
+    <p:sldId id="276" r:id="rId17"/>
+    <p:sldId id="277" r:id="rId18"/>
+    <p:sldId id="278" r:id="rId19"/>
+    <p:sldId id="279" r:id="rId20"/>
+    <p:sldId id="281" r:id="rId21"/>
+    <p:sldId id="273" r:id="rId22"/>
+    <p:sldId id="262" r:id="rId23"/>
+    <p:sldId id="282" r:id="rId24"/>
+    <p:sldId id="283" r:id="rId25"/>
+    <p:sldId id="284" r:id="rId26"/>
+    <p:sldId id="285" r:id="rId27"/>
+    <p:sldId id="286" r:id="rId28"/>
+    <p:sldId id="287" r:id="rId29"/>
+    <p:sldId id="263" r:id="rId30"/>
+    <p:sldId id="264" r:id="rId31"/>
+    <p:sldId id="265" r:id="rId32"/>
   </p:sldIdLst>
   <p:sldSz cx="12192000" cy="6858000"/>
   <p:notesSz cx="6858000" cy="9144000"/>
@@ -3401,11 +3417,32 @@
           </a:p>
           <a:p>
             <a:r>
-              <a:rPr lang="en-US"/>
+              <a:rPr lang="en-US" dirty="0"/>
               <a:t>Queries</a:t>
             </a:r>
           </a:p>
           <a:p>
+            <a:r>
+              <a:rPr lang="en-US" dirty="0"/>
+              <a:t>Forms</a:t>
+            </a:r>
+          </a:p>
+          <a:p>
+            <a:r>
+              <a:rPr lang="en-US" dirty="0"/>
+              <a:t>Reports</a:t>
+            </a:r>
+          </a:p>
+          <a:p>
+            <a:r>
+              <a:rPr lang="en-US" dirty="0"/>
+              <a:t>Macros</a:t>
+            </a:r>
+          </a:p>
+          <a:p>
+            <a:pPr marL="0" indent="0">
+              <a:buNone/>
+            </a:pPr>
             <a:endParaRPr lang="en-US" dirty="0"/>
           </a:p>
           <a:p>
@@ -3491,10 +3528,9 @@
           <a:lstStyle/>
           <a:p>
             <a:r>
-              <a:rPr lang="en-GB" dirty="0"/>
-              <a:t>UML chart</a:t>
-            </a:r>
-            <a:endParaRPr lang="en-US" dirty="0"/>
+              <a:rPr lang="en-IE" dirty="0"/>
+              <a:t>Tables</a:t>
+            </a:r>
           </a:p>
         </p:txBody>
       </p:sp>
@@ -3514,78 +3550,41 @@
           <a:lstStyle/>
           <a:p>
             <a:r>
-              <a:rPr lang="en-US" dirty="0"/>
+              <a:rPr lang="en-IE" dirty="0"/>
               <a:t>Customers Table</a:t>
             </a:r>
           </a:p>
           <a:p>
             <a:r>
-              <a:rPr lang="en-US" dirty="0"/>
+              <a:rPr lang="en-IE" dirty="0"/>
               <a:t>Employees Table</a:t>
             </a:r>
           </a:p>
           <a:p>
             <a:r>
-              <a:rPr lang="en-US" dirty="0"/>
-              <a:t>Products Table</a:t>
-            </a:r>
-          </a:p>
-          <a:p>
-            <a:r>
-              <a:rPr lang="en-US" dirty="0"/>
-              <a:t>Suggestions Table</a:t>
-            </a:r>
-          </a:p>
-          <a:p>
-            <a:r>
-              <a:rPr lang="en-US" dirty="0"/>
+              <a:rPr lang="en-IE"/>
+              <a:t>Suggestions </a:t>
+            </a:r>
+            <a:r>
+              <a:rPr lang="en-IE" dirty="0"/>
+              <a:t>Table</a:t>
+            </a:r>
+          </a:p>
+          <a:p>
+            <a:r>
+              <a:rPr lang="en-IE" dirty="0"/>
               <a:t>Suppliers Table</a:t>
             </a:r>
           </a:p>
           <a:p>
-            <a:r>
-              <a:rPr lang="en-US" dirty="0"/>
-              <a:t>Navigation Form</a:t>
-            </a:r>
-          </a:p>
-          <a:p>
-            <a:endParaRPr lang="en-US" dirty="0"/>
-          </a:p>
-        </p:txBody>
-      </p:sp>
-      <p:sp>
-        <p:nvSpPr>
-          <p:cNvPr id="4" name="TextBox 3"/>
-          <p:cNvSpPr txBox="1"/>
-          <p:nvPr/>
-        </p:nvSpPr>
-        <p:spPr>
-          <a:xfrm>
-            <a:off x="10323443" y="658574"/>
-            <a:ext cx="861392" cy="369332"/>
-          </a:xfrm>
-          <a:prstGeom prst="rect">
-            <a:avLst/>
-          </a:prstGeom>
-          <a:noFill/>
-        </p:spPr>
-        <p:txBody>
-          <a:bodyPr wrap="square" rtlCol="0">
-            <a:spAutoFit/>
-          </a:bodyPr>
-          <a:lstStyle/>
-          <a:p>
-            <a:r>
-              <a:rPr lang="en-GB" dirty="0"/>
-              <a:t>Grigor</a:t>
-            </a:r>
+            <a:endParaRPr lang="en-IE" dirty="0"/>
           </a:p>
         </p:txBody>
       </p:sp>
     </p:spTree>
     <p:extLst>
       <p:ext uri="{BB962C8B-B14F-4D97-AF65-F5344CB8AC3E}">
-        <p14:creationId xmlns:p14="http://schemas.microsoft.com/office/powerpoint/2010/main" val="1248061747"/>
+        <p14:creationId xmlns:p14="http://schemas.microsoft.com/office/powerpoint/2010/main" val="3133288830"/>
       </p:ext>
     </p:extLst>
   </p:cSld>
@@ -3628,8 +3627,8 @@
           <a:lstStyle/>
           <a:p>
             <a:r>
-              <a:rPr lang="en-GB" dirty="0"/>
-              <a:t>UML Chart</a:t>
+              <a:rPr lang="en-IE" dirty="0"/>
+              <a:t>Queries</a:t>
             </a:r>
           </a:p>
         </p:txBody>
@@ -3646,17 +3645,70 @@
         </p:nvSpPr>
         <p:spPr/>
         <p:txBody>
-          <a:bodyPr/>
-          <a:lstStyle/>
-          <a:p>
-            <a:endParaRPr lang="en-GB" dirty="0"/>
+          <a:bodyPr>
+            <a:normAutofit lnSpcReduction="10000"/>
+          </a:bodyPr>
+          <a:lstStyle/>
+          <a:p>
+            <a:r>
+              <a:rPr lang="en-IE" dirty="0"/>
+              <a:t>Customers from Dublin</a:t>
+            </a:r>
+          </a:p>
+          <a:p>
+            <a:r>
+              <a:rPr lang="en-IE" dirty="0"/>
+              <a:t>Employees with Medical Card</a:t>
+            </a:r>
+          </a:p>
+          <a:p>
+            <a:r>
+              <a:rPr lang="en-IE" dirty="0"/>
+              <a:t>Products (bills) not paid</a:t>
+            </a:r>
+          </a:p>
+          <a:p>
+            <a:r>
+              <a:rPr lang="en-IE" dirty="0"/>
+              <a:t>Orders by year 2016</a:t>
+            </a:r>
+          </a:p>
+          <a:p>
+            <a:r>
+              <a:rPr lang="en-IE" dirty="0"/>
+              <a:t>Orders by year 2017</a:t>
+            </a:r>
+          </a:p>
+          <a:p>
+            <a:r>
+              <a:rPr lang="en-IE" dirty="0"/>
+              <a:t>Out of Stock</a:t>
+            </a:r>
+          </a:p>
+          <a:p>
+            <a:r>
+              <a:rPr lang="en-IE" dirty="0"/>
+              <a:t>Products with Stock Value more than €4000</a:t>
+            </a:r>
+          </a:p>
+          <a:p>
+            <a:r>
+              <a:rPr lang="en-IE" dirty="0"/>
+              <a:t>Suggestions Query</a:t>
+            </a:r>
+          </a:p>
+          <a:p>
+            <a:r>
+              <a:rPr lang="en-IE" dirty="0"/>
+              <a:t>Suppliers Query</a:t>
+            </a:r>
           </a:p>
         </p:txBody>
       </p:sp>
     </p:spTree>
     <p:extLst>
       <p:ext uri="{BB962C8B-B14F-4D97-AF65-F5344CB8AC3E}">
-        <p14:creationId xmlns:p14="http://schemas.microsoft.com/office/powerpoint/2010/main" val="2232451369"/>
+        <p14:creationId xmlns:p14="http://schemas.microsoft.com/office/powerpoint/2010/main" val="2846560183"/>
       </p:ext>
     </p:extLst>
   </p:cSld>
@@ -3699,10 +3751,9 @@
           <a:lstStyle/>
           <a:p>
             <a:r>
-              <a:rPr lang="en-GB" dirty="0"/>
-              <a:t>Website</a:t>
-            </a:r>
-            <a:endParaRPr lang="en-US" dirty="0"/>
+              <a:rPr lang="en-IE" dirty="0"/>
+              <a:t>Forms</a:t>
+            </a:r>
           </a:p>
         </p:txBody>
       </p:sp>
@@ -3722,43 +3773,44 @@
           <a:lstStyle/>
           <a:p>
             <a:r>
-              <a:rPr lang="en-US" dirty="0"/>
-              <a:t>Here we will present to you the MCTV Limited Website </a:t>
-            </a:r>
-          </a:p>
-          <a:p>
-            <a:r>
-              <a:rPr lang="en-US" dirty="0"/>
-              <a:t>Which will feature a Home page and 4 individual pages about the workers in the shop </a:t>
-            </a:r>
-          </a:p>
-        </p:txBody>
-      </p:sp>
-      <p:sp>
-        <p:nvSpPr>
-          <p:cNvPr id="4" name="TextBox 3"/>
-          <p:cNvSpPr txBox="1"/>
-          <p:nvPr/>
-        </p:nvSpPr>
-        <p:spPr>
-          <a:xfrm>
-            <a:off x="10230678" y="658574"/>
-            <a:ext cx="954156" cy="369332"/>
-          </a:xfrm>
-          <a:prstGeom prst="rect">
-            <a:avLst/>
-          </a:prstGeom>
-          <a:noFill/>
-        </p:spPr>
-        <p:txBody>
-          <a:bodyPr wrap="square" rtlCol="0">
-            <a:spAutoFit/>
-          </a:bodyPr>
-          <a:lstStyle/>
-          <a:p>
-            <a:r>
-              <a:rPr lang="en-GB" dirty="0"/>
-              <a:t>Antonio</a:t>
+              <a:rPr lang="en-IE" dirty="0"/>
+              <a:t>Customers Form</a:t>
+            </a:r>
+          </a:p>
+          <a:p>
+            <a:r>
+              <a:rPr lang="en-IE" dirty="0"/>
+              <a:t>Employees Form</a:t>
+            </a:r>
+          </a:p>
+          <a:p>
+            <a:r>
+              <a:rPr lang="en-IE" dirty="0"/>
+              <a:t>Navigation Form</a:t>
+            </a:r>
+          </a:p>
+          <a:p>
+            <a:r>
+              <a:rPr lang="en-IE" dirty="0"/>
+              <a:t>Products Form</a:t>
+            </a:r>
+          </a:p>
+          <a:p>
+            <a:r>
+              <a:rPr lang="en-IE" dirty="0"/>
+              <a:t>Suggestions Form</a:t>
+            </a:r>
+          </a:p>
+          <a:p>
+            <a:r>
+              <a:rPr lang="en-IE" dirty="0"/>
+              <a:t>Suppliers Form</a:t>
+            </a:r>
+          </a:p>
+          <a:p>
+            <a:r>
+              <a:rPr lang="en-IE" dirty="0"/>
+              <a:t>Welcome Page</a:t>
             </a:r>
           </a:p>
         </p:txBody>
@@ -3766,7 +3818,7 @@
     </p:spTree>
     <p:extLst>
       <p:ext uri="{BB962C8B-B14F-4D97-AF65-F5344CB8AC3E}">
-        <p14:creationId xmlns:p14="http://schemas.microsoft.com/office/powerpoint/2010/main" val="3123563747"/>
+        <p14:creationId xmlns:p14="http://schemas.microsoft.com/office/powerpoint/2010/main" val="3503790673"/>
       </p:ext>
     </p:extLst>
   </p:cSld>
@@ -3809,6 +3861,1657 @@
           <a:lstStyle/>
           <a:p>
             <a:r>
+              <a:rPr lang="en-IE" dirty="0"/>
+              <a:t>Customers Form</a:t>
+            </a:r>
+          </a:p>
+        </p:txBody>
+      </p:sp>
+      <p:pic>
+        <p:nvPicPr>
+          <p:cNvPr id="5" name="Content Placeholder 4"/>
+          <p:cNvPicPr>
+            <a:picLocks noGrp="1" noChangeAspect="1"/>
+          </p:cNvPicPr>
+          <p:nvPr>
+            <p:ph idx="1"/>
+          </p:nvPr>
+        </p:nvPicPr>
+        <p:blipFill>
+          <a:blip r:embed="rId2">
+            <a:extLst>
+              <a:ext uri="{28A0092B-C50C-407E-A947-70E740481C1C}">
+                <a14:useLocalDpi xmlns:a14="http://schemas.microsoft.com/office/drawing/2010/main" val="0"/>
+              </a:ext>
+            </a:extLst>
+          </a:blip>
+          <a:stretch>
+            <a:fillRect/>
+          </a:stretch>
+        </p:blipFill>
+        <p:spPr>
+          <a:xfrm>
+            <a:off x="1615634" y="1825625"/>
+            <a:ext cx="8960731" cy="4351338"/>
+          </a:xfrm>
+        </p:spPr>
+      </p:pic>
+    </p:spTree>
+    <p:extLst>
+      <p:ext uri="{BB962C8B-B14F-4D97-AF65-F5344CB8AC3E}">
+        <p14:creationId xmlns:p14="http://schemas.microsoft.com/office/powerpoint/2010/main" val="3599055471"/>
+      </p:ext>
+    </p:extLst>
+  </p:cSld>
+  <p:clrMapOvr>
+    <a:masterClrMapping/>
+  </p:clrMapOvr>
+</p:sld>
+</file>
+
+<file path=ppt/slides/slide15.xml><?xml version="1.0" encoding="utf-8"?>
+<p:sld xmlns:a="http://schemas.openxmlformats.org/drawingml/2006/main" xmlns:r="http://schemas.openxmlformats.org/officeDocument/2006/relationships" xmlns:p="http://schemas.openxmlformats.org/presentationml/2006/main">
+  <p:cSld>
+    <p:spTree>
+      <p:nvGrpSpPr>
+        <p:cNvPr id="1" name=""/>
+        <p:cNvGrpSpPr/>
+        <p:nvPr/>
+      </p:nvGrpSpPr>
+      <p:grpSpPr>
+        <a:xfrm>
+          <a:off x="0" y="0"/>
+          <a:ext cx="0" cy="0"/>
+          <a:chOff x="0" y="0"/>
+          <a:chExt cx="0" cy="0"/>
+        </a:xfrm>
+      </p:grpSpPr>
+      <p:sp>
+        <p:nvSpPr>
+          <p:cNvPr id="2" name="Title 1"/>
+          <p:cNvSpPr>
+            <a:spLocks noGrp="1"/>
+          </p:cNvSpPr>
+          <p:nvPr>
+            <p:ph type="title"/>
+          </p:nvPr>
+        </p:nvSpPr>
+        <p:spPr/>
+        <p:txBody>
+          <a:bodyPr/>
+          <a:lstStyle/>
+          <a:p>
+            <a:r>
+              <a:rPr lang="en-IE" dirty="0"/>
+              <a:t>Employees Form</a:t>
+            </a:r>
+          </a:p>
+        </p:txBody>
+      </p:sp>
+      <p:pic>
+        <p:nvPicPr>
+          <p:cNvPr id="5" name="Content Placeholder 4"/>
+          <p:cNvPicPr>
+            <a:picLocks noGrp="1" noChangeAspect="1"/>
+          </p:cNvPicPr>
+          <p:nvPr>
+            <p:ph idx="1"/>
+          </p:nvPr>
+        </p:nvPicPr>
+        <p:blipFill>
+          <a:blip r:embed="rId2">
+            <a:extLst>
+              <a:ext uri="{28A0092B-C50C-407E-A947-70E740481C1C}">
+                <a14:useLocalDpi xmlns:a14="http://schemas.microsoft.com/office/drawing/2010/main" val="0"/>
+              </a:ext>
+            </a:extLst>
+          </a:blip>
+          <a:stretch>
+            <a:fillRect/>
+          </a:stretch>
+        </p:blipFill>
+        <p:spPr>
+          <a:xfrm>
+            <a:off x="1611457" y="1825625"/>
+            <a:ext cx="8969085" cy="4351338"/>
+          </a:xfrm>
+        </p:spPr>
+      </p:pic>
+    </p:spTree>
+    <p:extLst>
+      <p:ext uri="{BB962C8B-B14F-4D97-AF65-F5344CB8AC3E}">
+        <p14:creationId xmlns:p14="http://schemas.microsoft.com/office/powerpoint/2010/main" val="2771616802"/>
+      </p:ext>
+    </p:extLst>
+  </p:cSld>
+  <p:clrMapOvr>
+    <a:masterClrMapping/>
+  </p:clrMapOvr>
+</p:sld>
+</file>
+
+<file path=ppt/slides/slide16.xml><?xml version="1.0" encoding="utf-8"?>
+<p:sld xmlns:a="http://schemas.openxmlformats.org/drawingml/2006/main" xmlns:r="http://schemas.openxmlformats.org/officeDocument/2006/relationships" xmlns:p="http://schemas.openxmlformats.org/presentationml/2006/main">
+  <p:cSld>
+    <p:spTree>
+      <p:nvGrpSpPr>
+        <p:cNvPr id="1" name=""/>
+        <p:cNvGrpSpPr/>
+        <p:nvPr/>
+      </p:nvGrpSpPr>
+      <p:grpSpPr>
+        <a:xfrm>
+          <a:off x="0" y="0"/>
+          <a:ext cx="0" cy="0"/>
+          <a:chOff x="0" y="0"/>
+          <a:chExt cx="0" cy="0"/>
+        </a:xfrm>
+      </p:grpSpPr>
+      <p:sp>
+        <p:nvSpPr>
+          <p:cNvPr id="2" name="Title 1"/>
+          <p:cNvSpPr>
+            <a:spLocks noGrp="1"/>
+          </p:cNvSpPr>
+          <p:nvPr>
+            <p:ph type="title"/>
+          </p:nvPr>
+        </p:nvSpPr>
+        <p:spPr/>
+        <p:txBody>
+          <a:bodyPr/>
+          <a:lstStyle/>
+          <a:p>
+            <a:r>
+              <a:rPr lang="en-IE" dirty="0"/>
+              <a:t>Navigation Form</a:t>
+            </a:r>
+          </a:p>
+        </p:txBody>
+      </p:sp>
+      <p:pic>
+        <p:nvPicPr>
+          <p:cNvPr id="5" name="Content Placeholder 4"/>
+          <p:cNvPicPr>
+            <a:picLocks noGrp="1" noChangeAspect="1"/>
+          </p:cNvPicPr>
+          <p:nvPr>
+            <p:ph idx="1"/>
+          </p:nvPr>
+        </p:nvPicPr>
+        <p:blipFill>
+          <a:blip r:embed="rId2">
+            <a:extLst>
+              <a:ext uri="{28A0092B-C50C-407E-A947-70E740481C1C}">
+                <a14:useLocalDpi xmlns:a14="http://schemas.microsoft.com/office/drawing/2010/main" val="0"/>
+              </a:ext>
+            </a:extLst>
+          </a:blip>
+          <a:stretch>
+            <a:fillRect/>
+          </a:stretch>
+        </p:blipFill>
+        <p:spPr>
+          <a:xfrm>
+            <a:off x="1531447" y="1825625"/>
+            <a:ext cx="9129106" cy="4351338"/>
+          </a:xfrm>
+        </p:spPr>
+      </p:pic>
+    </p:spTree>
+    <p:extLst>
+      <p:ext uri="{BB962C8B-B14F-4D97-AF65-F5344CB8AC3E}">
+        <p14:creationId xmlns:p14="http://schemas.microsoft.com/office/powerpoint/2010/main" val="1874684647"/>
+      </p:ext>
+    </p:extLst>
+  </p:cSld>
+  <p:clrMapOvr>
+    <a:masterClrMapping/>
+  </p:clrMapOvr>
+</p:sld>
+</file>
+
+<file path=ppt/slides/slide17.xml><?xml version="1.0" encoding="utf-8"?>
+<p:sld xmlns:a="http://schemas.openxmlformats.org/drawingml/2006/main" xmlns:r="http://schemas.openxmlformats.org/officeDocument/2006/relationships" xmlns:p="http://schemas.openxmlformats.org/presentationml/2006/main">
+  <p:cSld>
+    <p:spTree>
+      <p:nvGrpSpPr>
+        <p:cNvPr id="1" name=""/>
+        <p:cNvGrpSpPr/>
+        <p:nvPr/>
+      </p:nvGrpSpPr>
+      <p:grpSpPr>
+        <a:xfrm>
+          <a:off x="0" y="0"/>
+          <a:ext cx="0" cy="0"/>
+          <a:chOff x="0" y="0"/>
+          <a:chExt cx="0" cy="0"/>
+        </a:xfrm>
+      </p:grpSpPr>
+      <p:sp>
+        <p:nvSpPr>
+          <p:cNvPr id="2" name="Title 1"/>
+          <p:cNvSpPr>
+            <a:spLocks noGrp="1"/>
+          </p:cNvSpPr>
+          <p:nvPr>
+            <p:ph type="title"/>
+          </p:nvPr>
+        </p:nvSpPr>
+        <p:spPr/>
+        <p:txBody>
+          <a:bodyPr/>
+          <a:lstStyle/>
+          <a:p>
+            <a:r>
+              <a:rPr lang="en-IE" dirty="0"/>
+              <a:t>Products Form</a:t>
+            </a:r>
+          </a:p>
+        </p:txBody>
+      </p:sp>
+      <p:pic>
+        <p:nvPicPr>
+          <p:cNvPr id="5" name="Content Placeholder 4"/>
+          <p:cNvPicPr>
+            <a:picLocks noGrp="1" noChangeAspect="1"/>
+          </p:cNvPicPr>
+          <p:nvPr>
+            <p:ph idx="1"/>
+          </p:nvPr>
+        </p:nvPicPr>
+        <p:blipFill>
+          <a:blip r:embed="rId2">
+            <a:extLst>
+              <a:ext uri="{28A0092B-C50C-407E-A947-70E740481C1C}">
+                <a14:useLocalDpi xmlns:a14="http://schemas.microsoft.com/office/drawing/2010/main" val="0"/>
+              </a:ext>
+            </a:extLst>
+          </a:blip>
+          <a:stretch>
+            <a:fillRect/>
+          </a:stretch>
+        </p:blipFill>
+        <p:spPr>
+          <a:xfrm>
+            <a:off x="1573845" y="1825625"/>
+            <a:ext cx="9044310" cy="4351338"/>
+          </a:xfrm>
+        </p:spPr>
+      </p:pic>
+    </p:spTree>
+    <p:extLst>
+      <p:ext uri="{BB962C8B-B14F-4D97-AF65-F5344CB8AC3E}">
+        <p14:creationId xmlns:p14="http://schemas.microsoft.com/office/powerpoint/2010/main" val="3960545655"/>
+      </p:ext>
+    </p:extLst>
+  </p:cSld>
+  <p:clrMapOvr>
+    <a:masterClrMapping/>
+  </p:clrMapOvr>
+</p:sld>
+</file>
+
+<file path=ppt/slides/slide18.xml><?xml version="1.0" encoding="utf-8"?>
+<p:sld xmlns:a="http://schemas.openxmlformats.org/drawingml/2006/main" xmlns:r="http://schemas.openxmlformats.org/officeDocument/2006/relationships" xmlns:p="http://schemas.openxmlformats.org/presentationml/2006/main">
+  <p:cSld>
+    <p:spTree>
+      <p:nvGrpSpPr>
+        <p:cNvPr id="1" name=""/>
+        <p:cNvGrpSpPr/>
+        <p:nvPr/>
+      </p:nvGrpSpPr>
+      <p:grpSpPr>
+        <a:xfrm>
+          <a:off x="0" y="0"/>
+          <a:ext cx="0" cy="0"/>
+          <a:chOff x="0" y="0"/>
+          <a:chExt cx="0" cy="0"/>
+        </a:xfrm>
+      </p:grpSpPr>
+      <p:sp>
+        <p:nvSpPr>
+          <p:cNvPr id="2" name="Title 1"/>
+          <p:cNvSpPr>
+            <a:spLocks noGrp="1"/>
+          </p:cNvSpPr>
+          <p:nvPr>
+            <p:ph type="title"/>
+          </p:nvPr>
+        </p:nvSpPr>
+        <p:spPr/>
+        <p:txBody>
+          <a:bodyPr/>
+          <a:lstStyle/>
+          <a:p>
+            <a:r>
+              <a:rPr lang="en-IE" dirty="0"/>
+              <a:t>Suggestion Form</a:t>
+            </a:r>
+          </a:p>
+        </p:txBody>
+      </p:sp>
+      <p:pic>
+        <p:nvPicPr>
+          <p:cNvPr id="5" name="Content Placeholder 4"/>
+          <p:cNvPicPr>
+            <a:picLocks noGrp="1" noChangeAspect="1"/>
+          </p:cNvPicPr>
+          <p:nvPr>
+            <p:ph idx="1"/>
+          </p:nvPr>
+        </p:nvPicPr>
+        <p:blipFill>
+          <a:blip r:embed="rId2">
+            <a:extLst>
+              <a:ext uri="{28A0092B-C50C-407E-A947-70E740481C1C}">
+                <a14:useLocalDpi xmlns:a14="http://schemas.microsoft.com/office/drawing/2010/main" val="0"/>
+              </a:ext>
+            </a:extLst>
+          </a:blip>
+          <a:stretch>
+            <a:fillRect/>
+          </a:stretch>
+        </p:blipFill>
+        <p:spPr>
+          <a:xfrm>
+            <a:off x="1687868" y="1825625"/>
+            <a:ext cx="8816264" cy="4351338"/>
+          </a:xfrm>
+        </p:spPr>
+      </p:pic>
+    </p:spTree>
+    <p:extLst>
+      <p:ext uri="{BB962C8B-B14F-4D97-AF65-F5344CB8AC3E}">
+        <p14:creationId xmlns:p14="http://schemas.microsoft.com/office/powerpoint/2010/main" val="523602880"/>
+      </p:ext>
+    </p:extLst>
+  </p:cSld>
+  <p:clrMapOvr>
+    <a:masterClrMapping/>
+  </p:clrMapOvr>
+</p:sld>
+</file>
+
+<file path=ppt/slides/slide19.xml><?xml version="1.0" encoding="utf-8"?>
+<p:sld xmlns:a="http://schemas.openxmlformats.org/drawingml/2006/main" xmlns:r="http://schemas.openxmlformats.org/officeDocument/2006/relationships" xmlns:p="http://schemas.openxmlformats.org/presentationml/2006/main">
+  <p:cSld>
+    <p:spTree>
+      <p:nvGrpSpPr>
+        <p:cNvPr id="1" name=""/>
+        <p:cNvGrpSpPr/>
+        <p:nvPr/>
+      </p:nvGrpSpPr>
+      <p:grpSpPr>
+        <a:xfrm>
+          <a:off x="0" y="0"/>
+          <a:ext cx="0" cy="0"/>
+          <a:chOff x="0" y="0"/>
+          <a:chExt cx="0" cy="0"/>
+        </a:xfrm>
+      </p:grpSpPr>
+      <p:sp>
+        <p:nvSpPr>
+          <p:cNvPr id="2" name="Title 1"/>
+          <p:cNvSpPr>
+            <a:spLocks noGrp="1"/>
+          </p:cNvSpPr>
+          <p:nvPr>
+            <p:ph type="title"/>
+          </p:nvPr>
+        </p:nvSpPr>
+        <p:spPr/>
+        <p:txBody>
+          <a:bodyPr/>
+          <a:lstStyle/>
+          <a:p>
+            <a:r>
+              <a:rPr lang="en-IE" dirty="0"/>
+              <a:t>Suppliers Form</a:t>
+            </a:r>
+          </a:p>
+        </p:txBody>
+      </p:sp>
+      <p:pic>
+        <p:nvPicPr>
+          <p:cNvPr id="5" name="Content Placeholder 4"/>
+          <p:cNvPicPr>
+            <a:picLocks noGrp="1" noChangeAspect="1"/>
+          </p:cNvPicPr>
+          <p:nvPr>
+            <p:ph idx="1"/>
+          </p:nvPr>
+        </p:nvPicPr>
+        <p:blipFill>
+          <a:blip r:embed="rId2">
+            <a:extLst>
+              <a:ext uri="{28A0092B-C50C-407E-A947-70E740481C1C}">
+                <a14:useLocalDpi xmlns:a14="http://schemas.microsoft.com/office/drawing/2010/main" val="0"/>
+              </a:ext>
+            </a:extLst>
+          </a:blip>
+          <a:stretch>
+            <a:fillRect/>
+          </a:stretch>
+        </p:blipFill>
+        <p:spPr>
+          <a:xfrm>
+            <a:off x="1766161" y="1825625"/>
+            <a:ext cx="8659678" cy="4351338"/>
+          </a:xfrm>
+        </p:spPr>
+      </p:pic>
+    </p:spTree>
+    <p:extLst>
+      <p:ext uri="{BB962C8B-B14F-4D97-AF65-F5344CB8AC3E}">
+        <p14:creationId xmlns:p14="http://schemas.microsoft.com/office/powerpoint/2010/main" val="3677103716"/>
+      </p:ext>
+    </p:extLst>
+  </p:cSld>
+  <p:clrMapOvr>
+    <a:masterClrMapping/>
+  </p:clrMapOvr>
+</p:sld>
+</file>
+
+<file path=ppt/slides/slide2.xml><?xml version="1.0" encoding="utf-8"?>
+<p:sld xmlns:a="http://schemas.openxmlformats.org/drawingml/2006/main" xmlns:r="http://schemas.openxmlformats.org/officeDocument/2006/relationships" xmlns:p="http://schemas.openxmlformats.org/presentationml/2006/main">
+  <p:cSld>
+    <p:spTree>
+      <p:nvGrpSpPr>
+        <p:cNvPr id="1" name=""/>
+        <p:cNvGrpSpPr/>
+        <p:nvPr/>
+      </p:nvGrpSpPr>
+      <p:grpSpPr>
+        <a:xfrm>
+          <a:off x="0" y="0"/>
+          <a:ext cx="0" cy="0"/>
+          <a:chOff x="0" y="0"/>
+          <a:chExt cx="0" cy="0"/>
+        </a:xfrm>
+      </p:grpSpPr>
+      <p:sp>
+        <p:nvSpPr>
+          <p:cNvPr id="2" name="Title 1"/>
+          <p:cNvSpPr>
+            <a:spLocks noGrp="1"/>
+          </p:cNvSpPr>
+          <p:nvPr>
+            <p:ph type="title"/>
+          </p:nvPr>
+        </p:nvSpPr>
+        <p:spPr/>
+        <p:txBody>
+          <a:bodyPr/>
+          <a:lstStyle/>
+          <a:p>
+            <a:r>
+              <a:rPr lang="en-GB" dirty="0"/>
+              <a:t>Agenda</a:t>
+            </a:r>
+            <a:endParaRPr lang="en-US" dirty="0"/>
+          </a:p>
+        </p:txBody>
+      </p:sp>
+      <p:sp>
+        <p:nvSpPr>
+          <p:cNvPr id="3" name="Content Placeholder 2"/>
+          <p:cNvSpPr>
+            <a:spLocks noGrp="1"/>
+          </p:cNvSpPr>
+          <p:nvPr>
+            <p:ph idx="1"/>
+          </p:nvPr>
+        </p:nvSpPr>
+        <p:spPr/>
+        <p:txBody>
+          <a:bodyPr/>
+          <a:lstStyle/>
+          <a:p>
+            <a:r>
+              <a:rPr lang="en-GB" dirty="0"/>
+              <a:t>The purpose of this presentation was to explore the development of MCTV Limited. </a:t>
+            </a:r>
+          </a:p>
+          <a:p>
+            <a:r>
+              <a:rPr lang="en-GB" dirty="0"/>
+              <a:t>We as a group were given particular tasks in which we all had to take part in.</a:t>
+            </a:r>
+          </a:p>
+          <a:p>
+            <a:r>
+              <a:rPr lang="en-US" dirty="0"/>
+              <a:t>This presentation will feature a quick background MCTV Limited, the UML charts, Databases, the company Website and what holds for the future of MCTV Limited as the company grows.</a:t>
+            </a:r>
+          </a:p>
+          <a:p>
+            <a:endParaRPr lang="en-US" dirty="0"/>
+          </a:p>
+          <a:p>
+            <a:endParaRPr lang="en-US" dirty="0"/>
+          </a:p>
+        </p:txBody>
+      </p:sp>
+      <p:sp>
+        <p:nvSpPr>
+          <p:cNvPr id="4" name="TextBox 3"/>
+          <p:cNvSpPr txBox="1"/>
+          <p:nvPr/>
+        </p:nvSpPr>
+        <p:spPr>
+          <a:xfrm rot="1682298">
+            <a:off x="10357345" y="719476"/>
+            <a:ext cx="570990" cy="369332"/>
+          </a:xfrm>
+          <a:prstGeom prst="rect">
+            <a:avLst/>
+          </a:prstGeom>
+          <a:noFill/>
+        </p:spPr>
+        <p:txBody>
+          <a:bodyPr wrap="none" rtlCol="0">
+            <a:spAutoFit/>
+          </a:bodyPr>
+          <a:lstStyle/>
+          <a:p>
+            <a:pPr algn="ctr"/>
+            <a:r>
+              <a:rPr lang="en-US" dirty="0"/>
+              <a:t>Jack</a:t>
+            </a:r>
+          </a:p>
+        </p:txBody>
+      </p:sp>
+    </p:spTree>
+    <p:extLst>
+      <p:ext uri="{BB962C8B-B14F-4D97-AF65-F5344CB8AC3E}">
+        <p14:creationId xmlns:p14="http://schemas.microsoft.com/office/powerpoint/2010/main" val="3481843719"/>
+      </p:ext>
+    </p:extLst>
+  </p:cSld>
+  <p:clrMapOvr>
+    <a:masterClrMapping/>
+  </p:clrMapOvr>
+</p:sld>
+</file>
+
+<file path=ppt/slides/slide20.xml><?xml version="1.0" encoding="utf-8"?>
+<p:sld xmlns:a="http://schemas.openxmlformats.org/drawingml/2006/main" xmlns:r="http://schemas.openxmlformats.org/officeDocument/2006/relationships" xmlns:p="http://schemas.openxmlformats.org/presentationml/2006/main">
+  <p:cSld>
+    <p:spTree>
+      <p:nvGrpSpPr>
+        <p:cNvPr id="1" name=""/>
+        <p:cNvGrpSpPr/>
+        <p:nvPr/>
+      </p:nvGrpSpPr>
+      <p:grpSpPr>
+        <a:xfrm>
+          <a:off x="0" y="0"/>
+          <a:ext cx="0" cy="0"/>
+          <a:chOff x="0" y="0"/>
+          <a:chExt cx="0" cy="0"/>
+        </a:xfrm>
+      </p:grpSpPr>
+      <p:sp>
+        <p:nvSpPr>
+          <p:cNvPr id="2" name="Title 1"/>
+          <p:cNvSpPr>
+            <a:spLocks noGrp="1"/>
+          </p:cNvSpPr>
+          <p:nvPr>
+            <p:ph type="title"/>
+          </p:nvPr>
+        </p:nvSpPr>
+        <p:spPr/>
+        <p:txBody>
+          <a:bodyPr/>
+          <a:lstStyle/>
+          <a:p>
+            <a:r>
+              <a:rPr lang="en-IE" dirty="0"/>
+              <a:t>Welcome Page</a:t>
+            </a:r>
+          </a:p>
+        </p:txBody>
+      </p:sp>
+      <p:pic>
+        <p:nvPicPr>
+          <p:cNvPr id="5" name="Content Placeholder 4"/>
+          <p:cNvPicPr>
+            <a:picLocks noGrp="1" noChangeAspect="1"/>
+          </p:cNvPicPr>
+          <p:nvPr>
+            <p:ph idx="1"/>
+          </p:nvPr>
+        </p:nvPicPr>
+        <p:blipFill>
+          <a:blip r:embed="rId2">
+            <a:extLst>
+              <a:ext uri="{28A0092B-C50C-407E-A947-70E740481C1C}">
+                <a14:useLocalDpi xmlns:a14="http://schemas.microsoft.com/office/drawing/2010/main" val="0"/>
+              </a:ext>
+            </a:extLst>
+          </a:blip>
+          <a:stretch>
+            <a:fillRect/>
+          </a:stretch>
+        </p:blipFill>
+        <p:spPr>
+          <a:xfrm>
+            <a:off x="1456677" y="1991238"/>
+            <a:ext cx="9278645" cy="4020111"/>
+          </a:xfrm>
+        </p:spPr>
+      </p:pic>
+    </p:spTree>
+    <p:extLst>
+      <p:ext uri="{BB962C8B-B14F-4D97-AF65-F5344CB8AC3E}">
+        <p14:creationId xmlns:p14="http://schemas.microsoft.com/office/powerpoint/2010/main" val="2369628912"/>
+      </p:ext>
+    </p:extLst>
+  </p:cSld>
+  <p:clrMapOvr>
+    <a:masterClrMapping/>
+  </p:clrMapOvr>
+</p:sld>
+</file>
+
+<file path=ppt/slides/slide21.xml><?xml version="1.0" encoding="utf-8"?>
+<p:sld xmlns:a="http://schemas.openxmlformats.org/drawingml/2006/main" xmlns:r="http://schemas.openxmlformats.org/officeDocument/2006/relationships" xmlns:p="http://schemas.openxmlformats.org/presentationml/2006/main">
+  <p:cSld>
+    <p:spTree>
+      <p:nvGrpSpPr>
+        <p:cNvPr id="1" name=""/>
+        <p:cNvGrpSpPr/>
+        <p:nvPr/>
+      </p:nvGrpSpPr>
+      <p:grpSpPr>
+        <a:xfrm>
+          <a:off x="0" y="0"/>
+          <a:ext cx="0" cy="0"/>
+          <a:chOff x="0" y="0"/>
+          <a:chExt cx="0" cy="0"/>
+        </a:xfrm>
+      </p:grpSpPr>
+      <p:sp>
+        <p:nvSpPr>
+          <p:cNvPr id="2" name="Title 1"/>
+          <p:cNvSpPr>
+            <a:spLocks noGrp="1"/>
+          </p:cNvSpPr>
+          <p:nvPr>
+            <p:ph type="title"/>
+          </p:nvPr>
+        </p:nvSpPr>
+        <p:spPr/>
+        <p:txBody>
+          <a:bodyPr/>
+          <a:lstStyle/>
+          <a:p>
+            <a:r>
+              <a:rPr lang="en-IE" dirty="0"/>
+              <a:t>Reports</a:t>
+            </a:r>
+          </a:p>
+        </p:txBody>
+      </p:sp>
+      <p:sp>
+        <p:nvSpPr>
+          <p:cNvPr id="3" name="Content Placeholder 2"/>
+          <p:cNvSpPr>
+            <a:spLocks noGrp="1"/>
+          </p:cNvSpPr>
+          <p:nvPr>
+            <p:ph idx="1"/>
+          </p:nvPr>
+        </p:nvSpPr>
+        <p:spPr/>
+        <p:txBody>
+          <a:bodyPr/>
+          <a:lstStyle/>
+          <a:p>
+            <a:r>
+              <a:rPr lang="en-IE" dirty="0"/>
+              <a:t>Accounts Overdue Report</a:t>
+            </a:r>
+          </a:p>
+          <a:p>
+            <a:r>
+              <a:rPr lang="en-IE" dirty="0"/>
+              <a:t>Employees Report</a:t>
+            </a:r>
+          </a:p>
+          <a:p>
+            <a:r>
+              <a:rPr lang="en-IE" dirty="0"/>
+              <a:t>Products Report</a:t>
+            </a:r>
+          </a:p>
+          <a:p>
+            <a:r>
+              <a:rPr lang="en-IE" dirty="0"/>
+              <a:t>Suggestion Report</a:t>
+            </a:r>
+          </a:p>
+          <a:p>
+            <a:r>
+              <a:rPr lang="en-IE" dirty="0"/>
+              <a:t>Suppliers Report</a:t>
+            </a:r>
+          </a:p>
+        </p:txBody>
+      </p:sp>
+    </p:spTree>
+    <p:extLst>
+      <p:ext uri="{BB962C8B-B14F-4D97-AF65-F5344CB8AC3E}">
+        <p14:creationId xmlns:p14="http://schemas.microsoft.com/office/powerpoint/2010/main" val="1421304600"/>
+      </p:ext>
+    </p:extLst>
+  </p:cSld>
+  <p:clrMapOvr>
+    <a:masterClrMapping/>
+  </p:clrMapOvr>
+</p:sld>
+</file>
+
+<file path=ppt/slides/slide22.xml><?xml version="1.0" encoding="utf-8"?>
+<p:sld xmlns:a="http://schemas.openxmlformats.org/drawingml/2006/main" xmlns:r="http://schemas.openxmlformats.org/officeDocument/2006/relationships" xmlns:p="http://schemas.openxmlformats.org/presentationml/2006/main">
+  <p:cSld>
+    <p:spTree>
+      <p:nvGrpSpPr>
+        <p:cNvPr id="1" name=""/>
+        <p:cNvGrpSpPr/>
+        <p:nvPr/>
+      </p:nvGrpSpPr>
+      <p:grpSpPr>
+        <a:xfrm>
+          <a:off x="0" y="0"/>
+          <a:ext cx="0" cy="0"/>
+          <a:chOff x="0" y="0"/>
+          <a:chExt cx="0" cy="0"/>
+        </a:xfrm>
+      </p:grpSpPr>
+      <p:sp>
+        <p:nvSpPr>
+          <p:cNvPr id="2" name="Title 1"/>
+          <p:cNvSpPr>
+            <a:spLocks noGrp="1"/>
+          </p:cNvSpPr>
+          <p:nvPr>
+            <p:ph type="title"/>
+          </p:nvPr>
+        </p:nvSpPr>
+        <p:spPr/>
+        <p:txBody>
+          <a:bodyPr/>
+          <a:lstStyle/>
+          <a:p>
+            <a:r>
+              <a:rPr lang="en-GB" dirty="0"/>
+              <a:t>UML chart</a:t>
+            </a:r>
+            <a:endParaRPr lang="en-US" dirty="0"/>
+          </a:p>
+        </p:txBody>
+      </p:sp>
+      <p:sp>
+        <p:nvSpPr>
+          <p:cNvPr id="3" name="Content Placeholder 2"/>
+          <p:cNvSpPr>
+            <a:spLocks noGrp="1"/>
+          </p:cNvSpPr>
+          <p:nvPr>
+            <p:ph idx="1"/>
+          </p:nvPr>
+        </p:nvSpPr>
+        <p:spPr/>
+        <p:txBody>
+          <a:bodyPr/>
+          <a:lstStyle/>
+          <a:p>
+            <a:r>
+              <a:rPr lang="en-US" dirty="0"/>
+              <a:t>Customers Table</a:t>
+            </a:r>
+          </a:p>
+          <a:p>
+            <a:r>
+              <a:rPr lang="en-US" dirty="0"/>
+              <a:t>Employees Table</a:t>
+            </a:r>
+          </a:p>
+          <a:p>
+            <a:r>
+              <a:rPr lang="en-US" dirty="0"/>
+              <a:t>Navigation Form</a:t>
+            </a:r>
+          </a:p>
+          <a:p>
+            <a:r>
+              <a:rPr lang="en-US" dirty="0"/>
+              <a:t>Products Table</a:t>
+            </a:r>
+          </a:p>
+          <a:p>
+            <a:r>
+              <a:rPr lang="en-US" dirty="0"/>
+              <a:t>Suggestions Table</a:t>
+            </a:r>
+          </a:p>
+          <a:p>
+            <a:r>
+              <a:rPr lang="en-US" dirty="0"/>
+              <a:t>Suppliers Table</a:t>
+            </a:r>
+          </a:p>
+          <a:p>
+            <a:pPr marL="0" indent="0">
+              <a:buNone/>
+            </a:pPr>
+            <a:endParaRPr lang="en-US" dirty="0"/>
+          </a:p>
+          <a:p>
+            <a:endParaRPr lang="en-US" dirty="0"/>
+          </a:p>
+        </p:txBody>
+      </p:sp>
+      <p:sp>
+        <p:nvSpPr>
+          <p:cNvPr id="4" name="TextBox 3"/>
+          <p:cNvSpPr txBox="1"/>
+          <p:nvPr/>
+        </p:nvSpPr>
+        <p:spPr>
+          <a:xfrm>
+            <a:off x="10323443" y="658574"/>
+            <a:ext cx="861392" cy="369332"/>
+          </a:xfrm>
+          <a:prstGeom prst="rect">
+            <a:avLst/>
+          </a:prstGeom>
+          <a:noFill/>
+        </p:spPr>
+        <p:txBody>
+          <a:bodyPr wrap="square" rtlCol="0">
+            <a:spAutoFit/>
+          </a:bodyPr>
+          <a:lstStyle/>
+          <a:p>
+            <a:r>
+              <a:rPr lang="en-GB" dirty="0"/>
+              <a:t>Grigor</a:t>
+            </a:r>
+          </a:p>
+        </p:txBody>
+      </p:sp>
+    </p:spTree>
+    <p:extLst>
+      <p:ext uri="{BB962C8B-B14F-4D97-AF65-F5344CB8AC3E}">
+        <p14:creationId xmlns:p14="http://schemas.microsoft.com/office/powerpoint/2010/main" val="1248061747"/>
+      </p:ext>
+    </p:extLst>
+  </p:cSld>
+  <p:clrMapOvr>
+    <a:masterClrMapping/>
+  </p:clrMapOvr>
+</p:sld>
+</file>
+
+<file path=ppt/slides/slide23.xml><?xml version="1.0" encoding="utf-8"?>
+<p:sld xmlns:a="http://schemas.openxmlformats.org/drawingml/2006/main" xmlns:r="http://schemas.openxmlformats.org/officeDocument/2006/relationships" xmlns:p="http://schemas.openxmlformats.org/presentationml/2006/main">
+  <p:cSld>
+    <p:spTree>
+      <p:nvGrpSpPr>
+        <p:cNvPr id="1" name=""/>
+        <p:cNvGrpSpPr/>
+        <p:nvPr/>
+      </p:nvGrpSpPr>
+      <p:grpSpPr>
+        <a:xfrm>
+          <a:off x="0" y="0"/>
+          <a:ext cx="0" cy="0"/>
+          <a:chOff x="0" y="0"/>
+          <a:chExt cx="0" cy="0"/>
+        </a:xfrm>
+      </p:grpSpPr>
+      <p:sp>
+        <p:nvSpPr>
+          <p:cNvPr id="2" name="Title 1"/>
+          <p:cNvSpPr>
+            <a:spLocks noGrp="1"/>
+          </p:cNvSpPr>
+          <p:nvPr>
+            <p:ph type="title"/>
+          </p:nvPr>
+        </p:nvSpPr>
+        <p:spPr/>
+        <p:txBody>
+          <a:bodyPr/>
+          <a:lstStyle/>
+          <a:p>
+            <a:r>
+              <a:rPr lang="en-IE" dirty="0"/>
+              <a:t>Customers Table</a:t>
+            </a:r>
+          </a:p>
+        </p:txBody>
+      </p:sp>
+      <p:pic>
+        <p:nvPicPr>
+          <p:cNvPr id="5" name="Content Placeholder 4"/>
+          <p:cNvPicPr>
+            <a:picLocks noGrp="1" noChangeAspect="1"/>
+          </p:cNvPicPr>
+          <p:nvPr>
+            <p:ph idx="1"/>
+          </p:nvPr>
+        </p:nvPicPr>
+        <p:blipFill>
+          <a:blip r:embed="rId2">
+            <a:extLst>
+              <a:ext uri="{28A0092B-C50C-407E-A947-70E740481C1C}">
+                <a14:useLocalDpi xmlns:a14="http://schemas.microsoft.com/office/drawing/2010/main" val="0"/>
+              </a:ext>
+            </a:extLst>
+          </a:blip>
+          <a:stretch>
+            <a:fillRect/>
+          </a:stretch>
+        </p:blipFill>
+        <p:spPr>
+          <a:xfrm>
+            <a:off x="4126312" y="1825625"/>
+            <a:ext cx="3939376" cy="4351338"/>
+          </a:xfrm>
+        </p:spPr>
+      </p:pic>
+    </p:spTree>
+    <p:extLst>
+      <p:ext uri="{BB962C8B-B14F-4D97-AF65-F5344CB8AC3E}">
+        <p14:creationId xmlns:p14="http://schemas.microsoft.com/office/powerpoint/2010/main" val="1212915720"/>
+      </p:ext>
+    </p:extLst>
+  </p:cSld>
+  <p:clrMapOvr>
+    <a:masterClrMapping/>
+  </p:clrMapOvr>
+</p:sld>
+</file>
+
+<file path=ppt/slides/slide24.xml><?xml version="1.0" encoding="utf-8"?>
+<p:sld xmlns:a="http://schemas.openxmlformats.org/drawingml/2006/main" xmlns:r="http://schemas.openxmlformats.org/officeDocument/2006/relationships" xmlns:p="http://schemas.openxmlformats.org/presentationml/2006/main">
+  <p:cSld>
+    <p:spTree>
+      <p:nvGrpSpPr>
+        <p:cNvPr id="1" name=""/>
+        <p:cNvGrpSpPr/>
+        <p:nvPr/>
+      </p:nvGrpSpPr>
+      <p:grpSpPr>
+        <a:xfrm>
+          <a:off x="0" y="0"/>
+          <a:ext cx="0" cy="0"/>
+          <a:chOff x="0" y="0"/>
+          <a:chExt cx="0" cy="0"/>
+        </a:xfrm>
+      </p:grpSpPr>
+      <p:sp>
+        <p:nvSpPr>
+          <p:cNvPr id="2" name="Title 1"/>
+          <p:cNvSpPr>
+            <a:spLocks noGrp="1"/>
+          </p:cNvSpPr>
+          <p:nvPr>
+            <p:ph type="title"/>
+          </p:nvPr>
+        </p:nvSpPr>
+        <p:spPr/>
+        <p:txBody>
+          <a:bodyPr/>
+          <a:lstStyle/>
+          <a:p>
+            <a:r>
+              <a:rPr lang="en-IE" dirty="0"/>
+              <a:t>Employees Table</a:t>
+            </a:r>
+          </a:p>
+        </p:txBody>
+      </p:sp>
+      <p:pic>
+        <p:nvPicPr>
+          <p:cNvPr id="5" name="Content Placeholder 4"/>
+          <p:cNvPicPr>
+            <a:picLocks noGrp="1" noChangeAspect="1"/>
+          </p:cNvPicPr>
+          <p:nvPr>
+            <p:ph idx="1"/>
+          </p:nvPr>
+        </p:nvPicPr>
+        <p:blipFill>
+          <a:blip r:embed="rId2">
+            <a:extLst>
+              <a:ext uri="{28A0092B-C50C-407E-A947-70E740481C1C}">
+                <a14:useLocalDpi xmlns:a14="http://schemas.microsoft.com/office/drawing/2010/main" val="0"/>
+              </a:ext>
+            </a:extLst>
+          </a:blip>
+          <a:stretch>
+            <a:fillRect/>
+          </a:stretch>
+        </p:blipFill>
+        <p:spPr>
+          <a:xfrm>
+            <a:off x="4082957" y="1825625"/>
+            <a:ext cx="4026086" cy="4351338"/>
+          </a:xfrm>
+        </p:spPr>
+      </p:pic>
+    </p:spTree>
+    <p:extLst>
+      <p:ext uri="{BB962C8B-B14F-4D97-AF65-F5344CB8AC3E}">
+        <p14:creationId xmlns:p14="http://schemas.microsoft.com/office/powerpoint/2010/main" val="1055208011"/>
+      </p:ext>
+    </p:extLst>
+  </p:cSld>
+  <p:clrMapOvr>
+    <a:masterClrMapping/>
+  </p:clrMapOvr>
+</p:sld>
+</file>
+
+<file path=ppt/slides/slide25.xml><?xml version="1.0" encoding="utf-8"?>
+<p:sld xmlns:a="http://schemas.openxmlformats.org/drawingml/2006/main" xmlns:r="http://schemas.openxmlformats.org/officeDocument/2006/relationships" xmlns:p="http://schemas.openxmlformats.org/presentationml/2006/main">
+  <p:cSld>
+    <p:spTree>
+      <p:nvGrpSpPr>
+        <p:cNvPr id="1" name=""/>
+        <p:cNvGrpSpPr/>
+        <p:nvPr/>
+      </p:nvGrpSpPr>
+      <p:grpSpPr>
+        <a:xfrm>
+          <a:off x="0" y="0"/>
+          <a:ext cx="0" cy="0"/>
+          <a:chOff x="0" y="0"/>
+          <a:chExt cx="0" cy="0"/>
+        </a:xfrm>
+      </p:grpSpPr>
+      <p:sp>
+        <p:nvSpPr>
+          <p:cNvPr id="2" name="Title 1"/>
+          <p:cNvSpPr>
+            <a:spLocks noGrp="1"/>
+          </p:cNvSpPr>
+          <p:nvPr>
+            <p:ph type="title"/>
+          </p:nvPr>
+        </p:nvSpPr>
+        <p:spPr/>
+        <p:txBody>
+          <a:bodyPr/>
+          <a:lstStyle/>
+          <a:p>
+            <a:r>
+              <a:rPr lang="en-IE" dirty="0"/>
+              <a:t>Navigation Form</a:t>
+            </a:r>
+          </a:p>
+        </p:txBody>
+      </p:sp>
+      <p:pic>
+        <p:nvPicPr>
+          <p:cNvPr id="5" name="Content Placeholder 4"/>
+          <p:cNvPicPr>
+            <a:picLocks noGrp="1" noChangeAspect="1"/>
+          </p:cNvPicPr>
+          <p:nvPr>
+            <p:ph idx="1"/>
+          </p:nvPr>
+        </p:nvPicPr>
+        <p:blipFill>
+          <a:blip r:embed="rId2">
+            <a:extLst>
+              <a:ext uri="{28A0092B-C50C-407E-A947-70E740481C1C}">
+                <a14:useLocalDpi xmlns:a14="http://schemas.microsoft.com/office/drawing/2010/main" val="0"/>
+              </a:ext>
+            </a:extLst>
+          </a:blip>
+          <a:stretch>
+            <a:fillRect/>
+          </a:stretch>
+        </p:blipFill>
+        <p:spPr>
+          <a:xfrm>
+            <a:off x="3909707" y="2010291"/>
+            <a:ext cx="4372585" cy="3982006"/>
+          </a:xfrm>
+        </p:spPr>
+      </p:pic>
+    </p:spTree>
+    <p:extLst>
+      <p:ext uri="{BB962C8B-B14F-4D97-AF65-F5344CB8AC3E}">
+        <p14:creationId xmlns:p14="http://schemas.microsoft.com/office/powerpoint/2010/main" val="201746166"/>
+      </p:ext>
+    </p:extLst>
+  </p:cSld>
+  <p:clrMapOvr>
+    <a:masterClrMapping/>
+  </p:clrMapOvr>
+</p:sld>
+</file>
+
+<file path=ppt/slides/slide26.xml><?xml version="1.0" encoding="utf-8"?>
+<p:sld xmlns:a="http://schemas.openxmlformats.org/drawingml/2006/main" xmlns:r="http://schemas.openxmlformats.org/officeDocument/2006/relationships" xmlns:p="http://schemas.openxmlformats.org/presentationml/2006/main">
+  <p:cSld>
+    <p:spTree>
+      <p:nvGrpSpPr>
+        <p:cNvPr id="1" name=""/>
+        <p:cNvGrpSpPr/>
+        <p:nvPr/>
+      </p:nvGrpSpPr>
+      <p:grpSpPr>
+        <a:xfrm>
+          <a:off x="0" y="0"/>
+          <a:ext cx="0" cy="0"/>
+          <a:chOff x="0" y="0"/>
+          <a:chExt cx="0" cy="0"/>
+        </a:xfrm>
+      </p:grpSpPr>
+      <p:sp>
+        <p:nvSpPr>
+          <p:cNvPr id="2" name="Title 1"/>
+          <p:cNvSpPr>
+            <a:spLocks noGrp="1"/>
+          </p:cNvSpPr>
+          <p:nvPr>
+            <p:ph type="title"/>
+          </p:nvPr>
+        </p:nvSpPr>
+        <p:spPr/>
+        <p:txBody>
+          <a:bodyPr/>
+          <a:lstStyle/>
+          <a:p>
+            <a:r>
+              <a:rPr lang="en-IE" dirty="0"/>
+              <a:t>Products Form</a:t>
+            </a:r>
+          </a:p>
+        </p:txBody>
+      </p:sp>
+      <p:pic>
+        <p:nvPicPr>
+          <p:cNvPr id="5" name="Content Placeholder 4"/>
+          <p:cNvPicPr>
+            <a:picLocks noGrp="1" noChangeAspect="1"/>
+          </p:cNvPicPr>
+          <p:nvPr>
+            <p:ph idx="1"/>
+          </p:nvPr>
+        </p:nvPicPr>
+        <p:blipFill>
+          <a:blip r:embed="rId2">
+            <a:extLst>
+              <a:ext uri="{28A0092B-C50C-407E-A947-70E740481C1C}">
+                <a14:useLocalDpi xmlns:a14="http://schemas.microsoft.com/office/drawing/2010/main" val="0"/>
+              </a:ext>
+            </a:extLst>
+          </a:blip>
+          <a:stretch>
+            <a:fillRect/>
+          </a:stretch>
+        </p:blipFill>
+        <p:spPr>
+          <a:xfrm>
+            <a:off x="4122819" y="1825625"/>
+            <a:ext cx="3946362" cy="4351338"/>
+          </a:xfrm>
+        </p:spPr>
+      </p:pic>
+    </p:spTree>
+    <p:extLst>
+      <p:ext uri="{BB962C8B-B14F-4D97-AF65-F5344CB8AC3E}">
+        <p14:creationId xmlns:p14="http://schemas.microsoft.com/office/powerpoint/2010/main" val="1389347980"/>
+      </p:ext>
+    </p:extLst>
+  </p:cSld>
+  <p:clrMapOvr>
+    <a:masterClrMapping/>
+  </p:clrMapOvr>
+</p:sld>
+</file>
+
+<file path=ppt/slides/slide27.xml><?xml version="1.0" encoding="utf-8"?>
+<p:sld xmlns:a="http://schemas.openxmlformats.org/drawingml/2006/main" xmlns:r="http://schemas.openxmlformats.org/officeDocument/2006/relationships" xmlns:p="http://schemas.openxmlformats.org/presentationml/2006/main">
+  <p:cSld>
+    <p:spTree>
+      <p:nvGrpSpPr>
+        <p:cNvPr id="1" name=""/>
+        <p:cNvGrpSpPr/>
+        <p:nvPr/>
+      </p:nvGrpSpPr>
+      <p:grpSpPr>
+        <a:xfrm>
+          <a:off x="0" y="0"/>
+          <a:ext cx="0" cy="0"/>
+          <a:chOff x="0" y="0"/>
+          <a:chExt cx="0" cy="0"/>
+        </a:xfrm>
+      </p:grpSpPr>
+      <p:sp>
+        <p:nvSpPr>
+          <p:cNvPr id="2" name="Title 1"/>
+          <p:cNvSpPr>
+            <a:spLocks noGrp="1"/>
+          </p:cNvSpPr>
+          <p:nvPr>
+            <p:ph type="title"/>
+          </p:nvPr>
+        </p:nvSpPr>
+        <p:spPr/>
+        <p:txBody>
+          <a:bodyPr/>
+          <a:lstStyle/>
+          <a:p>
+            <a:r>
+              <a:rPr lang="en-IE" dirty="0"/>
+              <a:t>Suggestion Table</a:t>
+            </a:r>
+          </a:p>
+        </p:txBody>
+      </p:sp>
+      <p:pic>
+        <p:nvPicPr>
+          <p:cNvPr id="5" name="Content Placeholder 4"/>
+          <p:cNvPicPr>
+            <a:picLocks noGrp="1" noChangeAspect="1"/>
+          </p:cNvPicPr>
+          <p:nvPr>
+            <p:ph idx="1"/>
+          </p:nvPr>
+        </p:nvPicPr>
+        <p:blipFill>
+          <a:blip r:embed="rId2">
+            <a:extLst>
+              <a:ext uri="{28A0092B-C50C-407E-A947-70E740481C1C}">
+                <a14:useLocalDpi xmlns:a14="http://schemas.microsoft.com/office/drawing/2010/main" val="0"/>
+              </a:ext>
+            </a:extLst>
+          </a:blip>
+          <a:stretch>
+            <a:fillRect/>
+          </a:stretch>
+        </p:blipFill>
+        <p:spPr>
+          <a:xfrm>
+            <a:off x="4095083" y="1825625"/>
+            <a:ext cx="4001833" cy="4351338"/>
+          </a:xfrm>
+        </p:spPr>
+      </p:pic>
+    </p:spTree>
+    <p:extLst>
+      <p:ext uri="{BB962C8B-B14F-4D97-AF65-F5344CB8AC3E}">
+        <p14:creationId xmlns:p14="http://schemas.microsoft.com/office/powerpoint/2010/main" val="2343058775"/>
+      </p:ext>
+    </p:extLst>
+  </p:cSld>
+  <p:clrMapOvr>
+    <a:masterClrMapping/>
+  </p:clrMapOvr>
+</p:sld>
+</file>
+
+<file path=ppt/slides/slide28.xml><?xml version="1.0" encoding="utf-8"?>
+<p:sld xmlns:a="http://schemas.openxmlformats.org/drawingml/2006/main" xmlns:r="http://schemas.openxmlformats.org/officeDocument/2006/relationships" xmlns:p="http://schemas.openxmlformats.org/presentationml/2006/main">
+  <p:cSld>
+    <p:spTree>
+      <p:nvGrpSpPr>
+        <p:cNvPr id="1" name=""/>
+        <p:cNvGrpSpPr/>
+        <p:nvPr/>
+      </p:nvGrpSpPr>
+      <p:grpSpPr>
+        <a:xfrm>
+          <a:off x="0" y="0"/>
+          <a:ext cx="0" cy="0"/>
+          <a:chOff x="0" y="0"/>
+          <a:chExt cx="0" cy="0"/>
+        </a:xfrm>
+      </p:grpSpPr>
+      <p:sp>
+        <p:nvSpPr>
+          <p:cNvPr id="2" name="Title 1"/>
+          <p:cNvSpPr>
+            <a:spLocks noGrp="1"/>
+          </p:cNvSpPr>
+          <p:nvPr>
+            <p:ph type="title"/>
+          </p:nvPr>
+        </p:nvSpPr>
+        <p:spPr/>
+        <p:txBody>
+          <a:bodyPr/>
+          <a:lstStyle/>
+          <a:p>
+            <a:r>
+              <a:rPr lang="en-IE" dirty="0"/>
+              <a:t>Suppliers Table</a:t>
+            </a:r>
+          </a:p>
+        </p:txBody>
+      </p:sp>
+      <p:pic>
+        <p:nvPicPr>
+          <p:cNvPr id="5" name="Content Placeholder 4"/>
+          <p:cNvPicPr>
+            <a:picLocks noGrp="1" noChangeAspect="1"/>
+          </p:cNvPicPr>
+          <p:nvPr>
+            <p:ph idx="1"/>
+          </p:nvPr>
+        </p:nvPicPr>
+        <p:blipFill>
+          <a:blip r:embed="rId2">
+            <a:extLst>
+              <a:ext uri="{28A0092B-C50C-407E-A947-70E740481C1C}">
+                <a14:useLocalDpi xmlns:a14="http://schemas.microsoft.com/office/drawing/2010/main" val="0"/>
+              </a:ext>
+            </a:extLst>
+          </a:blip>
+          <a:stretch>
+            <a:fillRect/>
+          </a:stretch>
+        </p:blipFill>
+        <p:spPr>
+          <a:xfrm>
+            <a:off x="4082957" y="1825625"/>
+            <a:ext cx="4026086" cy="4351338"/>
+          </a:xfrm>
+        </p:spPr>
+      </p:pic>
+    </p:spTree>
+    <p:extLst>
+      <p:ext uri="{BB962C8B-B14F-4D97-AF65-F5344CB8AC3E}">
+        <p14:creationId xmlns:p14="http://schemas.microsoft.com/office/powerpoint/2010/main" val="48437891"/>
+      </p:ext>
+    </p:extLst>
+  </p:cSld>
+  <p:clrMapOvr>
+    <a:masterClrMapping/>
+  </p:clrMapOvr>
+</p:sld>
+</file>
+
+<file path=ppt/slides/slide29.xml><?xml version="1.0" encoding="utf-8"?>
+<p:sld xmlns:a="http://schemas.openxmlformats.org/drawingml/2006/main" xmlns:r="http://schemas.openxmlformats.org/officeDocument/2006/relationships" xmlns:p="http://schemas.openxmlformats.org/presentationml/2006/main">
+  <p:cSld>
+    <p:spTree>
+      <p:nvGrpSpPr>
+        <p:cNvPr id="1" name=""/>
+        <p:cNvGrpSpPr/>
+        <p:nvPr/>
+      </p:nvGrpSpPr>
+      <p:grpSpPr>
+        <a:xfrm>
+          <a:off x="0" y="0"/>
+          <a:ext cx="0" cy="0"/>
+          <a:chOff x="0" y="0"/>
+          <a:chExt cx="0" cy="0"/>
+        </a:xfrm>
+      </p:grpSpPr>
+      <p:sp>
+        <p:nvSpPr>
+          <p:cNvPr id="2" name="Title 1"/>
+          <p:cNvSpPr>
+            <a:spLocks noGrp="1"/>
+          </p:cNvSpPr>
+          <p:nvPr>
+            <p:ph type="title"/>
+          </p:nvPr>
+        </p:nvSpPr>
+        <p:spPr/>
+        <p:txBody>
+          <a:bodyPr/>
+          <a:lstStyle/>
+          <a:p>
+            <a:r>
+              <a:rPr lang="en-GB" dirty="0"/>
+              <a:t>Website</a:t>
+            </a:r>
+            <a:endParaRPr lang="en-US" dirty="0"/>
+          </a:p>
+        </p:txBody>
+      </p:sp>
+      <p:sp>
+        <p:nvSpPr>
+          <p:cNvPr id="3" name="Content Placeholder 2"/>
+          <p:cNvSpPr>
+            <a:spLocks noGrp="1"/>
+          </p:cNvSpPr>
+          <p:nvPr>
+            <p:ph idx="1"/>
+          </p:nvPr>
+        </p:nvSpPr>
+        <p:spPr/>
+        <p:txBody>
+          <a:bodyPr/>
+          <a:lstStyle/>
+          <a:p>
+            <a:r>
+              <a:rPr lang="en-US" dirty="0"/>
+              <a:t>Here we will present to you the MCTV Limited Website </a:t>
+            </a:r>
+          </a:p>
+          <a:p>
+            <a:r>
+              <a:rPr lang="en-US" dirty="0"/>
+              <a:t>Which will feature a Home page and 4 individual pages about the workers in the shop </a:t>
+            </a:r>
+          </a:p>
+        </p:txBody>
+      </p:sp>
+      <p:sp>
+        <p:nvSpPr>
+          <p:cNvPr id="4" name="TextBox 3"/>
+          <p:cNvSpPr txBox="1"/>
+          <p:nvPr/>
+        </p:nvSpPr>
+        <p:spPr>
+          <a:xfrm>
+            <a:off x="10230678" y="658574"/>
+            <a:ext cx="954156" cy="369332"/>
+          </a:xfrm>
+          <a:prstGeom prst="rect">
+            <a:avLst/>
+          </a:prstGeom>
+          <a:noFill/>
+        </p:spPr>
+        <p:txBody>
+          <a:bodyPr wrap="square" rtlCol="0">
+            <a:spAutoFit/>
+          </a:bodyPr>
+          <a:lstStyle/>
+          <a:p>
+            <a:r>
+              <a:rPr lang="en-GB" dirty="0"/>
+              <a:t>Antonio</a:t>
+            </a:r>
+          </a:p>
+        </p:txBody>
+      </p:sp>
+    </p:spTree>
+    <p:extLst>
+      <p:ext uri="{BB962C8B-B14F-4D97-AF65-F5344CB8AC3E}">
+        <p14:creationId xmlns:p14="http://schemas.microsoft.com/office/powerpoint/2010/main" val="3123563747"/>
+      </p:ext>
+    </p:extLst>
+  </p:cSld>
+  <p:clrMapOvr>
+    <a:masterClrMapping/>
+  </p:clrMapOvr>
+</p:sld>
+</file>
+
+<file path=ppt/slides/slide3.xml><?xml version="1.0" encoding="utf-8"?>
+<p:sld xmlns:a="http://schemas.openxmlformats.org/drawingml/2006/main" xmlns:r="http://schemas.openxmlformats.org/officeDocument/2006/relationships" xmlns:p="http://schemas.openxmlformats.org/presentationml/2006/main">
+  <p:cSld>
+    <p:spTree>
+      <p:nvGrpSpPr>
+        <p:cNvPr id="1" name=""/>
+        <p:cNvGrpSpPr/>
+        <p:nvPr/>
+      </p:nvGrpSpPr>
+      <p:grpSpPr>
+        <a:xfrm>
+          <a:off x="0" y="0"/>
+          <a:ext cx="0" cy="0"/>
+          <a:chOff x="0" y="0"/>
+          <a:chExt cx="0" cy="0"/>
+        </a:xfrm>
+      </p:grpSpPr>
+      <p:sp>
+        <p:nvSpPr>
+          <p:cNvPr id="2" name="Title 1"/>
+          <p:cNvSpPr>
+            <a:spLocks noGrp="1"/>
+          </p:cNvSpPr>
+          <p:nvPr>
+            <p:ph type="title"/>
+          </p:nvPr>
+        </p:nvSpPr>
+        <p:spPr/>
+        <p:txBody>
+          <a:bodyPr/>
+          <a:lstStyle/>
+          <a:p>
+            <a:r>
+              <a:rPr lang="en-GB" dirty="0"/>
+              <a:t>Introduction to Company</a:t>
+            </a:r>
+            <a:endParaRPr lang="en-US" dirty="0"/>
+          </a:p>
+        </p:txBody>
+      </p:sp>
+      <p:sp>
+        <p:nvSpPr>
+          <p:cNvPr id="3" name="Content Placeholder 2"/>
+          <p:cNvSpPr>
+            <a:spLocks noGrp="1"/>
+          </p:cNvSpPr>
+          <p:nvPr>
+            <p:ph idx="1"/>
+          </p:nvPr>
+        </p:nvSpPr>
+        <p:spPr/>
+        <p:txBody>
+          <a:bodyPr/>
+          <a:lstStyle/>
+          <a:p>
+            <a:r>
+              <a:rPr lang="en-GB" dirty="0"/>
+              <a:t>With the headquarter in Dublin, company has been manufacturing TV since 1955</a:t>
+            </a:r>
+            <a:endParaRPr lang="en-US" dirty="0"/>
+          </a:p>
+          <a:p>
+            <a:r>
+              <a:rPr lang="en-GB" dirty="0"/>
+              <a:t>MCTV use only the highest quality components</a:t>
+            </a:r>
+          </a:p>
+          <a:p>
+            <a:r>
+              <a:rPr lang="en-GB" dirty="0"/>
+              <a:t>Supporting the local job market and grow local industries</a:t>
+            </a:r>
+          </a:p>
+          <a:p>
+            <a:pPr marL="0" indent="0">
+              <a:buNone/>
+            </a:pPr>
+            <a:endParaRPr lang="en-GB" dirty="0"/>
+          </a:p>
+        </p:txBody>
+      </p:sp>
+      <p:sp>
+        <p:nvSpPr>
+          <p:cNvPr id="4" name="TextBox 3"/>
+          <p:cNvSpPr txBox="1"/>
+          <p:nvPr/>
+        </p:nvSpPr>
+        <p:spPr>
+          <a:xfrm rot="1682298">
+            <a:off x="10357341" y="719476"/>
+            <a:ext cx="570990" cy="369332"/>
+          </a:xfrm>
+          <a:prstGeom prst="rect">
+            <a:avLst/>
+          </a:prstGeom>
+          <a:noFill/>
+        </p:spPr>
+        <p:txBody>
+          <a:bodyPr wrap="none" rtlCol="0">
+            <a:spAutoFit/>
+          </a:bodyPr>
+          <a:lstStyle/>
+          <a:p>
+            <a:pPr algn="ctr"/>
+            <a:r>
+              <a:rPr lang="en-US" dirty="0"/>
+              <a:t>Jack</a:t>
+            </a:r>
+          </a:p>
+        </p:txBody>
+      </p:sp>
+    </p:spTree>
+    <p:extLst>
+      <p:ext uri="{BB962C8B-B14F-4D97-AF65-F5344CB8AC3E}">
+        <p14:creationId xmlns:p14="http://schemas.microsoft.com/office/powerpoint/2010/main" val="2851753425"/>
+      </p:ext>
+    </p:extLst>
+  </p:cSld>
+  <p:clrMapOvr>
+    <a:masterClrMapping/>
+  </p:clrMapOvr>
+</p:sld>
+</file>
+
+<file path=ppt/slides/slide30.xml><?xml version="1.0" encoding="utf-8"?>
+<p:sld xmlns:a="http://schemas.openxmlformats.org/drawingml/2006/main" xmlns:r="http://schemas.openxmlformats.org/officeDocument/2006/relationships" xmlns:p="http://schemas.openxmlformats.org/presentationml/2006/main">
+  <p:cSld>
+    <p:spTree>
+      <p:nvGrpSpPr>
+        <p:cNvPr id="1" name=""/>
+        <p:cNvGrpSpPr/>
+        <p:nvPr/>
+      </p:nvGrpSpPr>
+      <p:grpSpPr>
+        <a:xfrm>
+          <a:off x="0" y="0"/>
+          <a:ext cx="0" cy="0"/>
+          <a:chOff x="0" y="0"/>
+          <a:chExt cx="0" cy="0"/>
+        </a:xfrm>
+      </p:grpSpPr>
+      <p:sp>
+        <p:nvSpPr>
+          <p:cNvPr id="2" name="Title 1"/>
+          <p:cNvSpPr>
+            <a:spLocks noGrp="1"/>
+          </p:cNvSpPr>
+          <p:nvPr>
+            <p:ph type="title"/>
+          </p:nvPr>
+        </p:nvSpPr>
+        <p:spPr/>
+        <p:txBody>
+          <a:bodyPr/>
+          <a:lstStyle/>
+          <a:p>
+            <a:r>
               <a:rPr lang="en-GB" dirty="0"/>
               <a:t>Conclusion</a:t>
             </a:r>
@@ -3898,7 +5601,7 @@
 </p:sld>
 </file>
 
-<file path=ppt/slides/slide15.xml><?xml version="1.0" encoding="utf-8"?>
+<file path=ppt/slides/slide31.xml><?xml version="1.0" encoding="utf-8"?>
 <p:sld xmlns:a="http://schemas.openxmlformats.org/drawingml/2006/main" xmlns:r="http://schemas.openxmlformats.org/officeDocument/2006/relationships" xmlns:p="http://schemas.openxmlformats.org/presentationml/2006/main">
   <p:cSld>
     <p:spTree>
@@ -4067,253 +5770,6 @@
     <p:extLst>
       <p:ext uri="{BB962C8B-B14F-4D97-AF65-F5344CB8AC3E}">
         <p14:creationId xmlns:p14="http://schemas.microsoft.com/office/powerpoint/2010/main" val="3349935074"/>
-      </p:ext>
-    </p:extLst>
-  </p:cSld>
-  <p:clrMapOvr>
-    <a:masterClrMapping/>
-  </p:clrMapOvr>
-</p:sld>
-</file>
-
-<file path=ppt/slides/slide2.xml><?xml version="1.0" encoding="utf-8"?>
-<p:sld xmlns:a="http://schemas.openxmlformats.org/drawingml/2006/main" xmlns:r="http://schemas.openxmlformats.org/officeDocument/2006/relationships" xmlns:p="http://schemas.openxmlformats.org/presentationml/2006/main">
-  <p:cSld>
-    <p:spTree>
-      <p:nvGrpSpPr>
-        <p:cNvPr id="1" name=""/>
-        <p:cNvGrpSpPr/>
-        <p:nvPr/>
-      </p:nvGrpSpPr>
-      <p:grpSpPr>
-        <a:xfrm>
-          <a:off x="0" y="0"/>
-          <a:ext cx="0" cy="0"/>
-          <a:chOff x="0" y="0"/>
-          <a:chExt cx="0" cy="0"/>
-        </a:xfrm>
-      </p:grpSpPr>
-      <p:sp>
-        <p:nvSpPr>
-          <p:cNvPr id="2" name="Title 1"/>
-          <p:cNvSpPr>
-            <a:spLocks noGrp="1"/>
-          </p:cNvSpPr>
-          <p:nvPr>
-            <p:ph type="title"/>
-          </p:nvPr>
-        </p:nvSpPr>
-        <p:spPr/>
-        <p:txBody>
-          <a:bodyPr/>
-          <a:lstStyle/>
-          <a:p>
-            <a:r>
-              <a:rPr lang="en-GB" dirty="0"/>
-              <a:t>Agenda</a:t>
-            </a:r>
-            <a:endParaRPr lang="en-US" dirty="0"/>
-          </a:p>
-        </p:txBody>
-      </p:sp>
-      <p:sp>
-        <p:nvSpPr>
-          <p:cNvPr id="3" name="Content Placeholder 2"/>
-          <p:cNvSpPr>
-            <a:spLocks noGrp="1"/>
-          </p:cNvSpPr>
-          <p:nvPr>
-            <p:ph idx="1"/>
-          </p:nvPr>
-        </p:nvSpPr>
-        <p:spPr/>
-        <p:txBody>
-          <a:bodyPr/>
-          <a:lstStyle/>
-          <a:p>
-            <a:r>
-              <a:rPr lang="en-GB" dirty="0"/>
-              <a:t>The purpose of this presentation was to explore the development of MCTV Limited. </a:t>
-            </a:r>
-          </a:p>
-          <a:p>
-            <a:r>
-              <a:rPr lang="en-GB" dirty="0"/>
-              <a:t>We as a group were given particular tasks in which we all had to take part in.</a:t>
-            </a:r>
-          </a:p>
-          <a:p>
-            <a:r>
-              <a:rPr lang="en-US" dirty="0"/>
-              <a:t>This presentation will feature a quick background MCTV Limited, the UML charts, Databases, the company Website and what holds for the future of MCTV Limited as the company grows.</a:t>
-            </a:r>
-          </a:p>
-          <a:p>
-            <a:endParaRPr lang="en-US" dirty="0"/>
-          </a:p>
-          <a:p>
-            <a:endParaRPr lang="en-US" dirty="0"/>
-          </a:p>
-        </p:txBody>
-      </p:sp>
-      <p:sp>
-        <p:nvSpPr>
-          <p:cNvPr id="4" name="TextBox 3"/>
-          <p:cNvSpPr txBox="1"/>
-          <p:nvPr/>
-        </p:nvSpPr>
-        <p:spPr>
-          <a:xfrm rot="1682298">
-            <a:off x="10357345" y="719476"/>
-            <a:ext cx="570990" cy="369332"/>
-          </a:xfrm>
-          <a:prstGeom prst="rect">
-            <a:avLst/>
-          </a:prstGeom>
-          <a:noFill/>
-        </p:spPr>
-        <p:txBody>
-          <a:bodyPr wrap="none" rtlCol="0">
-            <a:spAutoFit/>
-          </a:bodyPr>
-          <a:lstStyle/>
-          <a:p>
-            <a:pPr algn="ctr"/>
-            <a:r>
-              <a:rPr lang="en-US" dirty="0"/>
-              <a:t>Jack</a:t>
-            </a:r>
-          </a:p>
-        </p:txBody>
-      </p:sp>
-    </p:spTree>
-    <p:extLst>
-      <p:ext uri="{BB962C8B-B14F-4D97-AF65-F5344CB8AC3E}">
-        <p14:creationId xmlns:p14="http://schemas.microsoft.com/office/powerpoint/2010/main" val="3481843719"/>
-      </p:ext>
-    </p:extLst>
-  </p:cSld>
-  <p:clrMapOvr>
-    <a:masterClrMapping/>
-  </p:clrMapOvr>
-</p:sld>
-</file>
-
-<file path=ppt/slides/slide3.xml><?xml version="1.0" encoding="utf-8"?>
-<p:sld xmlns:a="http://schemas.openxmlformats.org/drawingml/2006/main" xmlns:r="http://schemas.openxmlformats.org/officeDocument/2006/relationships" xmlns:p="http://schemas.openxmlformats.org/presentationml/2006/main">
-  <p:cSld>
-    <p:spTree>
-      <p:nvGrpSpPr>
-        <p:cNvPr id="1" name=""/>
-        <p:cNvGrpSpPr/>
-        <p:nvPr/>
-      </p:nvGrpSpPr>
-      <p:grpSpPr>
-        <a:xfrm>
-          <a:off x="0" y="0"/>
-          <a:ext cx="0" cy="0"/>
-          <a:chOff x="0" y="0"/>
-          <a:chExt cx="0" cy="0"/>
-        </a:xfrm>
-      </p:grpSpPr>
-      <p:sp>
-        <p:nvSpPr>
-          <p:cNvPr id="2" name="Title 1"/>
-          <p:cNvSpPr>
-            <a:spLocks noGrp="1"/>
-          </p:cNvSpPr>
-          <p:nvPr>
-            <p:ph type="title"/>
-          </p:nvPr>
-        </p:nvSpPr>
-        <p:spPr/>
-        <p:txBody>
-          <a:bodyPr/>
-          <a:lstStyle/>
-          <a:p>
-            <a:r>
-              <a:rPr lang="en-GB" dirty="0"/>
-              <a:t>Introduction to Company</a:t>
-            </a:r>
-            <a:endParaRPr lang="en-US" dirty="0"/>
-          </a:p>
-        </p:txBody>
-      </p:sp>
-      <p:sp>
-        <p:nvSpPr>
-          <p:cNvPr id="3" name="Content Placeholder 2"/>
-          <p:cNvSpPr>
-            <a:spLocks noGrp="1"/>
-          </p:cNvSpPr>
-          <p:nvPr>
-            <p:ph idx="1"/>
-          </p:nvPr>
-        </p:nvSpPr>
-        <p:spPr/>
-        <p:txBody>
-          <a:bodyPr/>
-          <a:lstStyle/>
-          <a:p>
-            <a:r>
-              <a:rPr lang="en-GB" dirty="0"/>
-              <a:t>With the headquarter in Dublin, company has been manufacturing TV since 1955</a:t>
-            </a:r>
-            <a:endParaRPr lang="en-US" dirty="0"/>
-          </a:p>
-          <a:p>
-            <a:r>
-              <a:rPr lang="en-GB" dirty="0"/>
-              <a:t>MCTV use only the highest quality components</a:t>
-            </a:r>
-          </a:p>
-          <a:p>
-            <a:r>
-              <a:rPr lang="en-GB" dirty="0"/>
-              <a:t>Supporting the local job market and grow local industries</a:t>
-            </a:r>
-          </a:p>
-          <a:p>
-            <a:pPr marL="0" indent="0">
-              <a:buNone/>
-            </a:pPr>
-            <a:endParaRPr lang="en-GB" dirty="0"/>
-          </a:p>
-        </p:txBody>
-      </p:sp>
-      <p:sp>
-        <p:nvSpPr>
-          <p:cNvPr id="4" name="TextBox 3"/>
-          <p:cNvSpPr txBox="1"/>
-          <p:nvPr/>
-        </p:nvSpPr>
-        <p:spPr>
-          <a:xfrm rot="1682298">
-            <a:off x="10357341" y="719476"/>
-            <a:ext cx="570990" cy="369332"/>
-          </a:xfrm>
-          <a:prstGeom prst="rect">
-            <a:avLst/>
-          </a:prstGeom>
-          <a:noFill/>
-        </p:spPr>
-        <p:txBody>
-          <a:bodyPr wrap="none" rtlCol="0">
-            <a:spAutoFit/>
-          </a:bodyPr>
-          <a:lstStyle/>
-          <a:p>
-            <a:pPr algn="ctr"/>
-            <a:r>
-              <a:rPr lang="en-US" dirty="0"/>
-              <a:t>Jack</a:t>
-            </a:r>
-          </a:p>
-        </p:txBody>
-      </p:sp>
-    </p:spTree>
-    <p:extLst>
-      <p:ext uri="{BB962C8B-B14F-4D97-AF65-F5344CB8AC3E}">
-        <p14:creationId xmlns:p14="http://schemas.microsoft.com/office/powerpoint/2010/main" val="2851753425"/>
       </p:ext>
     </p:extLst>
   </p:cSld>

</xml_diff>

<commit_message>
Added names to slides
</commit_message>
<xml_diff>
--- a/MCTV Limited.pptx
+++ b/MCTV Limited.pptx
@@ -3455,14 +3455,14 @@
       </p:sp>
       <p:sp>
         <p:nvSpPr>
-          <p:cNvPr id="4" name="TextBox 3"/>
+          <p:cNvPr id="5" name="TextBox 4"/>
           <p:cNvSpPr txBox="1"/>
           <p:nvPr/>
         </p:nvSpPr>
         <p:spPr>
           <a:xfrm>
             <a:off x="10296939" y="658574"/>
-            <a:ext cx="821635" cy="369332"/>
+            <a:ext cx="874644" cy="369332"/>
           </a:xfrm>
           <a:prstGeom prst="rect">
             <a:avLst/>
@@ -3477,7 +3477,7 @@
           <a:p>
             <a:r>
               <a:rPr lang="en-GB" dirty="0"/>
-              <a:t>Grigor</a:t>
+              <a:t>Dylan</a:t>
             </a:r>
           </a:p>
         </p:txBody>
@@ -3573,7 +3573,45 @@
             </a:r>
           </a:p>
           <a:p>
+            <a:r>
+              <a:rPr lang="en-IE" dirty="0"/>
+              <a:t>Products Table</a:t>
+            </a:r>
+          </a:p>
+          <a:p>
             <a:endParaRPr lang="en-IE" dirty="0"/>
+          </a:p>
+          <a:p>
+            <a:endParaRPr lang="en-IE" dirty="0"/>
+          </a:p>
+        </p:txBody>
+      </p:sp>
+      <p:sp>
+        <p:nvSpPr>
+          <p:cNvPr id="4" name="TextBox 3"/>
+          <p:cNvSpPr txBox="1"/>
+          <p:nvPr/>
+        </p:nvSpPr>
+        <p:spPr>
+          <a:xfrm>
+            <a:off x="10296939" y="658574"/>
+            <a:ext cx="874644" cy="369332"/>
+          </a:xfrm>
+          <a:prstGeom prst="rect">
+            <a:avLst/>
+          </a:prstGeom>
+          <a:noFill/>
+        </p:spPr>
+        <p:txBody>
+          <a:bodyPr wrap="square" rtlCol="0">
+            <a:spAutoFit/>
+          </a:bodyPr>
+          <a:lstStyle/>
+          <a:p>
+            <a:r>
+              <a:rPr lang="en-GB" dirty="0"/>
+              <a:t>Dylan</a:t>
+            </a:r>
           </a:p>
         </p:txBody>
       </p:sp>
@@ -4823,6 +4861,35 @@
           </a:xfrm>
         </p:spPr>
       </p:pic>
+      <p:sp>
+        <p:nvSpPr>
+          <p:cNvPr id="4" name="TextBox 3"/>
+          <p:cNvSpPr txBox="1"/>
+          <p:nvPr/>
+        </p:nvSpPr>
+        <p:spPr>
+          <a:xfrm>
+            <a:off x="10323443" y="658574"/>
+            <a:ext cx="861392" cy="369332"/>
+          </a:xfrm>
+          <a:prstGeom prst="rect">
+            <a:avLst/>
+          </a:prstGeom>
+          <a:noFill/>
+        </p:spPr>
+        <p:txBody>
+          <a:bodyPr wrap="square" rtlCol="0">
+            <a:spAutoFit/>
+          </a:bodyPr>
+          <a:lstStyle/>
+          <a:p>
+            <a:r>
+              <a:rPr lang="en-GB" dirty="0"/>
+              <a:t>Grigor</a:t>
+            </a:r>
+          </a:p>
+        </p:txBody>
+      </p:sp>
     </p:spTree>
     <p:extLst>
       <p:ext uri="{BB962C8B-B14F-4D97-AF65-F5344CB8AC3E}">
@@ -4904,6 +4971,35 @@
           </a:xfrm>
         </p:spPr>
       </p:pic>
+      <p:sp>
+        <p:nvSpPr>
+          <p:cNvPr id="4" name="TextBox 3"/>
+          <p:cNvSpPr txBox="1"/>
+          <p:nvPr/>
+        </p:nvSpPr>
+        <p:spPr>
+          <a:xfrm>
+            <a:off x="10323443" y="658574"/>
+            <a:ext cx="861392" cy="369332"/>
+          </a:xfrm>
+          <a:prstGeom prst="rect">
+            <a:avLst/>
+          </a:prstGeom>
+          <a:noFill/>
+        </p:spPr>
+        <p:txBody>
+          <a:bodyPr wrap="square" rtlCol="0">
+            <a:spAutoFit/>
+          </a:bodyPr>
+          <a:lstStyle/>
+          <a:p>
+            <a:r>
+              <a:rPr lang="en-GB" dirty="0"/>
+              <a:t>Grigor</a:t>
+            </a:r>
+          </a:p>
+        </p:txBody>
+      </p:sp>
     </p:spTree>
     <p:extLst>
       <p:ext uri="{BB962C8B-B14F-4D97-AF65-F5344CB8AC3E}">
@@ -4985,6 +5081,35 @@
           </a:xfrm>
         </p:spPr>
       </p:pic>
+      <p:sp>
+        <p:nvSpPr>
+          <p:cNvPr id="4" name="TextBox 3"/>
+          <p:cNvSpPr txBox="1"/>
+          <p:nvPr/>
+        </p:nvSpPr>
+        <p:spPr>
+          <a:xfrm>
+            <a:off x="10323443" y="671826"/>
+            <a:ext cx="861392" cy="369332"/>
+          </a:xfrm>
+          <a:prstGeom prst="rect">
+            <a:avLst/>
+          </a:prstGeom>
+          <a:noFill/>
+        </p:spPr>
+        <p:txBody>
+          <a:bodyPr wrap="square" rtlCol="0">
+            <a:spAutoFit/>
+          </a:bodyPr>
+          <a:lstStyle/>
+          <a:p>
+            <a:r>
+              <a:rPr lang="en-GB" dirty="0"/>
+              <a:t>Grigor</a:t>
+            </a:r>
+          </a:p>
+        </p:txBody>
+      </p:sp>
     </p:spTree>
     <p:extLst>
       <p:ext uri="{BB962C8B-B14F-4D97-AF65-F5344CB8AC3E}">
@@ -5873,7 +5998,7 @@
           <a:p>
             <a:r>
               <a:rPr lang="en-GB" dirty="0"/>
-              <a:t>Dylan</a:t>
+              <a:t>Jack</a:t>
             </a:r>
           </a:p>
         </p:txBody>
@@ -6003,6 +6128,35 @@
           </a:prstGeom>
         </p:spPr>
       </p:pic>
+      <p:sp>
+        <p:nvSpPr>
+          <p:cNvPr id="5" name="TextBox 4"/>
+          <p:cNvSpPr txBox="1"/>
+          <p:nvPr/>
+        </p:nvSpPr>
+        <p:spPr>
+          <a:xfrm>
+            <a:off x="10296939" y="658574"/>
+            <a:ext cx="874644" cy="369332"/>
+          </a:xfrm>
+          <a:prstGeom prst="rect">
+            <a:avLst/>
+          </a:prstGeom>
+          <a:noFill/>
+        </p:spPr>
+        <p:txBody>
+          <a:bodyPr wrap="square" rtlCol="0">
+            <a:spAutoFit/>
+          </a:bodyPr>
+          <a:lstStyle/>
+          <a:p>
+            <a:r>
+              <a:rPr lang="en-GB" dirty="0"/>
+              <a:t>Jack</a:t>
+            </a:r>
+          </a:p>
+        </p:txBody>
+      </p:sp>
     </p:spTree>
     <p:extLst>
       <p:ext uri="{BB962C8B-B14F-4D97-AF65-F5344CB8AC3E}">
@@ -6104,6 +6258,35 @@
           </a:prstGeom>
         </p:spPr>
       </p:pic>
+      <p:sp>
+        <p:nvSpPr>
+          <p:cNvPr id="6" name="TextBox 5"/>
+          <p:cNvSpPr txBox="1"/>
+          <p:nvPr/>
+        </p:nvSpPr>
+        <p:spPr>
+          <a:xfrm>
+            <a:off x="10296939" y="658574"/>
+            <a:ext cx="874644" cy="369332"/>
+          </a:xfrm>
+          <a:prstGeom prst="rect">
+            <a:avLst/>
+          </a:prstGeom>
+          <a:noFill/>
+        </p:spPr>
+        <p:txBody>
+          <a:bodyPr wrap="square" rtlCol="0">
+            <a:spAutoFit/>
+          </a:bodyPr>
+          <a:lstStyle/>
+          <a:p>
+            <a:r>
+              <a:rPr lang="en-GB" dirty="0"/>
+              <a:t>Jack</a:t>
+            </a:r>
+          </a:p>
+        </p:txBody>
+      </p:sp>
     </p:spTree>
     <p:extLst>
       <p:ext uri="{BB962C8B-B14F-4D97-AF65-F5344CB8AC3E}">
@@ -6205,6 +6388,35 @@
           </a:prstGeom>
         </p:spPr>
       </p:pic>
+      <p:sp>
+        <p:nvSpPr>
+          <p:cNvPr id="5" name="TextBox 4"/>
+          <p:cNvSpPr txBox="1"/>
+          <p:nvPr/>
+        </p:nvSpPr>
+        <p:spPr>
+          <a:xfrm>
+            <a:off x="10296939" y="658574"/>
+            <a:ext cx="874644" cy="369332"/>
+          </a:xfrm>
+          <a:prstGeom prst="rect">
+            <a:avLst/>
+          </a:prstGeom>
+          <a:noFill/>
+        </p:spPr>
+        <p:txBody>
+          <a:bodyPr wrap="square" rtlCol="0">
+            <a:spAutoFit/>
+          </a:bodyPr>
+          <a:lstStyle/>
+          <a:p>
+            <a:r>
+              <a:rPr lang="en-GB" dirty="0"/>
+              <a:t>Jack</a:t>
+            </a:r>
+          </a:p>
+        </p:txBody>
+      </p:sp>
     </p:spTree>
     <p:extLst>
       <p:ext uri="{BB962C8B-B14F-4D97-AF65-F5344CB8AC3E}">
@@ -6305,19 +6517,19 @@
           <a:p>
             <a:r>
               <a:rPr lang="en-US" dirty="0"/>
-              <a:t>Jack Gallaher-Agenda, Gantt chart, Conclusion, Last slide,</a:t>
+              <a:t>Jack Gallaher-Agenda, Gantt chart, Conclusion, Last slide</a:t>
             </a:r>
           </a:p>
           <a:p>
             <a:r>
               <a:rPr lang="en-US" dirty="0"/>
-              <a:t>Grigor Daunt-UML charts, Website</a:t>
+              <a:t>Grigor Daunt-UML charts, Databases</a:t>
             </a:r>
           </a:p>
           <a:p>
             <a:r>
               <a:rPr lang="en-US" dirty="0"/>
-              <a:t>Dylan Gilroy-Databases, individual Tasks</a:t>
+              <a:t>Dylan Gilroy-individual Tasks, Website</a:t>
             </a:r>
           </a:p>
         </p:txBody>
@@ -6432,6 +6644,35 @@
           </a:xfrm>
         </p:spPr>
       </p:pic>
+      <p:sp>
+        <p:nvSpPr>
+          <p:cNvPr id="4" name="TextBox 3"/>
+          <p:cNvSpPr txBox="1"/>
+          <p:nvPr/>
+        </p:nvSpPr>
+        <p:spPr>
+          <a:xfrm>
+            <a:off x="10296939" y="658574"/>
+            <a:ext cx="874644" cy="369332"/>
+          </a:xfrm>
+          <a:prstGeom prst="rect">
+            <a:avLst/>
+          </a:prstGeom>
+          <a:noFill/>
+        </p:spPr>
+        <p:txBody>
+          <a:bodyPr wrap="square" rtlCol="0">
+            <a:spAutoFit/>
+          </a:bodyPr>
+          <a:lstStyle/>
+          <a:p>
+            <a:r>
+              <a:rPr lang="en-GB" dirty="0"/>
+              <a:t>Dylan</a:t>
+            </a:r>
+          </a:p>
+        </p:txBody>
+      </p:sp>
     </p:spTree>
     <p:extLst>
       <p:ext uri="{BB962C8B-B14F-4D97-AF65-F5344CB8AC3E}">

</xml_diff>

<commit_message>
Added User guide information
</commit_message>
<xml_diff>
--- a/MCTV Limited.pptx
+++ b/MCTV Limited.pptx
@@ -12,30 +12,31 @@
     <p:sldId id="266" r:id="rId6"/>
     <p:sldId id="267" r:id="rId7"/>
     <p:sldId id="268" r:id="rId8"/>
-    <p:sldId id="260" r:id="rId9"/>
-    <p:sldId id="280" r:id="rId10"/>
-    <p:sldId id="261" r:id="rId11"/>
-    <p:sldId id="270" r:id="rId12"/>
-    <p:sldId id="271" r:id="rId13"/>
-    <p:sldId id="272" r:id="rId14"/>
-    <p:sldId id="274" r:id="rId15"/>
-    <p:sldId id="275" r:id="rId16"/>
-    <p:sldId id="276" r:id="rId17"/>
-    <p:sldId id="277" r:id="rId18"/>
-    <p:sldId id="278" r:id="rId19"/>
-    <p:sldId id="279" r:id="rId20"/>
-    <p:sldId id="281" r:id="rId21"/>
-    <p:sldId id="273" r:id="rId22"/>
-    <p:sldId id="262" r:id="rId23"/>
-    <p:sldId id="282" r:id="rId24"/>
-    <p:sldId id="283" r:id="rId25"/>
-    <p:sldId id="284" r:id="rId26"/>
-    <p:sldId id="285" r:id="rId27"/>
-    <p:sldId id="286" r:id="rId28"/>
-    <p:sldId id="287" r:id="rId29"/>
-    <p:sldId id="263" r:id="rId30"/>
-    <p:sldId id="264" r:id="rId31"/>
-    <p:sldId id="265" r:id="rId32"/>
+    <p:sldId id="288" r:id="rId9"/>
+    <p:sldId id="260" r:id="rId10"/>
+    <p:sldId id="280" r:id="rId11"/>
+    <p:sldId id="261" r:id="rId12"/>
+    <p:sldId id="270" r:id="rId13"/>
+    <p:sldId id="271" r:id="rId14"/>
+    <p:sldId id="272" r:id="rId15"/>
+    <p:sldId id="274" r:id="rId16"/>
+    <p:sldId id="275" r:id="rId17"/>
+    <p:sldId id="276" r:id="rId18"/>
+    <p:sldId id="277" r:id="rId19"/>
+    <p:sldId id="278" r:id="rId20"/>
+    <p:sldId id="279" r:id="rId21"/>
+    <p:sldId id="281" r:id="rId22"/>
+    <p:sldId id="273" r:id="rId23"/>
+    <p:sldId id="262" r:id="rId24"/>
+    <p:sldId id="282" r:id="rId25"/>
+    <p:sldId id="283" r:id="rId26"/>
+    <p:sldId id="284" r:id="rId27"/>
+    <p:sldId id="285" r:id="rId28"/>
+    <p:sldId id="286" r:id="rId29"/>
+    <p:sldId id="287" r:id="rId30"/>
+    <p:sldId id="263" r:id="rId31"/>
+    <p:sldId id="264" r:id="rId32"/>
+    <p:sldId id="265" r:id="rId33"/>
   </p:sldIdLst>
   <p:sldSz cx="12192000" cy="6858000"/>
   <p:notesSz cx="6858000" cy="9144000"/>
@@ -271,7 +272,7 @@
           <a:p>
             <a:fld id="{D42128AE-EDC0-49A1-B42D-4FCD81EA54AB}" type="datetimeFigureOut">
               <a:rPr lang="en-US" smtClean="0"/>
-              <a:t>4/16/2017</a:t>
+              <a:t>4/17/2017</a:t>
             </a:fld>
             <a:endParaRPr lang="en-US"/>
           </a:p>
@@ -439,7 +440,7 @@
           <a:p>
             <a:fld id="{D42128AE-EDC0-49A1-B42D-4FCD81EA54AB}" type="datetimeFigureOut">
               <a:rPr lang="en-US" smtClean="0"/>
-              <a:t>4/16/2017</a:t>
+              <a:t>4/17/2017</a:t>
             </a:fld>
             <a:endParaRPr lang="en-US"/>
           </a:p>
@@ -617,7 +618,7 @@
           <a:p>
             <a:fld id="{D42128AE-EDC0-49A1-B42D-4FCD81EA54AB}" type="datetimeFigureOut">
               <a:rPr lang="en-US" smtClean="0"/>
-              <a:t>4/16/2017</a:t>
+              <a:t>4/17/2017</a:t>
             </a:fld>
             <a:endParaRPr lang="en-US"/>
           </a:p>
@@ -785,7 +786,7 @@
           <a:p>
             <a:fld id="{D42128AE-EDC0-49A1-B42D-4FCD81EA54AB}" type="datetimeFigureOut">
               <a:rPr lang="en-US" smtClean="0"/>
-              <a:t>4/16/2017</a:t>
+              <a:t>4/17/2017</a:t>
             </a:fld>
             <a:endParaRPr lang="en-US"/>
           </a:p>
@@ -1030,7 +1031,7 @@
           <a:p>
             <a:fld id="{D42128AE-EDC0-49A1-B42D-4FCD81EA54AB}" type="datetimeFigureOut">
               <a:rPr lang="en-US" smtClean="0"/>
-              <a:t>4/16/2017</a:t>
+              <a:t>4/17/2017</a:t>
             </a:fld>
             <a:endParaRPr lang="en-US"/>
           </a:p>
@@ -1259,7 +1260,7 @@
           <a:p>
             <a:fld id="{D42128AE-EDC0-49A1-B42D-4FCD81EA54AB}" type="datetimeFigureOut">
               <a:rPr lang="en-US" smtClean="0"/>
-              <a:t>4/16/2017</a:t>
+              <a:t>4/17/2017</a:t>
             </a:fld>
             <a:endParaRPr lang="en-US"/>
           </a:p>
@@ -1623,7 +1624,7 @@
           <a:p>
             <a:fld id="{D42128AE-EDC0-49A1-B42D-4FCD81EA54AB}" type="datetimeFigureOut">
               <a:rPr lang="en-US" smtClean="0"/>
-              <a:t>4/16/2017</a:t>
+              <a:t>4/17/2017</a:t>
             </a:fld>
             <a:endParaRPr lang="en-US"/>
           </a:p>
@@ -1740,7 +1741,7 @@
           <a:p>
             <a:fld id="{D42128AE-EDC0-49A1-B42D-4FCD81EA54AB}" type="datetimeFigureOut">
               <a:rPr lang="en-US" smtClean="0"/>
-              <a:t>4/16/2017</a:t>
+              <a:t>4/17/2017</a:t>
             </a:fld>
             <a:endParaRPr lang="en-US"/>
           </a:p>
@@ -1835,7 +1836,7 @@
           <a:p>
             <a:fld id="{D42128AE-EDC0-49A1-B42D-4FCD81EA54AB}" type="datetimeFigureOut">
               <a:rPr lang="en-US" smtClean="0"/>
-              <a:t>4/16/2017</a:t>
+              <a:t>4/17/2017</a:t>
             </a:fld>
             <a:endParaRPr lang="en-US"/>
           </a:p>
@@ -2110,7 +2111,7 @@
           <a:p>
             <a:fld id="{D42128AE-EDC0-49A1-B42D-4FCD81EA54AB}" type="datetimeFigureOut">
               <a:rPr lang="en-US" smtClean="0"/>
-              <a:t>4/16/2017</a:t>
+              <a:t>4/17/2017</a:t>
             </a:fld>
             <a:endParaRPr lang="en-US"/>
           </a:p>
@@ -2362,7 +2363,7 @@
           <a:p>
             <a:fld id="{D42128AE-EDC0-49A1-B42D-4FCD81EA54AB}" type="datetimeFigureOut">
               <a:rPr lang="en-US" smtClean="0"/>
-              <a:t>4/16/2017</a:t>
+              <a:t>4/17/2017</a:t>
             </a:fld>
             <a:endParaRPr lang="en-US"/>
           </a:p>
@@ -2573,7 +2574,7 @@
           <a:p>
             <a:fld id="{D42128AE-EDC0-49A1-B42D-4FCD81EA54AB}" type="datetimeFigureOut">
               <a:rPr lang="en-US" smtClean="0"/>
-              <a:t>4/16/2017</a:t>
+              <a:t>4/17/2017</a:t>
             </a:fld>
             <a:endParaRPr lang="en-US"/>
           </a:p>
@@ -3388,74 +3389,44 @@
           <a:lstStyle/>
           <a:p>
             <a:r>
-              <a:rPr lang="en-GB" dirty="0"/>
-              <a:t>Databases</a:t>
-            </a:r>
-            <a:endParaRPr lang="en-US" dirty="0"/>
-          </a:p>
-        </p:txBody>
-      </p:sp>
-      <p:sp>
-        <p:nvSpPr>
-          <p:cNvPr id="3" name="Content Placeholder 2"/>
-          <p:cNvSpPr>
-            <a:spLocks noGrp="1"/>
-          </p:cNvSpPr>
+              <a:rPr lang="en-IE" dirty="0"/>
+              <a:t>MCTV Limited</a:t>
+            </a:r>
+          </a:p>
+        </p:txBody>
+      </p:sp>
+      <p:pic>
+        <p:nvPicPr>
+          <p:cNvPr id="5" name="Content Placeholder 4"/>
+          <p:cNvPicPr>
+            <a:picLocks noGrp="1" noChangeAspect="1"/>
+          </p:cNvPicPr>
           <p:nvPr>
             <p:ph idx="1"/>
           </p:nvPr>
-        </p:nvSpPr>
-        <p:spPr/>
-        <p:txBody>
-          <a:bodyPr/>
-          <a:lstStyle/>
-          <a:p>
-            <a:r>
-              <a:rPr lang="en-US" dirty="0"/>
-              <a:t>Tables</a:t>
-            </a:r>
-          </a:p>
-          <a:p>
-            <a:r>
-              <a:rPr lang="en-US" dirty="0"/>
-              <a:t>Queries</a:t>
-            </a:r>
-          </a:p>
-          <a:p>
-            <a:r>
-              <a:rPr lang="en-US" dirty="0"/>
-              <a:t>Forms</a:t>
-            </a:r>
-          </a:p>
-          <a:p>
-            <a:r>
-              <a:rPr lang="en-US" dirty="0"/>
-              <a:t>Reports</a:t>
-            </a:r>
-          </a:p>
-          <a:p>
-            <a:r>
-              <a:rPr lang="en-US" dirty="0"/>
-              <a:t>Macros</a:t>
-            </a:r>
-          </a:p>
-          <a:p>
-            <a:pPr marL="0" indent="0">
-              <a:buNone/>
-            </a:pPr>
-            <a:endParaRPr lang="en-US" dirty="0"/>
-          </a:p>
-          <a:p>
-            <a:endParaRPr lang="en-US" dirty="0"/>
-          </a:p>
-          <a:p>
-            <a:endParaRPr lang="en-US" dirty="0"/>
-          </a:p>
-        </p:txBody>
-      </p:sp>
-      <p:sp>
-        <p:nvSpPr>
-          <p:cNvPr id="5" name="TextBox 4"/>
+        </p:nvPicPr>
+        <p:blipFill>
+          <a:blip r:embed="rId2">
+            <a:extLst>
+              <a:ext uri="{28A0092B-C50C-407E-A947-70E740481C1C}">
+                <a14:useLocalDpi xmlns:a14="http://schemas.microsoft.com/office/drawing/2010/main" val="0"/>
+              </a:ext>
+            </a:extLst>
+          </a:blip>
+          <a:stretch>
+            <a:fillRect/>
+          </a:stretch>
+        </p:blipFill>
+        <p:spPr>
+          <a:xfrm>
+            <a:off x="1671854" y="1825625"/>
+            <a:ext cx="8848292" cy="4351338"/>
+          </a:xfrm>
+        </p:spPr>
+      </p:pic>
+      <p:sp>
+        <p:nvSpPr>
+          <p:cNvPr id="4" name="TextBox 3"/>
           <p:cNvSpPr txBox="1"/>
           <p:nvPr/>
         </p:nvSpPr>
@@ -3485,7 +3456,7 @@
     </p:spTree>
     <p:extLst>
       <p:ext uri="{BB962C8B-B14F-4D97-AF65-F5344CB8AC3E}">
-        <p14:creationId xmlns:p14="http://schemas.microsoft.com/office/powerpoint/2010/main" val="1808812414"/>
+        <p14:creationId xmlns:p14="http://schemas.microsoft.com/office/powerpoint/2010/main" val="4147242706"/>
       </p:ext>
     </p:extLst>
   </p:cSld>
@@ -3528,67 +3499,74 @@
           <a:lstStyle/>
           <a:p>
             <a:r>
-              <a:rPr lang="en-IE" dirty="0"/>
+              <a:rPr lang="en-GB" dirty="0"/>
+              <a:t>Databases</a:t>
+            </a:r>
+            <a:endParaRPr lang="en-US" dirty="0"/>
+          </a:p>
+        </p:txBody>
+      </p:sp>
+      <p:sp>
+        <p:nvSpPr>
+          <p:cNvPr id="3" name="Content Placeholder 2"/>
+          <p:cNvSpPr>
+            <a:spLocks noGrp="1"/>
+          </p:cNvSpPr>
+          <p:nvPr>
+            <p:ph idx="1"/>
+          </p:nvPr>
+        </p:nvSpPr>
+        <p:spPr/>
+        <p:txBody>
+          <a:bodyPr/>
+          <a:lstStyle/>
+          <a:p>
+            <a:r>
+              <a:rPr lang="en-US" dirty="0"/>
               <a:t>Tables</a:t>
             </a:r>
           </a:p>
-        </p:txBody>
-      </p:sp>
-      <p:sp>
-        <p:nvSpPr>
-          <p:cNvPr id="3" name="Content Placeholder 2"/>
-          <p:cNvSpPr>
-            <a:spLocks noGrp="1"/>
-          </p:cNvSpPr>
-          <p:nvPr>
-            <p:ph idx="1"/>
-          </p:nvPr>
-        </p:nvSpPr>
-        <p:spPr/>
-        <p:txBody>
-          <a:bodyPr/>
-          <a:lstStyle/>
-          <a:p>
-            <a:r>
-              <a:rPr lang="en-IE" dirty="0"/>
-              <a:t>Customers Table</a:t>
-            </a:r>
-          </a:p>
-          <a:p>
-            <a:r>
-              <a:rPr lang="en-IE" dirty="0"/>
-              <a:t>Employees Table</a:t>
-            </a:r>
-          </a:p>
-          <a:p>
-            <a:r>
-              <a:rPr lang="en-IE" dirty="0"/>
-              <a:t>Suggestion Table</a:t>
-            </a:r>
-          </a:p>
-          <a:p>
-            <a:r>
-              <a:rPr lang="en-IE" dirty="0"/>
-              <a:t>Suppliers Table</a:t>
-            </a:r>
-          </a:p>
-          <a:p>
-            <a:r>
-              <a:rPr lang="en-IE" dirty="0"/>
-              <a:t>Products Table</a:t>
-            </a:r>
-          </a:p>
-          <a:p>
-            <a:endParaRPr lang="en-IE" dirty="0"/>
-          </a:p>
-          <a:p>
-            <a:endParaRPr lang="en-IE" dirty="0"/>
-          </a:p>
-        </p:txBody>
-      </p:sp>
-      <p:sp>
-        <p:nvSpPr>
-          <p:cNvPr id="4" name="TextBox 3"/>
+          <a:p>
+            <a:r>
+              <a:rPr lang="en-US" dirty="0"/>
+              <a:t>Queries</a:t>
+            </a:r>
+          </a:p>
+          <a:p>
+            <a:r>
+              <a:rPr lang="en-US" dirty="0"/>
+              <a:t>Forms</a:t>
+            </a:r>
+          </a:p>
+          <a:p>
+            <a:r>
+              <a:rPr lang="en-US" dirty="0"/>
+              <a:t>Reports</a:t>
+            </a:r>
+          </a:p>
+          <a:p>
+            <a:r>
+              <a:rPr lang="en-US" dirty="0"/>
+              <a:t>Macros</a:t>
+            </a:r>
+          </a:p>
+          <a:p>
+            <a:pPr marL="0" indent="0">
+              <a:buNone/>
+            </a:pPr>
+            <a:endParaRPr lang="en-US" dirty="0"/>
+          </a:p>
+          <a:p>
+            <a:endParaRPr lang="en-US" dirty="0"/>
+          </a:p>
+          <a:p>
+            <a:endParaRPr lang="en-US" dirty="0"/>
+          </a:p>
+        </p:txBody>
+      </p:sp>
+      <p:sp>
+        <p:nvSpPr>
+          <p:cNvPr id="5" name="TextBox 4"/>
           <p:cNvSpPr txBox="1"/>
           <p:nvPr/>
         </p:nvSpPr>
@@ -3618,7 +3596,7 @@
     </p:spTree>
     <p:extLst>
       <p:ext uri="{BB962C8B-B14F-4D97-AF65-F5344CB8AC3E}">
-        <p14:creationId xmlns:p14="http://schemas.microsoft.com/office/powerpoint/2010/main" val="3133288830"/>
+        <p14:creationId xmlns:p14="http://schemas.microsoft.com/office/powerpoint/2010/main" val="1808812414"/>
       </p:ext>
     </p:extLst>
   </p:cSld>
@@ -3662,7 +3640,7 @@
           <a:p>
             <a:r>
               <a:rPr lang="en-IE" dirty="0"/>
-              <a:t>Queries</a:t>
+              <a:t>Tables</a:t>
             </a:r>
           </a:p>
         </p:txBody>
@@ -3679,62 +3657,71 @@
         </p:nvSpPr>
         <p:spPr/>
         <p:txBody>
-          <a:bodyPr>
-            <a:normAutofit lnSpcReduction="10000"/>
+          <a:bodyPr/>
+          <a:lstStyle/>
+          <a:p>
+            <a:r>
+              <a:rPr lang="en-IE" dirty="0"/>
+              <a:t>Customers Table</a:t>
+            </a:r>
+          </a:p>
+          <a:p>
+            <a:r>
+              <a:rPr lang="en-IE" dirty="0"/>
+              <a:t>Employees Table</a:t>
+            </a:r>
+          </a:p>
+          <a:p>
+            <a:r>
+              <a:rPr lang="en-IE" dirty="0"/>
+              <a:t>Suggestion Table</a:t>
+            </a:r>
+          </a:p>
+          <a:p>
+            <a:r>
+              <a:rPr lang="en-IE" dirty="0"/>
+              <a:t>Suppliers Table</a:t>
+            </a:r>
+          </a:p>
+          <a:p>
+            <a:r>
+              <a:rPr lang="en-IE" dirty="0"/>
+              <a:t>Products Table</a:t>
+            </a:r>
+          </a:p>
+          <a:p>
+            <a:endParaRPr lang="en-IE" dirty="0"/>
+          </a:p>
+          <a:p>
+            <a:endParaRPr lang="en-IE" dirty="0"/>
+          </a:p>
+        </p:txBody>
+      </p:sp>
+      <p:sp>
+        <p:nvSpPr>
+          <p:cNvPr id="4" name="TextBox 3"/>
+          <p:cNvSpPr txBox="1"/>
+          <p:nvPr/>
+        </p:nvSpPr>
+        <p:spPr>
+          <a:xfrm>
+            <a:off x="10296939" y="658574"/>
+            <a:ext cx="874644" cy="369332"/>
+          </a:xfrm>
+          <a:prstGeom prst="rect">
+            <a:avLst/>
+          </a:prstGeom>
+          <a:noFill/>
+        </p:spPr>
+        <p:txBody>
+          <a:bodyPr wrap="square" rtlCol="0">
+            <a:spAutoFit/>
           </a:bodyPr>
           <a:lstStyle/>
           <a:p>
             <a:r>
-              <a:rPr lang="en-IE" dirty="0"/>
-              <a:t>Customers from Dublin</a:t>
-            </a:r>
-          </a:p>
-          <a:p>
-            <a:r>
-              <a:rPr lang="en-IE" dirty="0"/>
-              <a:t>Employees with Medical Card</a:t>
-            </a:r>
-          </a:p>
-          <a:p>
-            <a:r>
-              <a:rPr lang="en-IE" dirty="0"/>
-              <a:t>Products (bills) not paid</a:t>
-            </a:r>
-          </a:p>
-          <a:p>
-            <a:r>
-              <a:rPr lang="en-IE" dirty="0"/>
-              <a:t>Orders by year 2016</a:t>
-            </a:r>
-          </a:p>
-          <a:p>
-            <a:r>
-              <a:rPr lang="en-IE" dirty="0"/>
-              <a:t>Orders by year 2017</a:t>
-            </a:r>
-          </a:p>
-          <a:p>
-            <a:r>
-              <a:rPr lang="en-IE" dirty="0"/>
-              <a:t>Out of Stock</a:t>
-            </a:r>
-          </a:p>
-          <a:p>
-            <a:r>
-              <a:rPr lang="en-IE" dirty="0"/>
-              <a:t>Products with Stock Value more than €4000</a:t>
-            </a:r>
-          </a:p>
-          <a:p>
-            <a:r>
-              <a:rPr lang="en-IE" dirty="0"/>
-              <a:t>Suggestion Query</a:t>
-            </a:r>
-          </a:p>
-          <a:p>
-            <a:r>
-              <a:rPr lang="en-IE" dirty="0"/>
-              <a:t>Suppliers Query</a:t>
+              <a:rPr lang="en-GB" dirty="0"/>
+              <a:t>Dylan</a:t>
             </a:r>
           </a:p>
         </p:txBody>
@@ -3742,7 +3729,7 @@
     </p:spTree>
     <p:extLst>
       <p:ext uri="{BB962C8B-B14F-4D97-AF65-F5344CB8AC3E}">
-        <p14:creationId xmlns:p14="http://schemas.microsoft.com/office/powerpoint/2010/main" val="2846560183"/>
+        <p14:creationId xmlns:p14="http://schemas.microsoft.com/office/powerpoint/2010/main" val="3133288830"/>
       </p:ext>
     </p:extLst>
   </p:cSld>
@@ -3786,7 +3773,7 @@
           <a:p>
             <a:r>
               <a:rPr lang="en-IE" dirty="0"/>
-              <a:t>Forms</a:t>
+              <a:t>Queries</a:t>
             </a:r>
           </a:p>
         </p:txBody>
@@ -3803,48 +3790,91 @@
         </p:nvSpPr>
         <p:spPr/>
         <p:txBody>
-          <a:bodyPr/>
+          <a:bodyPr>
+            <a:normAutofit lnSpcReduction="10000"/>
+          </a:bodyPr>
           <a:lstStyle/>
           <a:p>
             <a:r>
               <a:rPr lang="en-IE" dirty="0"/>
-              <a:t>Customers Form</a:t>
+              <a:t>Customers from Dublin</a:t>
             </a:r>
           </a:p>
           <a:p>
             <a:r>
               <a:rPr lang="en-IE" dirty="0"/>
-              <a:t>Employees Form</a:t>
+              <a:t>Employees with Medical Card</a:t>
             </a:r>
           </a:p>
           <a:p>
             <a:r>
               <a:rPr lang="en-IE" dirty="0"/>
-              <a:t>Navigation Form</a:t>
+              <a:t>Products (bills) not paid</a:t>
             </a:r>
           </a:p>
           <a:p>
             <a:r>
               <a:rPr lang="en-IE" dirty="0"/>
-              <a:t>Products Form</a:t>
+              <a:t>Orders by year 2016</a:t>
             </a:r>
           </a:p>
           <a:p>
             <a:r>
               <a:rPr lang="en-IE" dirty="0"/>
-              <a:t>Suggestions Form</a:t>
+              <a:t>Orders by year 2017</a:t>
             </a:r>
           </a:p>
           <a:p>
             <a:r>
               <a:rPr lang="en-IE" dirty="0"/>
-              <a:t>Suppliers Form</a:t>
+              <a:t>Out of Stock</a:t>
             </a:r>
           </a:p>
           <a:p>
             <a:r>
               <a:rPr lang="en-IE" dirty="0"/>
-              <a:t>Welcome Page</a:t>
+              <a:t>Products with Stock Value more than €4000</a:t>
+            </a:r>
+          </a:p>
+          <a:p>
+            <a:r>
+              <a:rPr lang="en-IE" dirty="0"/>
+              <a:t>Suggestion Query</a:t>
+            </a:r>
+          </a:p>
+          <a:p>
+            <a:r>
+              <a:rPr lang="en-IE" dirty="0"/>
+              <a:t>Suppliers Query</a:t>
+            </a:r>
+          </a:p>
+        </p:txBody>
+      </p:sp>
+      <p:sp>
+        <p:nvSpPr>
+          <p:cNvPr id="4" name="TextBox 3"/>
+          <p:cNvSpPr txBox="1"/>
+          <p:nvPr/>
+        </p:nvSpPr>
+        <p:spPr>
+          <a:xfrm>
+            <a:off x="10296939" y="658574"/>
+            <a:ext cx="874644" cy="369332"/>
+          </a:xfrm>
+          <a:prstGeom prst="rect">
+            <a:avLst/>
+          </a:prstGeom>
+          <a:noFill/>
+        </p:spPr>
+        <p:txBody>
+          <a:bodyPr wrap="square" rtlCol="0">
+            <a:spAutoFit/>
+          </a:bodyPr>
+          <a:lstStyle/>
+          <a:p>
+            <a:r>
+              <a:rPr lang="en-GB" dirty="0"/>
+              <a:t>Dylan</a:t>
             </a:r>
           </a:p>
         </p:txBody>
@@ -3852,7 +3882,7 @@
     </p:spTree>
     <p:extLst>
       <p:ext uri="{BB962C8B-B14F-4D97-AF65-F5344CB8AC3E}">
-        <p14:creationId xmlns:p14="http://schemas.microsoft.com/office/powerpoint/2010/main" val="3503790673"/>
+        <p14:creationId xmlns:p14="http://schemas.microsoft.com/office/powerpoint/2010/main" val="2846560183"/>
       </p:ext>
     </p:extLst>
   </p:cSld>
@@ -3896,44 +3926,102 @@
           <a:p>
             <a:r>
               <a:rPr lang="en-IE" dirty="0"/>
+              <a:t>Forms</a:t>
+            </a:r>
+          </a:p>
+        </p:txBody>
+      </p:sp>
+      <p:sp>
+        <p:nvSpPr>
+          <p:cNvPr id="3" name="Content Placeholder 2"/>
+          <p:cNvSpPr>
+            <a:spLocks noGrp="1"/>
+          </p:cNvSpPr>
+          <p:nvPr>
+            <p:ph idx="1"/>
+          </p:nvPr>
+        </p:nvSpPr>
+        <p:spPr/>
+        <p:txBody>
+          <a:bodyPr/>
+          <a:lstStyle/>
+          <a:p>
+            <a:r>
+              <a:rPr lang="en-IE" dirty="0"/>
               <a:t>Customers Form</a:t>
             </a:r>
           </a:p>
-        </p:txBody>
-      </p:sp>
-      <p:pic>
-        <p:nvPicPr>
-          <p:cNvPr id="5" name="Content Placeholder 4"/>
-          <p:cNvPicPr>
-            <a:picLocks noGrp="1" noChangeAspect="1"/>
-          </p:cNvPicPr>
-          <p:nvPr>
-            <p:ph idx="1"/>
-          </p:nvPr>
-        </p:nvPicPr>
-        <p:blipFill>
-          <a:blip r:embed="rId2">
-            <a:extLst>
-              <a:ext uri="{28A0092B-C50C-407E-A947-70E740481C1C}">
-                <a14:useLocalDpi xmlns:a14="http://schemas.microsoft.com/office/drawing/2010/main" val="0"/>
-              </a:ext>
-            </a:extLst>
-          </a:blip>
-          <a:stretch>
-            <a:fillRect/>
-          </a:stretch>
-        </p:blipFill>
-        <p:spPr>
-          <a:xfrm>
-            <a:off x="1615634" y="1825625"/>
-            <a:ext cx="8960731" cy="4351338"/>
-          </a:xfrm>
-        </p:spPr>
-      </p:pic>
+          <a:p>
+            <a:r>
+              <a:rPr lang="en-IE" dirty="0"/>
+              <a:t>Employees Form</a:t>
+            </a:r>
+          </a:p>
+          <a:p>
+            <a:r>
+              <a:rPr lang="en-IE" dirty="0"/>
+              <a:t>Navigation Form</a:t>
+            </a:r>
+          </a:p>
+          <a:p>
+            <a:r>
+              <a:rPr lang="en-IE" dirty="0"/>
+              <a:t>Products Form</a:t>
+            </a:r>
+          </a:p>
+          <a:p>
+            <a:r>
+              <a:rPr lang="en-IE" dirty="0"/>
+              <a:t>Suggestions Form</a:t>
+            </a:r>
+          </a:p>
+          <a:p>
+            <a:r>
+              <a:rPr lang="en-IE" dirty="0"/>
+              <a:t>Suppliers Form</a:t>
+            </a:r>
+          </a:p>
+          <a:p>
+            <a:r>
+              <a:rPr lang="en-IE" dirty="0"/>
+              <a:t>Welcome Page</a:t>
+            </a:r>
+          </a:p>
+        </p:txBody>
+      </p:sp>
+      <p:sp>
+        <p:nvSpPr>
+          <p:cNvPr id="4" name="TextBox 3"/>
+          <p:cNvSpPr txBox="1"/>
+          <p:nvPr/>
+        </p:nvSpPr>
+        <p:spPr>
+          <a:xfrm>
+            <a:off x="10296939" y="658574"/>
+            <a:ext cx="874644" cy="369332"/>
+          </a:xfrm>
+          <a:prstGeom prst="rect">
+            <a:avLst/>
+          </a:prstGeom>
+          <a:noFill/>
+        </p:spPr>
+        <p:txBody>
+          <a:bodyPr wrap="square" rtlCol="0">
+            <a:spAutoFit/>
+          </a:bodyPr>
+          <a:lstStyle/>
+          <a:p>
+            <a:r>
+              <a:rPr lang="en-GB" dirty="0"/>
+              <a:t>Dylan</a:t>
+            </a:r>
+          </a:p>
+        </p:txBody>
+      </p:sp>
     </p:spTree>
     <p:extLst>
       <p:ext uri="{BB962C8B-B14F-4D97-AF65-F5344CB8AC3E}">
-        <p14:creationId xmlns:p14="http://schemas.microsoft.com/office/powerpoint/2010/main" val="3599055471"/>
+        <p14:creationId xmlns:p14="http://schemas.microsoft.com/office/powerpoint/2010/main" val="3503790673"/>
       </p:ext>
     </p:extLst>
   </p:cSld>
@@ -3977,7 +4065,7 @@
           <a:p>
             <a:r>
               <a:rPr lang="en-IE" dirty="0"/>
-              <a:t>Employees Form</a:t>
+              <a:t>Customers Form</a:t>
             </a:r>
           </a:p>
         </p:txBody>
@@ -4006,15 +4094,44 @@
         </p:blipFill>
         <p:spPr>
           <a:xfrm>
-            <a:off x="1611457" y="1825625"/>
-            <a:ext cx="8969085" cy="4351338"/>
+            <a:off x="1615634" y="1825625"/>
+            <a:ext cx="8960731" cy="4351338"/>
           </a:xfrm>
         </p:spPr>
       </p:pic>
+      <p:sp>
+        <p:nvSpPr>
+          <p:cNvPr id="4" name="TextBox 3"/>
+          <p:cNvSpPr txBox="1"/>
+          <p:nvPr/>
+        </p:nvSpPr>
+        <p:spPr>
+          <a:xfrm>
+            <a:off x="10296939" y="658574"/>
+            <a:ext cx="874644" cy="369332"/>
+          </a:xfrm>
+          <a:prstGeom prst="rect">
+            <a:avLst/>
+          </a:prstGeom>
+          <a:noFill/>
+        </p:spPr>
+        <p:txBody>
+          <a:bodyPr wrap="square" rtlCol="0">
+            <a:spAutoFit/>
+          </a:bodyPr>
+          <a:lstStyle/>
+          <a:p>
+            <a:r>
+              <a:rPr lang="en-GB" dirty="0"/>
+              <a:t>Dylan</a:t>
+            </a:r>
+          </a:p>
+        </p:txBody>
+      </p:sp>
     </p:spTree>
     <p:extLst>
       <p:ext uri="{BB962C8B-B14F-4D97-AF65-F5344CB8AC3E}">
-        <p14:creationId xmlns:p14="http://schemas.microsoft.com/office/powerpoint/2010/main" val="2771616802"/>
+        <p14:creationId xmlns:p14="http://schemas.microsoft.com/office/powerpoint/2010/main" val="3599055471"/>
       </p:ext>
     </p:extLst>
   </p:cSld>
@@ -4058,7 +4175,7 @@
           <a:p>
             <a:r>
               <a:rPr lang="en-IE" dirty="0"/>
-              <a:t>Navigation Form</a:t>
+              <a:t>Employees Form</a:t>
             </a:r>
           </a:p>
         </p:txBody>
@@ -4087,15 +4204,44 @@
         </p:blipFill>
         <p:spPr>
           <a:xfrm>
-            <a:off x="1531447" y="1825625"/>
-            <a:ext cx="9129106" cy="4351338"/>
+            <a:off x="1611457" y="1825625"/>
+            <a:ext cx="8969085" cy="4351338"/>
           </a:xfrm>
         </p:spPr>
       </p:pic>
+      <p:sp>
+        <p:nvSpPr>
+          <p:cNvPr id="4" name="TextBox 3"/>
+          <p:cNvSpPr txBox="1"/>
+          <p:nvPr/>
+        </p:nvSpPr>
+        <p:spPr>
+          <a:xfrm>
+            <a:off x="10296939" y="658574"/>
+            <a:ext cx="874644" cy="369332"/>
+          </a:xfrm>
+          <a:prstGeom prst="rect">
+            <a:avLst/>
+          </a:prstGeom>
+          <a:noFill/>
+        </p:spPr>
+        <p:txBody>
+          <a:bodyPr wrap="square" rtlCol="0">
+            <a:spAutoFit/>
+          </a:bodyPr>
+          <a:lstStyle/>
+          <a:p>
+            <a:r>
+              <a:rPr lang="en-GB" dirty="0"/>
+              <a:t>Dylan</a:t>
+            </a:r>
+          </a:p>
+        </p:txBody>
+      </p:sp>
     </p:spTree>
     <p:extLst>
       <p:ext uri="{BB962C8B-B14F-4D97-AF65-F5344CB8AC3E}">
-        <p14:creationId xmlns:p14="http://schemas.microsoft.com/office/powerpoint/2010/main" val="1874684647"/>
+        <p14:creationId xmlns:p14="http://schemas.microsoft.com/office/powerpoint/2010/main" val="2771616802"/>
       </p:ext>
     </p:extLst>
   </p:cSld>
@@ -4139,7 +4285,7 @@
           <a:p>
             <a:r>
               <a:rPr lang="en-IE" dirty="0"/>
-              <a:t>Product Form</a:t>
+              <a:t>Navigation Form</a:t>
             </a:r>
           </a:p>
         </p:txBody>
@@ -4168,15 +4314,44 @@
         </p:blipFill>
         <p:spPr>
           <a:xfrm>
-            <a:off x="1573845" y="1825625"/>
-            <a:ext cx="9044310" cy="4351338"/>
+            <a:off x="1531447" y="1825625"/>
+            <a:ext cx="9129106" cy="4351338"/>
           </a:xfrm>
         </p:spPr>
       </p:pic>
+      <p:sp>
+        <p:nvSpPr>
+          <p:cNvPr id="4" name="TextBox 3"/>
+          <p:cNvSpPr txBox="1"/>
+          <p:nvPr/>
+        </p:nvSpPr>
+        <p:spPr>
+          <a:xfrm>
+            <a:off x="10296939" y="658574"/>
+            <a:ext cx="874644" cy="369332"/>
+          </a:xfrm>
+          <a:prstGeom prst="rect">
+            <a:avLst/>
+          </a:prstGeom>
+          <a:noFill/>
+        </p:spPr>
+        <p:txBody>
+          <a:bodyPr wrap="square" rtlCol="0">
+            <a:spAutoFit/>
+          </a:bodyPr>
+          <a:lstStyle/>
+          <a:p>
+            <a:r>
+              <a:rPr lang="en-GB" dirty="0"/>
+              <a:t>Dylan</a:t>
+            </a:r>
+          </a:p>
+        </p:txBody>
+      </p:sp>
     </p:spTree>
     <p:extLst>
       <p:ext uri="{BB962C8B-B14F-4D97-AF65-F5344CB8AC3E}">
-        <p14:creationId xmlns:p14="http://schemas.microsoft.com/office/powerpoint/2010/main" val="3960545655"/>
+        <p14:creationId xmlns:p14="http://schemas.microsoft.com/office/powerpoint/2010/main" val="1874684647"/>
       </p:ext>
     </p:extLst>
   </p:cSld>
@@ -4220,7 +4395,7 @@
           <a:p>
             <a:r>
               <a:rPr lang="en-IE" dirty="0"/>
-              <a:t>Suggestion Form</a:t>
+              <a:t>Product Form</a:t>
             </a:r>
           </a:p>
         </p:txBody>
@@ -4249,15 +4424,44 @@
         </p:blipFill>
         <p:spPr>
           <a:xfrm>
-            <a:off x="1687868" y="1825625"/>
-            <a:ext cx="8816264" cy="4351338"/>
+            <a:off x="1573845" y="1825625"/>
+            <a:ext cx="9044310" cy="4351338"/>
           </a:xfrm>
         </p:spPr>
       </p:pic>
+      <p:sp>
+        <p:nvSpPr>
+          <p:cNvPr id="4" name="TextBox 3"/>
+          <p:cNvSpPr txBox="1"/>
+          <p:nvPr/>
+        </p:nvSpPr>
+        <p:spPr>
+          <a:xfrm>
+            <a:off x="10296939" y="658574"/>
+            <a:ext cx="874644" cy="369332"/>
+          </a:xfrm>
+          <a:prstGeom prst="rect">
+            <a:avLst/>
+          </a:prstGeom>
+          <a:noFill/>
+        </p:spPr>
+        <p:txBody>
+          <a:bodyPr wrap="square" rtlCol="0">
+            <a:spAutoFit/>
+          </a:bodyPr>
+          <a:lstStyle/>
+          <a:p>
+            <a:r>
+              <a:rPr lang="en-GB" dirty="0"/>
+              <a:t>Dylan</a:t>
+            </a:r>
+          </a:p>
+        </p:txBody>
+      </p:sp>
     </p:spTree>
     <p:extLst>
       <p:ext uri="{BB962C8B-B14F-4D97-AF65-F5344CB8AC3E}">
-        <p14:creationId xmlns:p14="http://schemas.microsoft.com/office/powerpoint/2010/main" val="523602880"/>
+        <p14:creationId xmlns:p14="http://schemas.microsoft.com/office/powerpoint/2010/main" val="3960545655"/>
       </p:ext>
     </p:extLst>
   </p:cSld>
@@ -4301,7 +4505,7 @@
           <a:p>
             <a:r>
               <a:rPr lang="en-IE" dirty="0"/>
-              <a:t>Suppliers Form</a:t>
+              <a:t>Suggestion Form</a:t>
             </a:r>
           </a:p>
         </p:txBody>
@@ -4330,15 +4534,44 @@
         </p:blipFill>
         <p:spPr>
           <a:xfrm>
-            <a:off x="1766161" y="1825625"/>
-            <a:ext cx="8659678" cy="4351338"/>
+            <a:off x="1687868" y="1825625"/>
+            <a:ext cx="8816264" cy="4351338"/>
           </a:xfrm>
         </p:spPr>
       </p:pic>
+      <p:sp>
+        <p:nvSpPr>
+          <p:cNvPr id="4" name="TextBox 3"/>
+          <p:cNvSpPr txBox="1"/>
+          <p:nvPr/>
+        </p:nvSpPr>
+        <p:spPr>
+          <a:xfrm>
+            <a:off x="10296939" y="658574"/>
+            <a:ext cx="874644" cy="369332"/>
+          </a:xfrm>
+          <a:prstGeom prst="rect">
+            <a:avLst/>
+          </a:prstGeom>
+          <a:noFill/>
+        </p:spPr>
+        <p:txBody>
+          <a:bodyPr wrap="square" rtlCol="0">
+            <a:spAutoFit/>
+          </a:bodyPr>
+          <a:lstStyle/>
+          <a:p>
+            <a:r>
+              <a:rPr lang="en-GB" dirty="0"/>
+              <a:t>Dylan</a:t>
+            </a:r>
+          </a:p>
+        </p:txBody>
+      </p:sp>
     </p:spTree>
     <p:extLst>
       <p:ext uri="{BB962C8B-B14F-4D97-AF65-F5344CB8AC3E}">
-        <p14:creationId xmlns:p14="http://schemas.microsoft.com/office/powerpoint/2010/main" val="3677103716"/>
+        <p14:creationId xmlns:p14="http://schemas.microsoft.com/office/powerpoint/2010/main" val="523602880"/>
       </p:ext>
     </p:extLst>
   </p:cSld>
@@ -4417,11 +4650,8 @@
           <a:p>
             <a:r>
               <a:rPr lang="en-US" dirty="0"/>
-              <a:t>This presentation will feature a quick background MCTV Limited, the UML charts, Databases, the company Website and what holds for the future of MCTV Limited as the company grows.</a:t>
-            </a:r>
-          </a:p>
-          <a:p>
-            <a:endParaRPr lang="en-US" dirty="0"/>
+              <a:t>This presentation will feature a quick background on MCTV Limited, the UML charts, Databases, Gantt charts, the company Website.</a:t>
+            </a:r>
           </a:p>
           <a:p>
             <a:endParaRPr lang="en-US" dirty="0"/>
@@ -4505,7 +4735,7 @@
           <a:p>
             <a:r>
               <a:rPr lang="en-IE" dirty="0"/>
-              <a:t>Welcome Page</a:t>
+              <a:t>Suppliers Form</a:t>
             </a:r>
           </a:p>
         </p:txBody>
@@ -4534,15 +4764,44 @@
         </p:blipFill>
         <p:spPr>
           <a:xfrm>
-            <a:off x="1456677" y="1991238"/>
-            <a:ext cx="9278645" cy="4020111"/>
+            <a:off x="1766161" y="1825625"/>
+            <a:ext cx="8659678" cy="4351338"/>
           </a:xfrm>
         </p:spPr>
       </p:pic>
+      <p:sp>
+        <p:nvSpPr>
+          <p:cNvPr id="4" name="TextBox 3"/>
+          <p:cNvSpPr txBox="1"/>
+          <p:nvPr/>
+        </p:nvSpPr>
+        <p:spPr>
+          <a:xfrm>
+            <a:off x="10296939" y="658574"/>
+            <a:ext cx="874644" cy="369332"/>
+          </a:xfrm>
+          <a:prstGeom prst="rect">
+            <a:avLst/>
+          </a:prstGeom>
+          <a:noFill/>
+        </p:spPr>
+        <p:txBody>
+          <a:bodyPr wrap="square" rtlCol="0">
+            <a:spAutoFit/>
+          </a:bodyPr>
+          <a:lstStyle/>
+          <a:p>
+            <a:r>
+              <a:rPr lang="en-GB" dirty="0"/>
+              <a:t>Dylan</a:t>
+            </a:r>
+          </a:p>
+        </p:txBody>
+      </p:sp>
     </p:spTree>
     <p:extLst>
       <p:ext uri="{BB962C8B-B14F-4D97-AF65-F5344CB8AC3E}">
-        <p14:creationId xmlns:p14="http://schemas.microsoft.com/office/powerpoint/2010/main" val="2369628912"/>
+        <p14:creationId xmlns:p14="http://schemas.microsoft.com/office/powerpoint/2010/main" val="3677103716"/>
       </p:ext>
     </p:extLst>
   </p:cSld>
@@ -4586,53 +4845,65 @@
           <a:p>
             <a:r>
               <a:rPr lang="en-IE" dirty="0"/>
-              <a:t>Reports</a:t>
-            </a:r>
-          </a:p>
-        </p:txBody>
-      </p:sp>
-      <p:sp>
-        <p:nvSpPr>
-          <p:cNvPr id="3" name="Content Placeholder 2"/>
-          <p:cNvSpPr>
-            <a:spLocks noGrp="1"/>
-          </p:cNvSpPr>
+              <a:t>Welcome Page</a:t>
+            </a:r>
+          </a:p>
+        </p:txBody>
+      </p:sp>
+      <p:pic>
+        <p:nvPicPr>
+          <p:cNvPr id="5" name="Content Placeholder 4"/>
+          <p:cNvPicPr>
+            <a:picLocks noGrp="1" noChangeAspect="1"/>
+          </p:cNvPicPr>
           <p:nvPr>
             <p:ph idx="1"/>
           </p:nvPr>
-        </p:nvSpPr>
-        <p:spPr/>
-        <p:txBody>
-          <a:bodyPr/>
-          <a:lstStyle/>
-          <a:p>
-            <a:r>
-              <a:rPr lang="en-IE" dirty="0"/>
-              <a:t>Accounts Overdue Report</a:t>
-            </a:r>
-          </a:p>
-          <a:p>
-            <a:r>
-              <a:rPr lang="en-IE" dirty="0"/>
-              <a:t>Employees Report</a:t>
-            </a:r>
-          </a:p>
-          <a:p>
-            <a:r>
-              <a:rPr lang="en-IE" dirty="0"/>
-              <a:t>Products Report</a:t>
-            </a:r>
-          </a:p>
-          <a:p>
-            <a:r>
-              <a:rPr lang="en-IE" dirty="0"/>
-              <a:t>Suggestion Report</a:t>
-            </a:r>
-          </a:p>
-          <a:p>
-            <a:r>
-              <a:rPr lang="en-IE" dirty="0"/>
-              <a:t>Suppliers Report</a:t>
+        </p:nvPicPr>
+        <p:blipFill>
+          <a:blip r:embed="rId2">
+            <a:extLst>
+              <a:ext uri="{28A0092B-C50C-407E-A947-70E740481C1C}">
+                <a14:useLocalDpi xmlns:a14="http://schemas.microsoft.com/office/drawing/2010/main" val="0"/>
+              </a:ext>
+            </a:extLst>
+          </a:blip>
+          <a:stretch>
+            <a:fillRect/>
+          </a:stretch>
+        </p:blipFill>
+        <p:spPr>
+          <a:xfrm>
+            <a:off x="1456677" y="1991238"/>
+            <a:ext cx="9278645" cy="4020111"/>
+          </a:xfrm>
+        </p:spPr>
+      </p:pic>
+      <p:sp>
+        <p:nvSpPr>
+          <p:cNvPr id="4" name="TextBox 3"/>
+          <p:cNvSpPr txBox="1"/>
+          <p:nvPr/>
+        </p:nvSpPr>
+        <p:spPr>
+          <a:xfrm>
+            <a:off x="10296939" y="658574"/>
+            <a:ext cx="874644" cy="369332"/>
+          </a:xfrm>
+          <a:prstGeom prst="rect">
+            <a:avLst/>
+          </a:prstGeom>
+          <a:noFill/>
+        </p:spPr>
+        <p:txBody>
+          <a:bodyPr wrap="square" rtlCol="0">
+            <a:spAutoFit/>
+          </a:bodyPr>
+          <a:lstStyle/>
+          <a:p>
+            <a:r>
+              <a:rPr lang="en-GB" dirty="0"/>
+              <a:t>Dylan</a:t>
             </a:r>
           </a:p>
         </p:txBody>
@@ -4640,7 +4911,7 @@
     </p:spTree>
     <p:extLst>
       <p:ext uri="{BB962C8B-B14F-4D97-AF65-F5344CB8AC3E}">
-        <p14:creationId xmlns:p14="http://schemas.microsoft.com/office/powerpoint/2010/main" val="1421304600"/>
+        <p14:creationId xmlns:p14="http://schemas.microsoft.com/office/powerpoint/2010/main" val="2369628912"/>
       </p:ext>
     </p:extLst>
   </p:cSld>
@@ -4683,10 +4954,9 @@
           <a:lstStyle/>
           <a:p>
             <a:r>
-              <a:rPr lang="en-GB" dirty="0"/>
-              <a:t>UML chart</a:t>
-            </a:r>
-            <a:endParaRPr lang="en-US" dirty="0"/>
+              <a:rPr lang="en-IE" dirty="0"/>
+              <a:t>Reports</a:t>
+            </a:r>
           </a:p>
         </p:txBody>
       </p:sp>
@@ -4706,48 +4976,33 @@
           <a:lstStyle/>
           <a:p>
             <a:r>
-              <a:rPr lang="en-US" dirty="0"/>
-              <a:t>Customers Table</a:t>
-            </a:r>
-          </a:p>
-          <a:p>
-            <a:r>
-              <a:rPr lang="en-US" dirty="0"/>
-              <a:t>Employees Table</a:t>
-            </a:r>
-          </a:p>
-          <a:p>
-            <a:r>
-              <a:rPr lang="en-US" dirty="0"/>
-              <a:t>Navigation Form</a:t>
-            </a:r>
-          </a:p>
-          <a:p>
-            <a:r>
-              <a:rPr lang="en-US" dirty="0"/>
-              <a:t>Products Table</a:t>
-            </a:r>
-          </a:p>
-          <a:p>
-            <a:r>
-              <a:rPr lang="en-US" dirty="0"/>
-              <a:t>Suggestions Table</a:t>
-            </a:r>
-          </a:p>
-          <a:p>
-            <a:r>
-              <a:rPr lang="en-US" dirty="0"/>
-              <a:t>Suppliers Table</a:t>
-            </a:r>
-          </a:p>
-          <a:p>
-            <a:pPr marL="0" indent="0">
-              <a:buNone/>
-            </a:pPr>
-            <a:endParaRPr lang="en-US" dirty="0"/>
-          </a:p>
-          <a:p>
-            <a:endParaRPr lang="en-US" dirty="0"/>
+              <a:rPr lang="en-IE" dirty="0"/>
+              <a:t>Accounts Overdue Report</a:t>
+            </a:r>
+          </a:p>
+          <a:p>
+            <a:r>
+              <a:rPr lang="en-IE" dirty="0"/>
+              <a:t>Employees Report</a:t>
+            </a:r>
+          </a:p>
+          <a:p>
+            <a:r>
+              <a:rPr lang="en-IE" dirty="0"/>
+              <a:t>Products Report</a:t>
+            </a:r>
+          </a:p>
+          <a:p>
+            <a:r>
+              <a:rPr lang="en-IE" dirty="0"/>
+              <a:t>Suggestion Report</a:t>
+            </a:r>
+          </a:p>
+          <a:p>
+            <a:r>
+              <a:rPr lang="en-IE" dirty="0"/>
+              <a:t>Suppliers Report</a:t>
+            </a:r>
           </a:p>
         </p:txBody>
       </p:sp>
@@ -4759,8 +5014,8 @@
         </p:nvSpPr>
         <p:spPr>
           <a:xfrm>
-            <a:off x="10323443" y="658574"/>
-            <a:ext cx="861392" cy="369332"/>
+            <a:off x="10296939" y="658574"/>
+            <a:ext cx="874644" cy="369332"/>
           </a:xfrm>
           <a:prstGeom prst="rect">
             <a:avLst/>
@@ -4775,7 +5030,7 @@
           <a:p>
             <a:r>
               <a:rPr lang="en-GB" dirty="0"/>
-              <a:t>Grigor</a:t>
+              <a:t>Dylan</a:t>
             </a:r>
           </a:p>
         </p:txBody>
@@ -4783,7 +5038,7 @@
     </p:spTree>
     <p:extLst>
       <p:ext uri="{BB962C8B-B14F-4D97-AF65-F5344CB8AC3E}">
-        <p14:creationId xmlns:p14="http://schemas.microsoft.com/office/powerpoint/2010/main" val="1248061747"/>
+        <p14:creationId xmlns:p14="http://schemas.microsoft.com/office/powerpoint/2010/main" val="1421304600"/>
       </p:ext>
     </p:extLst>
   </p:cSld>
@@ -4826,41 +5081,74 @@
           <a:lstStyle/>
           <a:p>
             <a:r>
-              <a:rPr lang="en-IE" dirty="0"/>
+              <a:rPr lang="en-GB" dirty="0"/>
+              <a:t>UML chart</a:t>
+            </a:r>
+            <a:endParaRPr lang="en-US" dirty="0"/>
+          </a:p>
+        </p:txBody>
+      </p:sp>
+      <p:sp>
+        <p:nvSpPr>
+          <p:cNvPr id="3" name="Content Placeholder 2"/>
+          <p:cNvSpPr>
+            <a:spLocks noGrp="1"/>
+          </p:cNvSpPr>
+          <p:nvPr>
+            <p:ph idx="1"/>
+          </p:nvPr>
+        </p:nvSpPr>
+        <p:spPr/>
+        <p:txBody>
+          <a:bodyPr/>
+          <a:lstStyle/>
+          <a:p>
+            <a:r>
+              <a:rPr lang="en-US" dirty="0"/>
               <a:t>Customers Table</a:t>
             </a:r>
           </a:p>
-        </p:txBody>
-      </p:sp>
-      <p:pic>
-        <p:nvPicPr>
-          <p:cNvPr id="5" name="Content Placeholder 4"/>
-          <p:cNvPicPr>
-            <a:picLocks noGrp="1" noChangeAspect="1"/>
-          </p:cNvPicPr>
-          <p:nvPr>
-            <p:ph idx="1"/>
-          </p:nvPr>
-        </p:nvPicPr>
-        <p:blipFill>
-          <a:blip r:embed="rId2">
-            <a:extLst>
-              <a:ext uri="{28A0092B-C50C-407E-A947-70E740481C1C}">
-                <a14:useLocalDpi xmlns:a14="http://schemas.microsoft.com/office/drawing/2010/main" val="0"/>
-              </a:ext>
-            </a:extLst>
-          </a:blip>
-          <a:stretch>
-            <a:fillRect/>
-          </a:stretch>
-        </p:blipFill>
-        <p:spPr>
-          <a:xfrm>
-            <a:off x="4126312" y="1825625"/>
-            <a:ext cx="3939376" cy="4351338"/>
-          </a:xfrm>
-        </p:spPr>
-      </p:pic>
+          <a:p>
+            <a:r>
+              <a:rPr lang="en-US" dirty="0"/>
+              <a:t>Employees Table</a:t>
+            </a:r>
+          </a:p>
+          <a:p>
+            <a:r>
+              <a:rPr lang="en-US" dirty="0"/>
+              <a:t>Navigation Form</a:t>
+            </a:r>
+          </a:p>
+          <a:p>
+            <a:r>
+              <a:rPr lang="en-US" dirty="0"/>
+              <a:t>Products Table</a:t>
+            </a:r>
+          </a:p>
+          <a:p>
+            <a:r>
+              <a:rPr lang="en-US" dirty="0"/>
+              <a:t>Suggestions Table</a:t>
+            </a:r>
+          </a:p>
+          <a:p>
+            <a:r>
+              <a:rPr lang="en-US" dirty="0"/>
+              <a:t>Suppliers Table</a:t>
+            </a:r>
+          </a:p>
+          <a:p>
+            <a:pPr marL="0" indent="0">
+              <a:buNone/>
+            </a:pPr>
+            <a:endParaRPr lang="en-US" dirty="0"/>
+          </a:p>
+          <a:p>
+            <a:endParaRPr lang="en-US" dirty="0"/>
+          </a:p>
+        </p:txBody>
+      </p:sp>
       <p:sp>
         <p:nvSpPr>
           <p:cNvPr id="4" name="TextBox 3"/>
@@ -4893,7 +5181,7 @@
     </p:spTree>
     <p:extLst>
       <p:ext uri="{BB962C8B-B14F-4D97-AF65-F5344CB8AC3E}">
-        <p14:creationId xmlns:p14="http://schemas.microsoft.com/office/powerpoint/2010/main" val="1212915720"/>
+        <p14:creationId xmlns:p14="http://schemas.microsoft.com/office/powerpoint/2010/main" val="1248061747"/>
       </p:ext>
     </p:extLst>
   </p:cSld>
@@ -4937,7 +5225,7 @@
           <a:p>
             <a:r>
               <a:rPr lang="en-IE" dirty="0"/>
-              <a:t>Employees Table</a:t>
+              <a:t>Customers Table</a:t>
             </a:r>
           </a:p>
         </p:txBody>
@@ -4966,8 +5254,8 @@
         </p:blipFill>
         <p:spPr>
           <a:xfrm>
-            <a:off x="4082957" y="1825625"/>
-            <a:ext cx="4026086" cy="4351338"/>
+            <a:off x="4126312" y="1825625"/>
+            <a:ext cx="3939376" cy="4351338"/>
           </a:xfrm>
         </p:spPr>
       </p:pic>
@@ -5003,7 +5291,7 @@
     </p:spTree>
     <p:extLst>
       <p:ext uri="{BB962C8B-B14F-4D97-AF65-F5344CB8AC3E}">
-        <p14:creationId xmlns:p14="http://schemas.microsoft.com/office/powerpoint/2010/main" val="1055208011"/>
+        <p14:creationId xmlns:p14="http://schemas.microsoft.com/office/powerpoint/2010/main" val="1212915720"/>
       </p:ext>
     </p:extLst>
   </p:cSld>
@@ -5047,7 +5335,7 @@
           <a:p>
             <a:r>
               <a:rPr lang="en-IE" dirty="0"/>
-              <a:t>Navigation Form</a:t>
+              <a:t>Employees Table</a:t>
             </a:r>
           </a:p>
         </p:txBody>
@@ -5076,8 +5364,8 @@
         </p:blipFill>
         <p:spPr>
           <a:xfrm>
-            <a:off x="3909707" y="2010291"/>
-            <a:ext cx="4372585" cy="3982006"/>
+            <a:off x="4082957" y="1825625"/>
+            <a:ext cx="4026086" cy="4351338"/>
           </a:xfrm>
         </p:spPr>
       </p:pic>
@@ -5089,7 +5377,7 @@
         </p:nvSpPr>
         <p:spPr>
           <a:xfrm>
-            <a:off x="10323443" y="671826"/>
+            <a:off x="10323443" y="658574"/>
             <a:ext cx="861392" cy="369332"/>
           </a:xfrm>
           <a:prstGeom prst="rect">
@@ -5113,7 +5401,7 @@
     </p:spTree>
     <p:extLst>
       <p:ext uri="{BB962C8B-B14F-4D97-AF65-F5344CB8AC3E}">
-        <p14:creationId xmlns:p14="http://schemas.microsoft.com/office/powerpoint/2010/main" val="201746166"/>
+        <p14:creationId xmlns:p14="http://schemas.microsoft.com/office/powerpoint/2010/main" val="1055208011"/>
       </p:ext>
     </p:extLst>
   </p:cSld>
@@ -5157,7 +5445,7 @@
           <a:p>
             <a:r>
               <a:rPr lang="en-IE" dirty="0"/>
-              <a:t>Products Form</a:t>
+              <a:t>Navigation Form</a:t>
             </a:r>
           </a:p>
         </p:txBody>
@@ -5186,15 +5474,44 @@
         </p:blipFill>
         <p:spPr>
           <a:xfrm>
-            <a:off x="4122819" y="1825625"/>
-            <a:ext cx="3946362" cy="4351338"/>
+            <a:off x="3909707" y="2010291"/>
+            <a:ext cx="4372585" cy="3982006"/>
           </a:xfrm>
         </p:spPr>
       </p:pic>
+      <p:sp>
+        <p:nvSpPr>
+          <p:cNvPr id="4" name="TextBox 3"/>
+          <p:cNvSpPr txBox="1"/>
+          <p:nvPr/>
+        </p:nvSpPr>
+        <p:spPr>
+          <a:xfrm>
+            <a:off x="10323443" y="671826"/>
+            <a:ext cx="861392" cy="369332"/>
+          </a:xfrm>
+          <a:prstGeom prst="rect">
+            <a:avLst/>
+          </a:prstGeom>
+          <a:noFill/>
+        </p:spPr>
+        <p:txBody>
+          <a:bodyPr wrap="square" rtlCol="0">
+            <a:spAutoFit/>
+          </a:bodyPr>
+          <a:lstStyle/>
+          <a:p>
+            <a:r>
+              <a:rPr lang="en-GB" dirty="0"/>
+              <a:t>Grigor</a:t>
+            </a:r>
+          </a:p>
+        </p:txBody>
+      </p:sp>
     </p:spTree>
     <p:extLst>
       <p:ext uri="{BB962C8B-B14F-4D97-AF65-F5344CB8AC3E}">
-        <p14:creationId xmlns:p14="http://schemas.microsoft.com/office/powerpoint/2010/main" val="1389347980"/>
+        <p14:creationId xmlns:p14="http://schemas.microsoft.com/office/powerpoint/2010/main" val="201746166"/>
       </p:ext>
     </p:extLst>
   </p:cSld>
@@ -5238,7 +5555,7 @@
           <a:p>
             <a:r>
               <a:rPr lang="en-IE" dirty="0"/>
-              <a:t>Suggestion Table</a:t>
+              <a:t>Products Form</a:t>
             </a:r>
           </a:p>
         </p:txBody>
@@ -5267,15 +5584,44 @@
         </p:blipFill>
         <p:spPr>
           <a:xfrm>
-            <a:off x="4095083" y="1825625"/>
-            <a:ext cx="4001833" cy="4351338"/>
+            <a:off x="4122819" y="1825625"/>
+            <a:ext cx="3946362" cy="4351338"/>
           </a:xfrm>
         </p:spPr>
       </p:pic>
+      <p:sp>
+        <p:nvSpPr>
+          <p:cNvPr id="4" name="TextBox 3"/>
+          <p:cNvSpPr txBox="1"/>
+          <p:nvPr/>
+        </p:nvSpPr>
+        <p:spPr>
+          <a:xfrm>
+            <a:off x="10323443" y="658574"/>
+            <a:ext cx="861392" cy="369332"/>
+          </a:xfrm>
+          <a:prstGeom prst="rect">
+            <a:avLst/>
+          </a:prstGeom>
+          <a:noFill/>
+        </p:spPr>
+        <p:txBody>
+          <a:bodyPr wrap="square" rtlCol="0">
+            <a:spAutoFit/>
+          </a:bodyPr>
+          <a:lstStyle/>
+          <a:p>
+            <a:r>
+              <a:rPr lang="en-GB" dirty="0"/>
+              <a:t>Grigor</a:t>
+            </a:r>
+          </a:p>
+        </p:txBody>
+      </p:sp>
     </p:spTree>
     <p:extLst>
       <p:ext uri="{BB962C8B-B14F-4D97-AF65-F5344CB8AC3E}">
-        <p14:creationId xmlns:p14="http://schemas.microsoft.com/office/powerpoint/2010/main" val="2343058775"/>
+        <p14:creationId xmlns:p14="http://schemas.microsoft.com/office/powerpoint/2010/main" val="1389347980"/>
       </p:ext>
     </p:extLst>
   </p:cSld>
@@ -5319,7 +5665,7 @@
           <a:p>
             <a:r>
               <a:rPr lang="en-IE" dirty="0"/>
-              <a:t>Suppliers Table</a:t>
+              <a:t>Suggestion Table</a:t>
             </a:r>
           </a:p>
         </p:txBody>
@@ -5348,15 +5694,44 @@
         </p:blipFill>
         <p:spPr>
           <a:xfrm>
-            <a:off x="4082957" y="1825625"/>
-            <a:ext cx="4026086" cy="4351338"/>
+            <a:off x="4095083" y="1825625"/>
+            <a:ext cx="4001833" cy="4351338"/>
           </a:xfrm>
         </p:spPr>
       </p:pic>
+      <p:sp>
+        <p:nvSpPr>
+          <p:cNvPr id="4" name="TextBox 3"/>
+          <p:cNvSpPr txBox="1"/>
+          <p:nvPr/>
+        </p:nvSpPr>
+        <p:spPr>
+          <a:xfrm>
+            <a:off x="10323443" y="658574"/>
+            <a:ext cx="861392" cy="369332"/>
+          </a:xfrm>
+          <a:prstGeom prst="rect">
+            <a:avLst/>
+          </a:prstGeom>
+          <a:noFill/>
+        </p:spPr>
+        <p:txBody>
+          <a:bodyPr wrap="square" rtlCol="0">
+            <a:spAutoFit/>
+          </a:bodyPr>
+          <a:lstStyle/>
+          <a:p>
+            <a:r>
+              <a:rPr lang="en-GB" dirty="0"/>
+              <a:t>Grigor</a:t>
+            </a:r>
+          </a:p>
+        </p:txBody>
+      </p:sp>
     </p:spTree>
     <p:extLst>
       <p:ext uri="{BB962C8B-B14F-4D97-AF65-F5344CB8AC3E}">
-        <p14:creationId xmlns:p14="http://schemas.microsoft.com/office/powerpoint/2010/main" val="48437891"/>
+        <p14:creationId xmlns:p14="http://schemas.microsoft.com/office/powerpoint/2010/main" val="2343058775"/>
       </p:ext>
     </p:extLst>
   </p:cSld>
@@ -5399,41 +5774,41 @@
           <a:lstStyle/>
           <a:p>
             <a:r>
-              <a:rPr lang="en-GB" dirty="0"/>
-              <a:t>Website</a:t>
-            </a:r>
-            <a:endParaRPr lang="en-US" dirty="0"/>
-          </a:p>
-        </p:txBody>
-      </p:sp>
-      <p:sp>
-        <p:nvSpPr>
-          <p:cNvPr id="3" name="Content Placeholder 2"/>
-          <p:cNvSpPr>
-            <a:spLocks noGrp="1"/>
-          </p:cNvSpPr>
+              <a:rPr lang="en-IE" dirty="0"/>
+              <a:t>Suppliers Table</a:t>
+            </a:r>
+          </a:p>
+        </p:txBody>
+      </p:sp>
+      <p:pic>
+        <p:nvPicPr>
+          <p:cNvPr id="5" name="Content Placeholder 4"/>
+          <p:cNvPicPr>
+            <a:picLocks noGrp="1" noChangeAspect="1"/>
+          </p:cNvPicPr>
           <p:nvPr>
             <p:ph idx="1"/>
           </p:nvPr>
-        </p:nvSpPr>
-        <p:spPr/>
-        <p:txBody>
-          <a:bodyPr/>
-          <a:lstStyle/>
-          <a:p>
-            <a:r>
-              <a:rPr lang="en-US" dirty="0"/>
-              <a:t>Here we will present to you the MCTV Limited Website </a:t>
-            </a:r>
-          </a:p>
-          <a:p>
-            <a:r>
-              <a:rPr lang="en-US" dirty="0"/>
-              <a:t>Which will feature a Home page and 4 individual pages about the workers in the shop </a:t>
-            </a:r>
-          </a:p>
-        </p:txBody>
-      </p:sp>
+        </p:nvPicPr>
+        <p:blipFill>
+          <a:blip r:embed="rId2">
+            <a:extLst>
+              <a:ext uri="{28A0092B-C50C-407E-A947-70E740481C1C}">
+                <a14:useLocalDpi xmlns:a14="http://schemas.microsoft.com/office/drawing/2010/main" val="0"/>
+              </a:ext>
+            </a:extLst>
+          </a:blip>
+          <a:stretch>
+            <a:fillRect/>
+          </a:stretch>
+        </p:blipFill>
+        <p:spPr>
+          <a:xfrm>
+            <a:off x="4082957" y="1825625"/>
+            <a:ext cx="4026086" cy="4351338"/>
+          </a:xfrm>
+        </p:spPr>
+      </p:pic>
       <p:sp>
         <p:nvSpPr>
           <p:cNvPr id="4" name="TextBox 3"/>
@@ -5442,8 +5817,8 @@
         </p:nvSpPr>
         <p:spPr>
           <a:xfrm>
-            <a:off x="10230678" y="658574"/>
-            <a:ext cx="954156" cy="369332"/>
+            <a:off x="10323443" y="658574"/>
+            <a:ext cx="861392" cy="369332"/>
           </a:xfrm>
           <a:prstGeom prst="rect">
             <a:avLst/>
@@ -5458,7 +5833,7 @@
           <a:p>
             <a:r>
               <a:rPr lang="en-GB" dirty="0"/>
-              <a:t>Antonio</a:t>
+              <a:t>Grigor</a:t>
             </a:r>
           </a:p>
         </p:txBody>
@@ -5466,7 +5841,7 @@
     </p:spTree>
     <p:extLst>
       <p:ext uri="{BB962C8B-B14F-4D97-AF65-F5344CB8AC3E}">
-        <p14:creationId xmlns:p14="http://schemas.microsoft.com/office/powerpoint/2010/main" val="3123563747"/>
+        <p14:creationId xmlns:p14="http://schemas.microsoft.com/office/powerpoint/2010/main" val="48437891"/>
       </p:ext>
     </p:extLst>
   </p:cSld>
@@ -5533,7 +5908,7 @@
           <a:p>
             <a:r>
               <a:rPr lang="en-GB" dirty="0"/>
-              <a:t>With the headquarter in Dublin, company has been manufacturing TV since 1955</a:t>
+              <a:t>With the headquarter in Dublin, MCTV Limited have been manufacturing TV’s since 1955</a:t>
             </a:r>
             <a:endParaRPr lang="en-US" dirty="0"/>
           </a:p>
@@ -5546,7 +5921,7 @@
           <a:p>
             <a:r>
               <a:rPr lang="en-GB" dirty="0"/>
-              <a:t>Supporting the local job market and grow local industries</a:t>
+              <a:t>Supporting the local job markets and growing local industries</a:t>
             </a:r>
           </a:p>
           <a:p>
@@ -5634,6 +6009,116 @@
           <a:p>
             <a:r>
               <a:rPr lang="en-GB" dirty="0"/>
+              <a:t>Website</a:t>
+            </a:r>
+            <a:endParaRPr lang="en-US" dirty="0"/>
+          </a:p>
+        </p:txBody>
+      </p:sp>
+      <p:sp>
+        <p:nvSpPr>
+          <p:cNvPr id="3" name="Content Placeholder 2"/>
+          <p:cNvSpPr>
+            <a:spLocks noGrp="1"/>
+          </p:cNvSpPr>
+          <p:nvPr>
+            <p:ph idx="1"/>
+          </p:nvPr>
+        </p:nvSpPr>
+        <p:spPr/>
+        <p:txBody>
+          <a:bodyPr/>
+          <a:lstStyle/>
+          <a:p>
+            <a:r>
+              <a:rPr lang="en-US" dirty="0"/>
+              <a:t>Here we will present to you the MCTV Limited Website </a:t>
+            </a:r>
+          </a:p>
+          <a:p>
+            <a:r>
+              <a:rPr lang="en-US" dirty="0"/>
+              <a:t>Which will feature a Home page and 4 individual pages about the workers in the shop </a:t>
+            </a:r>
+          </a:p>
+        </p:txBody>
+      </p:sp>
+      <p:sp>
+        <p:nvSpPr>
+          <p:cNvPr id="4" name="TextBox 3"/>
+          <p:cNvSpPr txBox="1"/>
+          <p:nvPr/>
+        </p:nvSpPr>
+        <p:spPr>
+          <a:xfrm>
+            <a:off x="10230678" y="658574"/>
+            <a:ext cx="954156" cy="369332"/>
+          </a:xfrm>
+          <a:prstGeom prst="rect">
+            <a:avLst/>
+          </a:prstGeom>
+          <a:noFill/>
+        </p:spPr>
+        <p:txBody>
+          <a:bodyPr wrap="square" rtlCol="0">
+            <a:spAutoFit/>
+          </a:bodyPr>
+          <a:lstStyle/>
+          <a:p>
+            <a:r>
+              <a:rPr lang="en-GB" dirty="0"/>
+              <a:t>Antonio</a:t>
+            </a:r>
+          </a:p>
+        </p:txBody>
+      </p:sp>
+    </p:spTree>
+    <p:extLst>
+      <p:ext uri="{BB962C8B-B14F-4D97-AF65-F5344CB8AC3E}">
+        <p14:creationId xmlns:p14="http://schemas.microsoft.com/office/powerpoint/2010/main" val="3123563747"/>
+      </p:ext>
+    </p:extLst>
+  </p:cSld>
+  <p:clrMapOvr>
+    <a:masterClrMapping/>
+  </p:clrMapOvr>
+</p:sld>
+</file>
+
+<file path=ppt/slides/slide31.xml><?xml version="1.0" encoding="utf-8"?>
+<p:sld xmlns:a="http://schemas.openxmlformats.org/drawingml/2006/main" xmlns:r="http://schemas.openxmlformats.org/officeDocument/2006/relationships" xmlns:p="http://schemas.openxmlformats.org/presentationml/2006/main">
+  <p:cSld>
+    <p:spTree>
+      <p:nvGrpSpPr>
+        <p:cNvPr id="1" name=""/>
+        <p:cNvGrpSpPr/>
+        <p:nvPr/>
+      </p:nvGrpSpPr>
+      <p:grpSpPr>
+        <a:xfrm>
+          <a:off x="0" y="0"/>
+          <a:ext cx="0" cy="0"/>
+          <a:chOff x="0" y="0"/>
+          <a:chExt cx="0" cy="0"/>
+        </a:xfrm>
+      </p:grpSpPr>
+      <p:sp>
+        <p:nvSpPr>
+          <p:cNvPr id="2" name="Title 1"/>
+          <p:cNvSpPr>
+            <a:spLocks noGrp="1"/>
+          </p:cNvSpPr>
+          <p:nvPr>
+            <p:ph type="title"/>
+          </p:nvPr>
+        </p:nvSpPr>
+        <p:spPr/>
+        <p:txBody>
+          <a:bodyPr/>
+          <a:lstStyle/>
+          <a:p>
+            <a:r>
+              <a:rPr lang="en-GB" dirty="0"/>
               <a:t>Conclusion</a:t>
             </a:r>
             <a:endParaRPr lang="en-US" dirty="0"/>
@@ -5722,7 +6207,7 @@
 </p:sld>
 </file>
 
-<file path=ppt/slides/slide31.xml><?xml version="1.0" encoding="utf-8"?>
+<file path=ppt/slides/slide32.xml><?xml version="1.0" encoding="utf-8"?>
 <p:sld xmlns:a="http://schemas.openxmlformats.org/drawingml/2006/main" xmlns:r="http://schemas.openxmlformats.org/officeDocument/2006/relationships" xmlns:p="http://schemas.openxmlformats.org/presentationml/2006/main">
   <p:cSld>
     <p:spTree>
@@ -5957,7 +6442,7 @@
           <a:p>
             <a:r>
               <a:rPr lang="en-US" dirty="0"/>
-              <a:t>The Gannt charts shows the progression the group has made over the last few months and all the times it was updated</a:t>
+              <a:t>The Gannt charts shows the progression of the groups Trello boards over the last few months</a:t>
             </a:r>
           </a:p>
           <a:p>
@@ -6464,9 +6949,8 @@
           <a:p>
             <a:r>
               <a:rPr lang="en-GB" dirty="0"/>
-              <a:t>Individual Task</a:t>
-            </a:r>
-            <a:endParaRPr lang="en-US" dirty="0"/>
+              <a:t>User Guides </a:t>
+            </a:r>
           </a:p>
         </p:txBody>
       </p:sp>
@@ -6480,75 +6964,235 @@
             <p:ph idx="1"/>
           </p:nvPr>
         </p:nvSpPr>
-        <p:spPr/>
-        <p:txBody>
-          <a:bodyPr/>
-          <a:lstStyle/>
-          <a:p>
-            <a:r>
-              <a:rPr lang="en-US" dirty="0"/>
-              <a:t>Databases – Dylan Gilroy and Jack Gallaher </a:t>
-            </a:r>
-          </a:p>
-          <a:p>
-            <a:r>
-              <a:rPr lang="en-US" dirty="0"/>
-              <a:t>UML charts – Antonio Penna and Grigor Danut</a:t>
-            </a:r>
-          </a:p>
-          <a:p>
-            <a:r>
-              <a:rPr lang="en-US" dirty="0"/>
-              <a:t>WordPress – Antonio Penna and Grigor Danut</a:t>
-            </a:r>
-          </a:p>
-          <a:p>
-            <a:r>
-              <a:rPr lang="en-US" dirty="0"/>
-              <a:t>Trello – Jack Gallaher </a:t>
-            </a:r>
-          </a:p>
-          <a:p>
-            <a:r>
-              <a:rPr lang="en-US" dirty="0"/>
-              <a:t>Presentation slides– Antonio Penna–layout, front page, introduction</a:t>
-            </a:r>
-          </a:p>
-          <a:p>
-            <a:r>
-              <a:rPr lang="en-US" dirty="0"/>
-              <a:t>Jack Gallaher-Agenda, Gantt chart, Conclusion, Last slide</a:t>
-            </a:r>
-          </a:p>
-          <a:p>
-            <a:r>
-              <a:rPr lang="en-US" dirty="0"/>
-              <a:t>Grigor Daunt-UML charts, Databases</a:t>
-            </a:r>
-          </a:p>
-          <a:p>
-            <a:r>
-              <a:rPr lang="en-US" dirty="0"/>
-              <a:t>Dylan Gilroy-individual Tasks, Website</a:t>
-            </a:r>
-          </a:p>
-        </p:txBody>
-      </p:sp>
-      <p:sp>
-        <p:nvSpPr>
-          <p:cNvPr id="4" name="TextBox 3"/>
-          <p:cNvSpPr txBox="1"/>
+        <p:spPr>
+          <a:xfrm>
+            <a:off x="838200" y="1825625"/>
+            <a:ext cx="10515600" cy="4351338"/>
+          </a:xfrm>
+        </p:spPr>
+        <p:txBody>
+          <a:bodyPr/>
+          <a:lstStyle/>
+          <a:p>
+            <a:r>
+              <a:rPr lang="en-GB" dirty="0"/>
+              <a:t>Grigor Danut - Sage 50</a:t>
+            </a:r>
+          </a:p>
+          <a:p>
+            <a:endParaRPr lang="en-GB" dirty="0"/>
+          </a:p>
+          <a:p>
+            <a:r>
+              <a:rPr lang="en-GB" dirty="0"/>
+              <a:t>Jack Gallaher – Salesforce                                  </a:t>
+            </a:r>
+          </a:p>
+          <a:p>
+            <a:endParaRPr lang="en-GB" dirty="0"/>
+          </a:p>
+          <a:p>
+            <a:r>
+              <a:rPr lang="en-GB" dirty="0"/>
+              <a:t>Antonio Penna – Woo Commerce</a:t>
+            </a:r>
+          </a:p>
+          <a:p>
+            <a:endParaRPr lang="en-GB" dirty="0"/>
+          </a:p>
+          <a:p>
+            <a:r>
+              <a:rPr lang="en-GB" dirty="0"/>
+              <a:t>Dylan Gilroy – Trello </a:t>
+            </a:r>
+          </a:p>
+          <a:p>
+            <a:pPr marL="0" indent="0">
+              <a:buNone/>
+            </a:pPr>
+            <a:endParaRPr lang="en-GB" dirty="0"/>
+          </a:p>
+        </p:txBody>
+      </p:sp>
+      <p:pic>
+        <p:nvPicPr>
+          <p:cNvPr id="1028" name="Picture 4" descr="Image result for salesforce"/>
+          <p:cNvPicPr>
+            <a:picLocks noChangeAspect="1" noChangeArrowheads="1"/>
+          </p:cNvPicPr>
           <p:nvPr/>
-        </p:nvSpPr>
-        <p:spPr>
-          <a:xfrm>
-            <a:off x="10323444" y="658574"/>
-            <a:ext cx="781878" cy="369332"/>
+        </p:nvPicPr>
+        <p:blipFill>
+          <a:blip r:embed="rId2">
+            <a:extLst>
+              <a:ext uri="{28A0092B-C50C-407E-A947-70E740481C1C}">
+                <a14:useLocalDpi xmlns:a14="http://schemas.microsoft.com/office/drawing/2010/main" val="0"/>
+              </a:ext>
+            </a:extLst>
+          </a:blip>
+          <a:srcRect/>
+          <a:stretch>
+            <a:fillRect/>
+          </a:stretch>
+        </p:blipFill>
+        <p:spPr bwMode="auto">
+          <a:xfrm>
+            <a:off x="8454887" y="2001077"/>
+            <a:ext cx="2655404" cy="1748873"/>
           </a:xfrm>
           <a:prstGeom prst="rect">
             <a:avLst/>
           </a:prstGeom>
           <a:noFill/>
+          <a:extLst>
+            <a:ext uri="{909E8E84-426E-40DD-AFC4-6F175D3DCCD1}">
+              <a14:hiddenFill xmlns:a14="http://schemas.microsoft.com/office/drawing/2010/main">
+                <a:solidFill>
+                  <a:srgbClr val="FFFFFF"/>
+                </a:solidFill>
+              </a14:hiddenFill>
+            </a:ext>
+          </a:extLst>
+        </p:spPr>
+      </p:pic>
+      <p:pic>
+        <p:nvPicPr>
+          <p:cNvPr id="1030" name="Picture 6" descr="Image result for sage 50 logo"/>
+          <p:cNvPicPr>
+            <a:picLocks noChangeAspect="1" noChangeArrowheads="1"/>
+          </p:cNvPicPr>
+          <p:nvPr/>
+        </p:nvPicPr>
+        <p:blipFill>
+          <a:blip r:embed="rId3">
+            <a:extLst>
+              <a:ext uri="{28A0092B-C50C-407E-A947-70E740481C1C}">
+                <a14:useLocalDpi xmlns:a14="http://schemas.microsoft.com/office/drawing/2010/main" val="0"/>
+              </a:ext>
+            </a:extLst>
+          </a:blip>
+          <a:srcRect/>
+          <a:stretch>
+            <a:fillRect/>
+          </a:stretch>
+        </p:blipFill>
+        <p:spPr bwMode="auto">
+          <a:xfrm>
+            <a:off x="5618922" y="2120347"/>
+            <a:ext cx="2592456" cy="1719259"/>
+          </a:xfrm>
+          <a:prstGeom prst="rect">
+            <a:avLst/>
+          </a:prstGeom>
+          <a:noFill/>
+          <a:extLst>
+            <a:ext uri="{909E8E84-426E-40DD-AFC4-6F175D3DCCD1}">
+              <a14:hiddenFill xmlns:a14="http://schemas.microsoft.com/office/drawing/2010/main">
+                <a:solidFill>
+                  <a:srgbClr val="FFFFFF"/>
+                </a:solidFill>
+              </a14:hiddenFill>
+            </a:ext>
+          </a:extLst>
+        </p:spPr>
+      </p:pic>
+      <p:pic>
+        <p:nvPicPr>
+          <p:cNvPr id="1034" name="Picture 10" descr="Image result for trello logo"/>
+          <p:cNvPicPr>
+            <a:picLocks noChangeAspect="1" noChangeArrowheads="1"/>
+          </p:cNvPicPr>
+          <p:nvPr/>
+        </p:nvPicPr>
+        <p:blipFill>
+          <a:blip r:embed="rId4" cstate="print">
+            <a:extLst>
+              <a:ext uri="{28A0092B-C50C-407E-A947-70E740481C1C}">
+                <a14:useLocalDpi xmlns:a14="http://schemas.microsoft.com/office/drawing/2010/main" val="0"/>
+              </a:ext>
+            </a:extLst>
+          </a:blip>
+          <a:srcRect/>
+          <a:stretch>
+            <a:fillRect/>
+          </a:stretch>
+        </p:blipFill>
+        <p:spPr bwMode="auto">
+          <a:xfrm>
+            <a:off x="8733183" y="4563960"/>
+            <a:ext cx="3215308" cy="709337"/>
+          </a:xfrm>
+          <a:prstGeom prst="rect">
+            <a:avLst/>
+          </a:prstGeom>
+          <a:noFill/>
+          <a:extLst>
+            <a:ext uri="{909E8E84-426E-40DD-AFC4-6F175D3DCCD1}">
+              <a14:hiddenFill xmlns:a14="http://schemas.microsoft.com/office/drawing/2010/main">
+                <a:solidFill>
+                  <a:srgbClr val="FFFFFF"/>
+                </a:solidFill>
+              </a14:hiddenFill>
+            </a:ext>
+          </a:extLst>
+        </p:spPr>
+      </p:pic>
+      <p:pic>
+        <p:nvPicPr>
+          <p:cNvPr id="1036" name="Picture 12" descr="Image result for woocommerce"/>
+          <p:cNvPicPr>
+            <a:picLocks noChangeAspect="1" noChangeArrowheads="1"/>
+          </p:cNvPicPr>
+          <p:nvPr/>
+        </p:nvPicPr>
+        <p:blipFill>
+          <a:blip r:embed="rId5" cstate="print">
+            <a:extLst>
+              <a:ext uri="{28A0092B-C50C-407E-A947-70E740481C1C}">
+                <a14:useLocalDpi xmlns:a14="http://schemas.microsoft.com/office/drawing/2010/main" val="0"/>
+              </a:ext>
+            </a:extLst>
+          </a:blip>
+          <a:srcRect/>
+          <a:stretch>
+            <a:fillRect/>
+          </a:stretch>
+        </p:blipFill>
+        <p:spPr bwMode="auto">
+          <a:xfrm>
+            <a:off x="4956313" y="4001294"/>
+            <a:ext cx="3776870" cy="2046627"/>
+          </a:xfrm>
+          <a:prstGeom prst="rect">
+            <a:avLst/>
+          </a:prstGeom>
+          <a:noFill/>
+          <a:extLst>
+            <a:ext uri="{909E8E84-426E-40DD-AFC4-6F175D3DCCD1}">
+              <a14:hiddenFill xmlns:a14="http://schemas.microsoft.com/office/drawing/2010/main">
+                <a:solidFill>
+                  <a:srgbClr val="FFFFFF"/>
+                </a:solidFill>
+              </a14:hiddenFill>
+            </a:ext>
+          </a:extLst>
+        </p:spPr>
+      </p:pic>
+      <p:sp>
+        <p:nvSpPr>
+          <p:cNvPr id="10" name="TextBox 9"/>
+          <p:cNvSpPr txBox="1"/>
+          <p:nvPr/>
+        </p:nvSpPr>
+        <p:spPr>
+          <a:xfrm>
+            <a:off x="10296939" y="658574"/>
+            <a:ext cx="874644" cy="369332"/>
+          </a:xfrm>
+          <a:prstGeom prst="rect">
+            <a:avLst/>
+          </a:prstGeom>
+          <a:noFill/>
         </p:spPr>
         <p:txBody>
           <a:bodyPr wrap="square" rtlCol="0">
@@ -6558,7 +7202,7 @@
           <a:p>
             <a:r>
               <a:rPr lang="en-GB" dirty="0"/>
-              <a:t>Dylan</a:t>
+              <a:t>Jack</a:t>
             </a:r>
           </a:p>
         </p:txBody>
@@ -6566,7 +7210,7 @@
     </p:spTree>
     <p:extLst>
       <p:ext uri="{BB962C8B-B14F-4D97-AF65-F5344CB8AC3E}">
-        <p14:creationId xmlns:p14="http://schemas.microsoft.com/office/powerpoint/2010/main" val="3738593189"/>
+        <p14:creationId xmlns:p14="http://schemas.microsoft.com/office/powerpoint/2010/main" val="1201261632"/>
       </p:ext>
     </p:extLst>
   </p:cSld>
@@ -6609,41 +7253,77 @@
           <a:lstStyle/>
           <a:p>
             <a:r>
-              <a:rPr lang="en-IE" dirty="0"/>
-              <a:t>MCTV Limited</a:t>
-            </a:r>
-          </a:p>
-        </p:txBody>
-      </p:sp>
-      <p:pic>
-        <p:nvPicPr>
-          <p:cNvPr id="5" name="Content Placeholder 4"/>
-          <p:cNvPicPr>
-            <a:picLocks noGrp="1" noChangeAspect="1"/>
-          </p:cNvPicPr>
+              <a:rPr lang="en-GB" dirty="0"/>
+              <a:t>Individual Task</a:t>
+            </a:r>
+            <a:endParaRPr lang="en-US" dirty="0"/>
+          </a:p>
+        </p:txBody>
+      </p:sp>
+      <p:sp>
+        <p:nvSpPr>
+          <p:cNvPr id="3" name="Content Placeholder 2"/>
+          <p:cNvSpPr>
+            <a:spLocks noGrp="1"/>
+          </p:cNvSpPr>
           <p:nvPr>
             <p:ph idx="1"/>
           </p:nvPr>
-        </p:nvPicPr>
-        <p:blipFill>
-          <a:blip r:embed="rId2">
-            <a:extLst>
-              <a:ext uri="{28A0092B-C50C-407E-A947-70E740481C1C}">
-                <a14:useLocalDpi xmlns:a14="http://schemas.microsoft.com/office/drawing/2010/main" val="0"/>
-              </a:ext>
-            </a:extLst>
-          </a:blip>
-          <a:stretch>
-            <a:fillRect/>
-          </a:stretch>
-        </p:blipFill>
-        <p:spPr>
-          <a:xfrm>
-            <a:off x="1671854" y="1825625"/>
-            <a:ext cx="8848292" cy="4351338"/>
-          </a:xfrm>
-        </p:spPr>
-      </p:pic>
+        </p:nvSpPr>
+        <p:spPr/>
+        <p:txBody>
+          <a:bodyPr/>
+          <a:lstStyle/>
+          <a:p>
+            <a:r>
+              <a:rPr lang="en-US" dirty="0"/>
+              <a:t>Databases – Dylan Gilroy and Jack Gallaher </a:t>
+            </a:r>
+          </a:p>
+          <a:p>
+            <a:r>
+              <a:rPr lang="en-US" dirty="0"/>
+              <a:t>UML charts – Antonio Penna and Grigor Danut</a:t>
+            </a:r>
+          </a:p>
+          <a:p>
+            <a:r>
+              <a:rPr lang="en-US" dirty="0"/>
+              <a:t>WordPress – Antonio Penna and Grigor Danut</a:t>
+            </a:r>
+          </a:p>
+          <a:p>
+            <a:r>
+              <a:rPr lang="en-US" dirty="0"/>
+              <a:t>Trello – Jack Gallaher </a:t>
+            </a:r>
+          </a:p>
+          <a:p>
+            <a:r>
+              <a:rPr lang="en-US" dirty="0"/>
+              <a:t>Presentation slides– Antonio Penna–layout, front page, introduction</a:t>
+            </a:r>
+          </a:p>
+          <a:p>
+            <a:r>
+              <a:rPr lang="en-US" dirty="0"/>
+              <a:t>Jack Gallaher-Agenda, Gantt chart, Conclusion, Last slide</a:t>
+            </a:r>
+          </a:p>
+          <a:p>
+            <a:r>
+              <a:rPr lang="en-US" dirty="0"/>
+              <a:t>Grigor Daunt-UML charts, Databases</a:t>
+            </a:r>
+          </a:p>
+          <a:p>
+            <a:r>
+              <a:rPr lang="en-US" dirty="0"/>
+              <a:t>Dylan Gilroy-individual Tasks, Website, User Guide</a:t>
+            </a:r>
+          </a:p>
+        </p:txBody>
+      </p:sp>
       <p:sp>
         <p:nvSpPr>
           <p:cNvPr id="4" name="TextBox 3"/>
@@ -6652,8 +7332,8 @@
         </p:nvSpPr>
         <p:spPr>
           <a:xfrm>
-            <a:off x="10296939" y="658574"/>
-            <a:ext cx="874644" cy="369332"/>
+            <a:off x="10323444" y="658574"/>
+            <a:ext cx="781878" cy="369332"/>
           </a:xfrm>
           <a:prstGeom prst="rect">
             <a:avLst/>
@@ -6676,7 +7356,7 @@
     </p:spTree>
     <p:extLst>
       <p:ext uri="{BB962C8B-B14F-4D97-AF65-F5344CB8AC3E}">
-        <p14:creationId xmlns:p14="http://schemas.microsoft.com/office/powerpoint/2010/main" val="4147242706"/>
+        <p14:creationId xmlns:p14="http://schemas.microsoft.com/office/powerpoint/2010/main" val="3738593189"/>
       </p:ext>
     </p:extLst>
   </p:cSld>

</xml_diff>

<commit_message>
Add lasst changes to Presentation
</commit_message>
<xml_diff>
--- a/MCTV Limited.pptx
+++ b/MCTV Limited.pptx
@@ -17,26 +17,29 @@
     <p:sldId id="280" r:id="rId11"/>
     <p:sldId id="261" r:id="rId12"/>
     <p:sldId id="270" r:id="rId13"/>
-    <p:sldId id="271" r:id="rId14"/>
-    <p:sldId id="272" r:id="rId15"/>
-    <p:sldId id="274" r:id="rId16"/>
-    <p:sldId id="275" r:id="rId17"/>
-    <p:sldId id="276" r:id="rId18"/>
-    <p:sldId id="277" r:id="rId19"/>
-    <p:sldId id="278" r:id="rId20"/>
-    <p:sldId id="279" r:id="rId21"/>
-    <p:sldId id="281" r:id="rId22"/>
-    <p:sldId id="273" r:id="rId23"/>
-    <p:sldId id="262" r:id="rId24"/>
-    <p:sldId id="282" r:id="rId25"/>
-    <p:sldId id="283" r:id="rId26"/>
-    <p:sldId id="284" r:id="rId27"/>
-    <p:sldId id="285" r:id="rId28"/>
-    <p:sldId id="286" r:id="rId29"/>
-    <p:sldId id="287" r:id="rId30"/>
-    <p:sldId id="263" r:id="rId31"/>
-    <p:sldId id="264" r:id="rId32"/>
-    <p:sldId id="265" r:id="rId33"/>
+    <p:sldId id="289" r:id="rId14"/>
+    <p:sldId id="271" r:id="rId15"/>
+    <p:sldId id="290" r:id="rId16"/>
+    <p:sldId id="272" r:id="rId17"/>
+    <p:sldId id="274" r:id="rId18"/>
+    <p:sldId id="275" r:id="rId19"/>
+    <p:sldId id="276" r:id="rId20"/>
+    <p:sldId id="277" r:id="rId21"/>
+    <p:sldId id="278" r:id="rId22"/>
+    <p:sldId id="279" r:id="rId23"/>
+    <p:sldId id="281" r:id="rId24"/>
+    <p:sldId id="273" r:id="rId25"/>
+    <p:sldId id="291" r:id="rId26"/>
+    <p:sldId id="262" r:id="rId27"/>
+    <p:sldId id="282" r:id="rId28"/>
+    <p:sldId id="283" r:id="rId29"/>
+    <p:sldId id="284" r:id="rId30"/>
+    <p:sldId id="285" r:id="rId31"/>
+    <p:sldId id="286" r:id="rId32"/>
+    <p:sldId id="287" r:id="rId33"/>
+    <p:sldId id="263" r:id="rId34"/>
+    <p:sldId id="264" r:id="rId35"/>
+    <p:sldId id="265" r:id="rId36"/>
   </p:sldIdLst>
   <p:sldSz cx="12192000" cy="6858000"/>
   <p:notesSz cx="6858000" cy="9144000"/>
@@ -3772,87 +3775,42 @@
           <a:lstStyle/>
           <a:p>
             <a:r>
-              <a:rPr lang="en-IE" dirty="0"/>
-              <a:t>Queries</a:t>
-            </a:r>
-          </a:p>
-        </p:txBody>
-      </p:sp>
-      <p:sp>
-        <p:nvSpPr>
-          <p:cNvPr id="3" name="Content Placeholder 2"/>
-          <p:cNvSpPr>
-            <a:spLocks noGrp="1"/>
-          </p:cNvSpPr>
+              <a:rPr lang="en-GB" dirty="0"/>
+              <a:t>Employees Table</a:t>
+            </a:r>
+            <a:endParaRPr lang="en-IE" dirty="0"/>
+          </a:p>
+        </p:txBody>
+      </p:sp>
+      <p:pic>
+        <p:nvPicPr>
+          <p:cNvPr id="4" name="Content Placeholder 5"/>
+          <p:cNvPicPr preferRelativeResize="0">
+            <a:picLocks noGrp="1"/>
+          </p:cNvPicPr>
           <p:nvPr>
             <p:ph idx="1"/>
           </p:nvPr>
-        </p:nvSpPr>
-        <p:spPr/>
-        <p:txBody>
-          <a:bodyPr>
-            <a:normAutofit lnSpcReduction="10000"/>
-          </a:bodyPr>
-          <a:lstStyle/>
-          <a:p>
-            <a:r>
-              <a:rPr lang="en-IE" dirty="0"/>
-              <a:t>Customers from Dublin</a:t>
-            </a:r>
-          </a:p>
-          <a:p>
-            <a:r>
-              <a:rPr lang="en-IE" dirty="0"/>
-              <a:t>Employees with Medical Card</a:t>
-            </a:r>
-          </a:p>
-          <a:p>
-            <a:r>
-              <a:rPr lang="en-IE" dirty="0"/>
-              <a:t>Products (bills) not paid</a:t>
-            </a:r>
-          </a:p>
-          <a:p>
-            <a:r>
-              <a:rPr lang="en-IE" dirty="0"/>
-              <a:t>Orders by year 2016</a:t>
-            </a:r>
-          </a:p>
-          <a:p>
-            <a:r>
-              <a:rPr lang="en-IE" dirty="0"/>
-              <a:t>Orders by year 2017</a:t>
-            </a:r>
-          </a:p>
-          <a:p>
-            <a:r>
-              <a:rPr lang="en-IE" dirty="0"/>
-              <a:t>Out of Stock</a:t>
-            </a:r>
-          </a:p>
-          <a:p>
-            <a:r>
-              <a:rPr lang="en-IE" dirty="0"/>
-              <a:t>Products with Stock Value more than €4000</a:t>
-            </a:r>
-          </a:p>
-          <a:p>
-            <a:r>
-              <a:rPr lang="en-IE" dirty="0"/>
-              <a:t>Suggestion Query</a:t>
-            </a:r>
-          </a:p>
-          <a:p>
-            <a:r>
-              <a:rPr lang="en-IE" dirty="0"/>
-              <a:t>Suppliers Query</a:t>
-            </a:r>
-          </a:p>
-        </p:txBody>
-      </p:sp>
-      <p:sp>
-        <p:nvSpPr>
-          <p:cNvPr id="4" name="TextBox 3"/>
+        </p:nvPicPr>
+        <p:blipFill>
+          <a:blip r:embed="rId2"/>
+          <a:stretch>
+            <a:fillRect/>
+          </a:stretch>
+        </p:blipFill>
+        <p:spPr>
+          <a:xfrm>
+            <a:off x="838199" y="1984137"/>
+            <a:ext cx="10515600" cy="2178000"/>
+          </a:xfrm>
+          <a:prstGeom prst="rect">
+            <a:avLst/>
+          </a:prstGeom>
+        </p:spPr>
+      </p:pic>
+      <p:sp>
+        <p:nvSpPr>
+          <p:cNvPr id="5" name="TextBox 4"/>
           <p:cNvSpPr txBox="1"/>
           <p:nvPr/>
         </p:nvSpPr>
@@ -3882,7 +3840,7 @@
     </p:spTree>
     <p:extLst>
       <p:ext uri="{BB962C8B-B14F-4D97-AF65-F5344CB8AC3E}">
-        <p14:creationId xmlns:p14="http://schemas.microsoft.com/office/powerpoint/2010/main" val="2846560183"/>
+        <p14:creationId xmlns:p14="http://schemas.microsoft.com/office/powerpoint/2010/main" val="3515163742"/>
       </p:ext>
     </p:extLst>
   </p:cSld>
@@ -3926,7 +3884,7 @@
           <a:p>
             <a:r>
               <a:rPr lang="en-IE" dirty="0"/>
-              <a:t>Forms</a:t>
+              <a:t>Queries</a:t>
             </a:r>
           </a:p>
         </p:txBody>
@@ -3943,48 +3901,62 @@
         </p:nvSpPr>
         <p:spPr/>
         <p:txBody>
-          <a:bodyPr/>
+          <a:bodyPr>
+            <a:normAutofit lnSpcReduction="10000"/>
+          </a:bodyPr>
           <a:lstStyle/>
           <a:p>
             <a:r>
               <a:rPr lang="en-IE" dirty="0"/>
-              <a:t>Customers Form</a:t>
+              <a:t>Customers from Dublin</a:t>
             </a:r>
           </a:p>
           <a:p>
             <a:r>
               <a:rPr lang="en-IE" dirty="0"/>
-              <a:t>Employees Form</a:t>
+              <a:t>Employees with Medical Card</a:t>
             </a:r>
           </a:p>
           <a:p>
             <a:r>
               <a:rPr lang="en-IE" dirty="0"/>
-              <a:t>Navigation Form</a:t>
+              <a:t>Products (bills) not paid</a:t>
             </a:r>
           </a:p>
           <a:p>
             <a:r>
               <a:rPr lang="en-IE" dirty="0"/>
-              <a:t>Products Form</a:t>
+              <a:t>Orders by year 2016</a:t>
             </a:r>
           </a:p>
           <a:p>
             <a:r>
               <a:rPr lang="en-IE" dirty="0"/>
-              <a:t>Suggestions Form</a:t>
+              <a:t>Orders by year 2017</a:t>
             </a:r>
           </a:p>
           <a:p>
             <a:r>
               <a:rPr lang="en-IE" dirty="0"/>
-              <a:t>Suppliers Form</a:t>
+              <a:t>Out of Stock</a:t>
             </a:r>
           </a:p>
           <a:p>
             <a:r>
               <a:rPr lang="en-IE" dirty="0"/>
-              <a:t>Welcome Page</a:t>
+              <a:t>Products with Stock Value more than €4000</a:t>
+            </a:r>
+          </a:p>
+          <a:p>
+            <a:r>
+              <a:rPr lang="en-IE" dirty="0"/>
+              <a:t>Suggestion Query</a:t>
+            </a:r>
+          </a:p>
+          <a:p>
+            <a:r>
+              <a:rPr lang="en-IE" dirty="0"/>
+              <a:t>Suppliers Query</a:t>
             </a:r>
           </a:p>
         </p:txBody>
@@ -4021,7 +3993,7 @@
     </p:spTree>
     <p:extLst>
       <p:ext uri="{BB962C8B-B14F-4D97-AF65-F5344CB8AC3E}">
-        <p14:creationId xmlns:p14="http://schemas.microsoft.com/office/powerpoint/2010/main" val="3503790673"/>
+        <p14:creationId xmlns:p14="http://schemas.microsoft.com/office/powerpoint/2010/main" val="2846560183"/>
       </p:ext>
     </p:extLst>
   </p:cSld>
@@ -4064,44 +4036,42 @@
           <a:lstStyle/>
           <a:p>
             <a:r>
-              <a:rPr lang="en-IE" dirty="0"/>
-              <a:t>Customers Form</a:t>
-            </a:r>
+              <a:rPr lang="en-GB" dirty="0"/>
+              <a:t>Orders by year 2016</a:t>
+            </a:r>
+            <a:endParaRPr lang="en-IE" dirty="0"/>
           </a:p>
         </p:txBody>
       </p:sp>
       <p:pic>
         <p:nvPicPr>
-          <p:cNvPr id="5" name="Content Placeholder 4"/>
-          <p:cNvPicPr>
-            <a:picLocks noGrp="1" noChangeAspect="1"/>
+          <p:cNvPr id="4" name="Content Placeholder 3"/>
+          <p:cNvPicPr preferRelativeResize="0">
+            <a:picLocks noGrp="1"/>
           </p:cNvPicPr>
           <p:nvPr>
             <p:ph idx="1"/>
           </p:nvPr>
         </p:nvPicPr>
         <p:blipFill>
-          <a:blip r:embed="rId2">
-            <a:extLst>
-              <a:ext uri="{28A0092B-C50C-407E-A947-70E740481C1C}">
-                <a14:useLocalDpi xmlns:a14="http://schemas.microsoft.com/office/drawing/2010/main" val="0"/>
-              </a:ext>
-            </a:extLst>
-          </a:blip>
+          <a:blip r:embed="rId2"/>
           <a:stretch>
             <a:fillRect/>
           </a:stretch>
         </p:blipFill>
         <p:spPr>
           <a:xfrm>
-            <a:off x="1615634" y="1825625"/>
-            <a:ext cx="8960731" cy="4351338"/>
-          </a:xfrm>
+            <a:off x="838199" y="2080028"/>
+            <a:ext cx="10515600" cy="3312000"/>
+          </a:xfrm>
+          <a:prstGeom prst="rect">
+            <a:avLst/>
+          </a:prstGeom>
         </p:spPr>
       </p:pic>
       <p:sp>
         <p:nvSpPr>
-          <p:cNvPr id="4" name="TextBox 3"/>
+          <p:cNvPr id="5" name="TextBox 4"/>
           <p:cNvSpPr txBox="1"/>
           <p:nvPr/>
         </p:nvSpPr>
@@ -4131,7 +4101,7 @@
     </p:spTree>
     <p:extLst>
       <p:ext uri="{BB962C8B-B14F-4D97-AF65-F5344CB8AC3E}">
-        <p14:creationId xmlns:p14="http://schemas.microsoft.com/office/powerpoint/2010/main" val="3599055471"/>
+        <p14:creationId xmlns:p14="http://schemas.microsoft.com/office/powerpoint/2010/main" val="2408494512"/>
       </p:ext>
     </p:extLst>
   </p:cSld>
@@ -4175,40 +4145,69 @@
           <a:p>
             <a:r>
               <a:rPr lang="en-IE" dirty="0"/>
+              <a:t>Forms</a:t>
+            </a:r>
+          </a:p>
+        </p:txBody>
+      </p:sp>
+      <p:sp>
+        <p:nvSpPr>
+          <p:cNvPr id="3" name="Content Placeholder 2"/>
+          <p:cNvSpPr>
+            <a:spLocks noGrp="1"/>
+          </p:cNvSpPr>
+          <p:nvPr>
+            <p:ph idx="1"/>
+          </p:nvPr>
+        </p:nvSpPr>
+        <p:spPr/>
+        <p:txBody>
+          <a:bodyPr/>
+          <a:lstStyle/>
+          <a:p>
+            <a:r>
+              <a:rPr lang="en-IE" dirty="0"/>
+              <a:t>Customers Form</a:t>
+            </a:r>
+          </a:p>
+          <a:p>
+            <a:r>
+              <a:rPr lang="en-IE" dirty="0"/>
               <a:t>Employees Form</a:t>
             </a:r>
           </a:p>
-        </p:txBody>
-      </p:sp>
-      <p:pic>
-        <p:nvPicPr>
-          <p:cNvPr id="5" name="Content Placeholder 4"/>
-          <p:cNvPicPr>
-            <a:picLocks noGrp="1" noChangeAspect="1"/>
-          </p:cNvPicPr>
-          <p:nvPr>
-            <p:ph idx="1"/>
-          </p:nvPr>
-        </p:nvPicPr>
-        <p:blipFill>
-          <a:blip r:embed="rId2">
-            <a:extLst>
-              <a:ext uri="{28A0092B-C50C-407E-A947-70E740481C1C}">
-                <a14:useLocalDpi xmlns:a14="http://schemas.microsoft.com/office/drawing/2010/main" val="0"/>
-              </a:ext>
-            </a:extLst>
-          </a:blip>
-          <a:stretch>
-            <a:fillRect/>
-          </a:stretch>
-        </p:blipFill>
-        <p:spPr>
-          <a:xfrm>
-            <a:off x="1611457" y="1825625"/>
-            <a:ext cx="8969085" cy="4351338"/>
-          </a:xfrm>
-        </p:spPr>
-      </p:pic>
+          <a:p>
+            <a:r>
+              <a:rPr lang="en-IE" dirty="0"/>
+              <a:t>Navigation Form</a:t>
+            </a:r>
+          </a:p>
+          <a:p>
+            <a:r>
+              <a:rPr lang="en-IE" dirty="0"/>
+              <a:t>Products Form</a:t>
+            </a:r>
+          </a:p>
+          <a:p>
+            <a:r>
+              <a:rPr lang="en-IE" dirty="0"/>
+              <a:t>Suggestions Form</a:t>
+            </a:r>
+          </a:p>
+          <a:p>
+            <a:r>
+              <a:rPr lang="en-IE" dirty="0"/>
+              <a:t>Suppliers Form</a:t>
+            </a:r>
+          </a:p>
+          <a:p>
+            <a:r>
+              <a:rPr lang="en-IE" dirty="0"/>
+              <a:t>Welcome Page</a:t>
+            </a:r>
+          </a:p>
+        </p:txBody>
+      </p:sp>
       <p:sp>
         <p:nvSpPr>
           <p:cNvPr id="4" name="TextBox 3"/>
@@ -4241,7 +4240,7 @@
     </p:spTree>
     <p:extLst>
       <p:ext uri="{BB962C8B-B14F-4D97-AF65-F5344CB8AC3E}">
-        <p14:creationId xmlns:p14="http://schemas.microsoft.com/office/powerpoint/2010/main" val="2771616802"/>
+        <p14:creationId xmlns:p14="http://schemas.microsoft.com/office/powerpoint/2010/main" val="3503790673"/>
       </p:ext>
     </p:extLst>
   </p:cSld>
@@ -4285,7 +4284,7 @@
           <a:p>
             <a:r>
               <a:rPr lang="en-IE" dirty="0"/>
-              <a:t>Navigation Form</a:t>
+              <a:t>Customers Form</a:t>
             </a:r>
           </a:p>
         </p:txBody>
@@ -4314,8 +4313,8 @@
         </p:blipFill>
         <p:spPr>
           <a:xfrm>
-            <a:off x="1531447" y="1825625"/>
-            <a:ext cx="9129106" cy="4351338"/>
+            <a:off x="1615634" y="1825625"/>
+            <a:ext cx="8960731" cy="4351338"/>
           </a:xfrm>
         </p:spPr>
       </p:pic>
@@ -4351,7 +4350,7 @@
     </p:spTree>
     <p:extLst>
       <p:ext uri="{BB962C8B-B14F-4D97-AF65-F5344CB8AC3E}">
-        <p14:creationId xmlns:p14="http://schemas.microsoft.com/office/powerpoint/2010/main" val="1874684647"/>
+        <p14:creationId xmlns:p14="http://schemas.microsoft.com/office/powerpoint/2010/main" val="3599055471"/>
       </p:ext>
     </p:extLst>
   </p:cSld>
@@ -4395,7 +4394,7 @@
           <a:p>
             <a:r>
               <a:rPr lang="en-IE" dirty="0"/>
-              <a:t>Product Form</a:t>
+              <a:t>Employees Form</a:t>
             </a:r>
           </a:p>
         </p:txBody>
@@ -4424,8 +4423,8 @@
         </p:blipFill>
         <p:spPr>
           <a:xfrm>
-            <a:off x="1573845" y="1825625"/>
-            <a:ext cx="9044310" cy="4351338"/>
+            <a:off x="1611457" y="1825625"/>
+            <a:ext cx="8969085" cy="4351338"/>
           </a:xfrm>
         </p:spPr>
       </p:pic>
@@ -4461,7 +4460,7 @@
     </p:spTree>
     <p:extLst>
       <p:ext uri="{BB962C8B-B14F-4D97-AF65-F5344CB8AC3E}">
-        <p14:creationId xmlns:p14="http://schemas.microsoft.com/office/powerpoint/2010/main" val="3960545655"/>
+        <p14:creationId xmlns:p14="http://schemas.microsoft.com/office/powerpoint/2010/main" val="2771616802"/>
       </p:ext>
     </p:extLst>
   </p:cSld>
@@ -4505,7 +4504,7 @@
           <a:p>
             <a:r>
               <a:rPr lang="en-IE" dirty="0"/>
-              <a:t>Suggestion Form</a:t>
+              <a:t>Navigation Form</a:t>
             </a:r>
           </a:p>
         </p:txBody>
@@ -4534,8 +4533,8 @@
         </p:blipFill>
         <p:spPr>
           <a:xfrm>
-            <a:off x="1687868" y="1825625"/>
-            <a:ext cx="8816264" cy="4351338"/>
+            <a:off x="1531447" y="1825625"/>
+            <a:ext cx="9129106" cy="4351338"/>
           </a:xfrm>
         </p:spPr>
       </p:pic>
@@ -4571,7 +4570,7 @@
     </p:spTree>
     <p:extLst>
       <p:ext uri="{BB962C8B-B14F-4D97-AF65-F5344CB8AC3E}">
-        <p14:creationId xmlns:p14="http://schemas.microsoft.com/office/powerpoint/2010/main" val="523602880"/>
+        <p14:creationId xmlns:p14="http://schemas.microsoft.com/office/powerpoint/2010/main" val="1874684647"/>
       </p:ext>
     </p:extLst>
   </p:cSld>
@@ -4735,7 +4734,7 @@
           <a:p>
             <a:r>
               <a:rPr lang="en-IE" dirty="0"/>
-              <a:t>Suppliers Form</a:t>
+              <a:t>Product Form</a:t>
             </a:r>
           </a:p>
         </p:txBody>
@@ -4764,8 +4763,8 @@
         </p:blipFill>
         <p:spPr>
           <a:xfrm>
-            <a:off x="1766161" y="1825625"/>
-            <a:ext cx="8659678" cy="4351338"/>
+            <a:off x="1573845" y="1825625"/>
+            <a:ext cx="9044310" cy="4351338"/>
           </a:xfrm>
         </p:spPr>
       </p:pic>
@@ -4801,7 +4800,7 @@
     </p:spTree>
     <p:extLst>
       <p:ext uri="{BB962C8B-B14F-4D97-AF65-F5344CB8AC3E}">
-        <p14:creationId xmlns:p14="http://schemas.microsoft.com/office/powerpoint/2010/main" val="3677103716"/>
+        <p14:creationId xmlns:p14="http://schemas.microsoft.com/office/powerpoint/2010/main" val="3960545655"/>
       </p:ext>
     </p:extLst>
   </p:cSld>
@@ -4845,7 +4844,7 @@
           <a:p>
             <a:r>
               <a:rPr lang="en-IE" dirty="0"/>
-              <a:t>Welcome Page</a:t>
+              <a:t>Suggestion Form</a:t>
             </a:r>
           </a:p>
         </p:txBody>
@@ -4874,8 +4873,8 @@
         </p:blipFill>
         <p:spPr>
           <a:xfrm>
-            <a:off x="1456677" y="1991238"/>
-            <a:ext cx="9278645" cy="4020111"/>
+            <a:off x="1687868" y="1825625"/>
+            <a:ext cx="8816264" cy="4351338"/>
           </a:xfrm>
         </p:spPr>
       </p:pic>
@@ -4911,7 +4910,7 @@
     </p:spTree>
     <p:extLst>
       <p:ext uri="{BB962C8B-B14F-4D97-AF65-F5344CB8AC3E}">
-        <p14:creationId xmlns:p14="http://schemas.microsoft.com/office/powerpoint/2010/main" val="2369628912"/>
+        <p14:creationId xmlns:p14="http://schemas.microsoft.com/office/powerpoint/2010/main" val="523602880"/>
       </p:ext>
     </p:extLst>
   </p:cSld>
@@ -4955,63 +4954,40 @@
           <a:p>
             <a:r>
               <a:rPr lang="en-IE" dirty="0"/>
-              <a:t>Reports</a:t>
-            </a:r>
-          </a:p>
-        </p:txBody>
-      </p:sp>
-      <p:sp>
-        <p:nvSpPr>
-          <p:cNvPr id="3" name="Content Placeholder 2"/>
-          <p:cNvSpPr>
-            <a:spLocks noGrp="1"/>
-          </p:cNvSpPr>
+              <a:t>Suppliers Form</a:t>
+            </a:r>
+          </a:p>
+        </p:txBody>
+      </p:sp>
+      <p:pic>
+        <p:nvPicPr>
+          <p:cNvPr id="5" name="Content Placeholder 4"/>
+          <p:cNvPicPr>
+            <a:picLocks noGrp="1" noChangeAspect="1"/>
+          </p:cNvPicPr>
           <p:nvPr>
             <p:ph idx="1"/>
           </p:nvPr>
-        </p:nvSpPr>
-        <p:spPr/>
-        <p:txBody>
-          <a:bodyPr/>
-          <a:lstStyle/>
-          <a:p>
-            <a:r>
-              <a:rPr lang="en-IE" dirty="0"/>
-              <a:t>Accounts Overdue Report</a:t>
-            </a:r>
-          </a:p>
-          <a:p>
-            <a:r>
-              <a:rPr lang="en-IE" dirty="0"/>
-              <a:t>Customers Report</a:t>
-            </a:r>
-          </a:p>
-          <a:p>
-            <a:r>
-              <a:rPr lang="en-IE" dirty="0"/>
-              <a:t>Employees Report</a:t>
-            </a:r>
-          </a:p>
-          <a:p>
-            <a:r>
-              <a:rPr lang="en-IE" dirty="0"/>
-              <a:t>Products Report</a:t>
-            </a:r>
-          </a:p>
-          <a:p>
-            <a:r>
-              <a:rPr lang="en-IE" dirty="0"/>
-              <a:t>Suggestion Report</a:t>
-            </a:r>
-          </a:p>
-          <a:p>
-            <a:r>
-              <a:rPr lang="en-IE" dirty="0"/>
-              <a:t>Suppliers Report</a:t>
-            </a:r>
-          </a:p>
-        </p:txBody>
-      </p:sp>
+        </p:nvPicPr>
+        <p:blipFill>
+          <a:blip r:embed="rId2">
+            <a:extLst>
+              <a:ext uri="{28A0092B-C50C-407E-A947-70E740481C1C}">
+                <a14:useLocalDpi xmlns:a14="http://schemas.microsoft.com/office/drawing/2010/main" val="0"/>
+              </a:ext>
+            </a:extLst>
+          </a:blip>
+          <a:stretch>
+            <a:fillRect/>
+          </a:stretch>
+        </p:blipFill>
+        <p:spPr>
+          <a:xfrm>
+            <a:off x="1766161" y="1825625"/>
+            <a:ext cx="8659678" cy="4351338"/>
+          </a:xfrm>
+        </p:spPr>
+      </p:pic>
       <p:sp>
         <p:nvSpPr>
           <p:cNvPr id="4" name="TextBox 3"/>
@@ -5044,7 +5020,7 @@
     </p:spTree>
     <p:extLst>
       <p:ext uri="{BB962C8B-B14F-4D97-AF65-F5344CB8AC3E}">
-        <p14:creationId xmlns:p14="http://schemas.microsoft.com/office/powerpoint/2010/main" val="1421304600"/>
+        <p14:creationId xmlns:p14="http://schemas.microsoft.com/office/powerpoint/2010/main" val="3677103716"/>
       </p:ext>
     </p:extLst>
   </p:cSld>
@@ -5087,74 +5063,41 @@
           <a:lstStyle/>
           <a:p>
             <a:r>
-              <a:rPr lang="en-GB" dirty="0"/>
-              <a:t>UML chart</a:t>
-            </a:r>
-            <a:endParaRPr lang="en-US" dirty="0"/>
-          </a:p>
-        </p:txBody>
-      </p:sp>
-      <p:sp>
-        <p:nvSpPr>
-          <p:cNvPr id="3" name="Content Placeholder 2"/>
-          <p:cNvSpPr>
-            <a:spLocks noGrp="1"/>
-          </p:cNvSpPr>
+              <a:rPr lang="en-IE" dirty="0"/>
+              <a:t>Welcome Page</a:t>
+            </a:r>
+          </a:p>
+        </p:txBody>
+      </p:sp>
+      <p:pic>
+        <p:nvPicPr>
+          <p:cNvPr id="5" name="Content Placeholder 4"/>
+          <p:cNvPicPr>
+            <a:picLocks noGrp="1" noChangeAspect="1"/>
+          </p:cNvPicPr>
           <p:nvPr>
             <p:ph idx="1"/>
           </p:nvPr>
-        </p:nvSpPr>
-        <p:spPr/>
-        <p:txBody>
-          <a:bodyPr/>
-          <a:lstStyle/>
-          <a:p>
-            <a:r>
-              <a:rPr lang="en-US" dirty="0"/>
-              <a:t>Customers Table</a:t>
-            </a:r>
-          </a:p>
-          <a:p>
-            <a:r>
-              <a:rPr lang="en-US" dirty="0"/>
-              <a:t>Employees Table</a:t>
-            </a:r>
-          </a:p>
-          <a:p>
-            <a:r>
-              <a:rPr lang="en-US" dirty="0"/>
-              <a:t>Navigation Form</a:t>
-            </a:r>
-          </a:p>
-          <a:p>
-            <a:r>
-              <a:rPr lang="en-US" dirty="0"/>
-              <a:t>Products Table</a:t>
-            </a:r>
-          </a:p>
-          <a:p>
-            <a:r>
-              <a:rPr lang="en-US" dirty="0"/>
-              <a:t>Suggestions Table</a:t>
-            </a:r>
-          </a:p>
-          <a:p>
-            <a:r>
-              <a:rPr lang="en-US" dirty="0"/>
-              <a:t>Suppliers Table</a:t>
-            </a:r>
-          </a:p>
-          <a:p>
-            <a:pPr marL="0" indent="0">
-              <a:buNone/>
-            </a:pPr>
-            <a:endParaRPr lang="en-US" dirty="0"/>
-          </a:p>
-          <a:p>
-            <a:endParaRPr lang="en-US" dirty="0"/>
-          </a:p>
-        </p:txBody>
-      </p:sp>
+        </p:nvPicPr>
+        <p:blipFill>
+          <a:blip r:embed="rId2">
+            <a:extLst>
+              <a:ext uri="{28A0092B-C50C-407E-A947-70E740481C1C}">
+                <a14:useLocalDpi xmlns:a14="http://schemas.microsoft.com/office/drawing/2010/main" val="0"/>
+              </a:ext>
+            </a:extLst>
+          </a:blip>
+          <a:stretch>
+            <a:fillRect/>
+          </a:stretch>
+        </p:blipFill>
+        <p:spPr>
+          <a:xfrm>
+            <a:off x="1456677" y="1991238"/>
+            <a:ext cx="9278645" cy="4020111"/>
+          </a:xfrm>
+        </p:spPr>
+      </p:pic>
       <p:sp>
         <p:nvSpPr>
           <p:cNvPr id="4" name="TextBox 3"/>
@@ -5163,8 +5106,8 @@
         </p:nvSpPr>
         <p:spPr>
           <a:xfrm>
-            <a:off x="10323443" y="658574"/>
-            <a:ext cx="861392" cy="369332"/>
+            <a:off x="10296939" y="658574"/>
+            <a:ext cx="874644" cy="369332"/>
           </a:xfrm>
           <a:prstGeom prst="rect">
             <a:avLst/>
@@ -5179,7 +5122,7 @@
           <a:p>
             <a:r>
               <a:rPr lang="en-GB" dirty="0"/>
-              <a:t>Grigor</a:t>
+              <a:t>Dylan</a:t>
             </a:r>
           </a:p>
         </p:txBody>
@@ -5187,7 +5130,7 @@
     </p:spTree>
     <p:extLst>
       <p:ext uri="{BB962C8B-B14F-4D97-AF65-F5344CB8AC3E}">
-        <p14:creationId xmlns:p14="http://schemas.microsoft.com/office/powerpoint/2010/main" val="1248061747"/>
+        <p14:creationId xmlns:p14="http://schemas.microsoft.com/office/powerpoint/2010/main" val="2369628912"/>
       </p:ext>
     </p:extLst>
   </p:cSld>
@@ -5231,40 +5174,63 @@
           <a:p>
             <a:r>
               <a:rPr lang="en-IE" dirty="0"/>
-              <a:t>Customers Table</a:t>
-            </a:r>
-          </a:p>
-        </p:txBody>
-      </p:sp>
-      <p:pic>
-        <p:nvPicPr>
-          <p:cNvPr id="5" name="Content Placeholder 4"/>
-          <p:cNvPicPr>
-            <a:picLocks noGrp="1" noChangeAspect="1"/>
-          </p:cNvPicPr>
+              <a:t>Reports</a:t>
+            </a:r>
+          </a:p>
+        </p:txBody>
+      </p:sp>
+      <p:sp>
+        <p:nvSpPr>
+          <p:cNvPr id="3" name="Content Placeholder 2"/>
+          <p:cNvSpPr>
+            <a:spLocks noGrp="1"/>
+          </p:cNvSpPr>
           <p:nvPr>
             <p:ph idx="1"/>
           </p:nvPr>
-        </p:nvPicPr>
-        <p:blipFill>
-          <a:blip r:embed="rId2">
-            <a:extLst>
-              <a:ext uri="{28A0092B-C50C-407E-A947-70E740481C1C}">
-                <a14:useLocalDpi xmlns:a14="http://schemas.microsoft.com/office/drawing/2010/main" val="0"/>
-              </a:ext>
-            </a:extLst>
-          </a:blip>
-          <a:stretch>
-            <a:fillRect/>
-          </a:stretch>
-        </p:blipFill>
-        <p:spPr>
-          <a:xfrm>
-            <a:off x="4126312" y="1825625"/>
-            <a:ext cx="3939376" cy="4351338"/>
-          </a:xfrm>
-        </p:spPr>
-      </p:pic>
+        </p:nvSpPr>
+        <p:spPr/>
+        <p:txBody>
+          <a:bodyPr/>
+          <a:lstStyle/>
+          <a:p>
+            <a:r>
+              <a:rPr lang="en-IE" dirty="0"/>
+              <a:t>Accounts Overdue Report</a:t>
+            </a:r>
+          </a:p>
+          <a:p>
+            <a:r>
+              <a:rPr lang="en-IE" dirty="0"/>
+              <a:t>Customers Report</a:t>
+            </a:r>
+          </a:p>
+          <a:p>
+            <a:r>
+              <a:rPr lang="en-IE" dirty="0"/>
+              <a:t>Employees Report</a:t>
+            </a:r>
+          </a:p>
+          <a:p>
+            <a:r>
+              <a:rPr lang="en-IE" dirty="0"/>
+              <a:t>Products Report</a:t>
+            </a:r>
+          </a:p>
+          <a:p>
+            <a:r>
+              <a:rPr lang="en-IE" dirty="0"/>
+              <a:t>Suggestion Report</a:t>
+            </a:r>
+          </a:p>
+          <a:p>
+            <a:r>
+              <a:rPr lang="en-IE" dirty="0"/>
+              <a:t>Suppliers Report</a:t>
+            </a:r>
+          </a:p>
+        </p:txBody>
+      </p:sp>
       <p:sp>
         <p:nvSpPr>
           <p:cNvPr id="4" name="TextBox 3"/>
@@ -5273,8 +5239,8 @@
         </p:nvSpPr>
         <p:spPr>
           <a:xfrm>
-            <a:off x="10323443" y="658574"/>
-            <a:ext cx="861392" cy="369332"/>
+            <a:off x="10296939" y="658574"/>
+            <a:ext cx="874644" cy="369332"/>
           </a:xfrm>
           <a:prstGeom prst="rect">
             <a:avLst/>
@@ -5289,7 +5255,7 @@
           <a:p>
             <a:r>
               <a:rPr lang="en-GB" dirty="0"/>
-              <a:t>Grigor</a:t>
+              <a:t>Dylan</a:t>
             </a:r>
           </a:p>
         </p:txBody>
@@ -5297,7 +5263,7 @@
     </p:spTree>
     <p:extLst>
       <p:ext uri="{BB962C8B-B14F-4D97-AF65-F5344CB8AC3E}">
-        <p14:creationId xmlns:p14="http://schemas.microsoft.com/office/powerpoint/2010/main" val="1212915720"/>
+        <p14:creationId xmlns:p14="http://schemas.microsoft.com/office/powerpoint/2010/main" val="1421304600"/>
       </p:ext>
     </p:extLst>
   </p:cSld>
@@ -5340,51 +5306,49 @@
           <a:lstStyle/>
           <a:p>
             <a:r>
-              <a:rPr lang="en-IE" dirty="0"/>
-              <a:t>Employees Table</a:t>
-            </a:r>
+              <a:rPr lang="en-GB" dirty="0"/>
+              <a:t>Customers from Dublin</a:t>
+            </a:r>
+            <a:endParaRPr lang="en-IE" dirty="0"/>
           </a:p>
         </p:txBody>
       </p:sp>
       <p:pic>
         <p:nvPicPr>
-          <p:cNvPr id="5" name="Content Placeholder 4"/>
-          <p:cNvPicPr>
-            <a:picLocks noGrp="1" noChangeAspect="1"/>
+          <p:cNvPr id="4" name="Content Placeholder 3"/>
+          <p:cNvPicPr preferRelativeResize="0">
+            <a:picLocks noGrp="1"/>
           </p:cNvPicPr>
           <p:nvPr>
             <p:ph idx="1"/>
           </p:nvPr>
         </p:nvPicPr>
         <p:blipFill>
-          <a:blip r:embed="rId2">
-            <a:extLst>
-              <a:ext uri="{28A0092B-C50C-407E-A947-70E740481C1C}">
-                <a14:useLocalDpi xmlns:a14="http://schemas.microsoft.com/office/drawing/2010/main" val="0"/>
-              </a:ext>
-            </a:extLst>
-          </a:blip>
+          <a:blip r:embed="rId2"/>
           <a:stretch>
             <a:fillRect/>
           </a:stretch>
         </p:blipFill>
         <p:spPr>
           <a:xfrm>
-            <a:off x="4082957" y="1825625"/>
-            <a:ext cx="4026086" cy="4351338"/>
-          </a:xfrm>
+            <a:off x="715799" y="2058395"/>
+            <a:ext cx="10638000" cy="3909600"/>
+          </a:xfrm>
+          <a:prstGeom prst="rect">
+            <a:avLst/>
+          </a:prstGeom>
         </p:spPr>
       </p:pic>
       <p:sp>
         <p:nvSpPr>
-          <p:cNvPr id="4" name="TextBox 3"/>
+          <p:cNvPr id="5" name="TextBox 4"/>
           <p:cNvSpPr txBox="1"/>
           <p:nvPr/>
         </p:nvSpPr>
         <p:spPr>
           <a:xfrm>
-            <a:off x="10323443" y="658574"/>
-            <a:ext cx="861392" cy="369332"/>
+            <a:off x="10296939" y="658574"/>
+            <a:ext cx="874644" cy="369332"/>
           </a:xfrm>
           <a:prstGeom prst="rect">
             <a:avLst/>
@@ -5399,7 +5363,7 @@
           <a:p>
             <a:r>
               <a:rPr lang="en-GB" dirty="0"/>
-              <a:t>Grigor</a:t>
+              <a:t>Dylan</a:t>
             </a:r>
           </a:p>
         </p:txBody>
@@ -5407,7 +5371,7 @@
     </p:spTree>
     <p:extLst>
       <p:ext uri="{BB962C8B-B14F-4D97-AF65-F5344CB8AC3E}">
-        <p14:creationId xmlns:p14="http://schemas.microsoft.com/office/powerpoint/2010/main" val="1055208011"/>
+        <p14:creationId xmlns:p14="http://schemas.microsoft.com/office/powerpoint/2010/main" val="2376208711"/>
       </p:ext>
     </p:extLst>
   </p:cSld>
@@ -5450,41 +5414,74 @@
           <a:lstStyle/>
           <a:p>
             <a:r>
-              <a:rPr lang="en-IE" dirty="0"/>
+              <a:rPr lang="en-GB" dirty="0"/>
+              <a:t>UML chart</a:t>
+            </a:r>
+            <a:endParaRPr lang="en-US" dirty="0"/>
+          </a:p>
+        </p:txBody>
+      </p:sp>
+      <p:sp>
+        <p:nvSpPr>
+          <p:cNvPr id="3" name="Content Placeholder 2"/>
+          <p:cNvSpPr>
+            <a:spLocks noGrp="1"/>
+          </p:cNvSpPr>
+          <p:nvPr>
+            <p:ph idx="1"/>
+          </p:nvPr>
+        </p:nvSpPr>
+        <p:spPr/>
+        <p:txBody>
+          <a:bodyPr/>
+          <a:lstStyle/>
+          <a:p>
+            <a:r>
+              <a:rPr lang="en-US" dirty="0"/>
+              <a:t>Customers Table</a:t>
+            </a:r>
+          </a:p>
+          <a:p>
+            <a:r>
+              <a:rPr lang="en-US" dirty="0"/>
+              <a:t>Employees Table</a:t>
+            </a:r>
+          </a:p>
+          <a:p>
+            <a:r>
+              <a:rPr lang="en-US" dirty="0"/>
               <a:t>Navigation Form</a:t>
             </a:r>
           </a:p>
-        </p:txBody>
-      </p:sp>
-      <p:pic>
-        <p:nvPicPr>
-          <p:cNvPr id="5" name="Content Placeholder 4"/>
-          <p:cNvPicPr>
-            <a:picLocks noGrp="1" noChangeAspect="1"/>
-          </p:cNvPicPr>
-          <p:nvPr>
-            <p:ph idx="1"/>
-          </p:nvPr>
-        </p:nvPicPr>
-        <p:blipFill>
-          <a:blip r:embed="rId2">
-            <a:extLst>
-              <a:ext uri="{28A0092B-C50C-407E-A947-70E740481C1C}">
-                <a14:useLocalDpi xmlns:a14="http://schemas.microsoft.com/office/drawing/2010/main" val="0"/>
-              </a:ext>
-            </a:extLst>
-          </a:blip>
-          <a:stretch>
-            <a:fillRect/>
-          </a:stretch>
-        </p:blipFill>
-        <p:spPr>
-          <a:xfrm>
-            <a:off x="3909707" y="2010291"/>
-            <a:ext cx="4372585" cy="3982006"/>
-          </a:xfrm>
-        </p:spPr>
-      </p:pic>
+          <a:p>
+            <a:r>
+              <a:rPr lang="en-US" dirty="0"/>
+              <a:t>Products Table</a:t>
+            </a:r>
+          </a:p>
+          <a:p>
+            <a:r>
+              <a:rPr lang="en-US" dirty="0"/>
+              <a:t>Suggestions Table</a:t>
+            </a:r>
+          </a:p>
+          <a:p>
+            <a:r>
+              <a:rPr lang="en-US" dirty="0"/>
+              <a:t>Suppliers Table</a:t>
+            </a:r>
+          </a:p>
+          <a:p>
+            <a:pPr marL="0" indent="0">
+              <a:buNone/>
+            </a:pPr>
+            <a:endParaRPr lang="en-US" dirty="0"/>
+          </a:p>
+          <a:p>
+            <a:endParaRPr lang="en-US" dirty="0"/>
+          </a:p>
+        </p:txBody>
+      </p:sp>
       <p:sp>
         <p:nvSpPr>
           <p:cNvPr id="4" name="TextBox 3"/>
@@ -5493,7 +5490,7 @@
         </p:nvSpPr>
         <p:spPr>
           <a:xfrm>
-            <a:off x="10323443" y="671826"/>
+            <a:off x="10323443" y="658574"/>
             <a:ext cx="861392" cy="369332"/>
           </a:xfrm>
           <a:prstGeom prst="rect">
@@ -5517,7 +5514,7 @@
     </p:spTree>
     <p:extLst>
       <p:ext uri="{BB962C8B-B14F-4D97-AF65-F5344CB8AC3E}">
-        <p14:creationId xmlns:p14="http://schemas.microsoft.com/office/powerpoint/2010/main" val="201746166"/>
+        <p14:creationId xmlns:p14="http://schemas.microsoft.com/office/powerpoint/2010/main" val="1248061747"/>
       </p:ext>
     </p:extLst>
   </p:cSld>
@@ -5561,7 +5558,7 @@
           <a:p>
             <a:r>
               <a:rPr lang="en-IE" dirty="0"/>
-              <a:t>Products Form</a:t>
+              <a:t>Customers Table</a:t>
             </a:r>
           </a:p>
         </p:txBody>
@@ -5590,8 +5587,8 @@
         </p:blipFill>
         <p:spPr>
           <a:xfrm>
-            <a:off x="4122819" y="1825625"/>
-            <a:ext cx="3946362" cy="4351338"/>
+            <a:off x="4126312" y="1825625"/>
+            <a:ext cx="3939376" cy="4351338"/>
           </a:xfrm>
         </p:spPr>
       </p:pic>
@@ -5627,7 +5624,7 @@
     </p:spTree>
     <p:extLst>
       <p:ext uri="{BB962C8B-B14F-4D97-AF65-F5344CB8AC3E}">
-        <p14:creationId xmlns:p14="http://schemas.microsoft.com/office/powerpoint/2010/main" val="1389347980"/>
+        <p14:creationId xmlns:p14="http://schemas.microsoft.com/office/powerpoint/2010/main" val="1212915720"/>
       </p:ext>
     </p:extLst>
   </p:cSld>
@@ -5671,7 +5668,7 @@
           <a:p>
             <a:r>
               <a:rPr lang="en-IE" dirty="0"/>
-              <a:t>Suggestion Table</a:t>
+              <a:t>Employees Table</a:t>
             </a:r>
           </a:p>
         </p:txBody>
@@ -5700,8 +5697,8 @@
         </p:blipFill>
         <p:spPr>
           <a:xfrm>
-            <a:off x="4095083" y="1825625"/>
-            <a:ext cx="4001833" cy="4351338"/>
+            <a:off x="4082957" y="1825625"/>
+            <a:ext cx="4026086" cy="4351338"/>
           </a:xfrm>
         </p:spPr>
       </p:pic>
@@ -5737,7 +5734,7 @@
     </p:spTree>
     <p:extLst>
       <p:ext uri="{BB962C8B-B14F-4D97-AF65-F5344CB8AC3E}">
-        <p14:creationId xmlns:p14="http://schemas.microsoft.com/office/powerpoint/2010/main" val="2343058775"/>
+        <p14:creationId xmlns:p14="http://schemas.microsoft.com/office/powerpoint/2010/main" val="1055208011"/>
       </p:ext>
     </p:extLst>
   </p:cSld>
@@ -5781,7 +5778,7 @@
           <a:p>
             <a:r>
               <a:rPr lang="en-IE" dirty="0"/>
-              <a:t>Suppliers Table</a:t>
+              <a:t>Navigation Form</a:t>
             </a:r>
           </a:p>
         </p:txBody>
@@ -5810,8 +5807,8 @@
         </p:blipFill>
         <p:spPr>
           <a:xfrm>
-            <a:off x="4082957" y="1825625"/>
-            <a:ext cx="4026086" cy="4351338"/>
+            <a:off x="3909707" y="2010291"/>
+            <a:ext cx="4372585" cy="3982006"/>
           </a:xfrm>
         </p:spPr>
       </p:pic>
@@ -5823,7 +5820,7 @@
         </p:nvSpPr>
         <p:spPr>
           <a:xfrm>
-            <a:off x="10323443" y="658574"/>
+            <a:off x="10323443" y="671826"/>
             <a:ext cx="861392" cy="369332"/>
           </a:xfrm>
           <a:prstGeom prst="rect">
@@ -5847,7 +5844,7 @@
     </p:spTree>
     <p:extLst>
       <p:ext uri="{BB962C8B-B14F-4D97-AF65-F5344CB8AC3E}">
-        <p14:creationId xmlns:p14="http://schemas.microsoft.com/office/powerpoint/2010/main" val="48437891"/>
+        <p14:creationId xmlns:p14="http://schemas.microsoft.com/office/powerpoint/2010/main" val="201746166"/>
       </p:ext>
     </p:extLst>
   </p:cSld>
@@ -6014,41 +6011,41 @@
           <a:lstStyle/>
           <a:p>
             <a:r>
-              <a:rPr lang="en-GB" dirty="0"/>
-              <a:t>Website</a:t>
-            </a:r>
-            <a:endParaRPr lang="en-US" dirty="0"/>
-          </a:p>
-        </p:txBody>
-      </p:sp>
-      <p:sp>
-        <p:nvSpPr>
-          <p:cNvPr id="3" name="Content Placeholder 2"/>
-          <p:cNvSpPr>
-            <a:spLocks noGrp="1"/>
-          </p:cNvSpPr>
+              <a:rPr lang="en-IE" dirty="0"/>
+              <a:t>Products Form</a:t>
+            </a:r>
+          </a:p>
+        </p:txBody>
+      </p:sp>
+      <p:pic>
+        <p:nvPicPr>
+          <p:cNvPr id="5" name="Content Placeholder 4"/>
+          <p:cNvPicPr>
+            <a:picLocks noGrp="1" noChangeAspect="1"/>
+          </p:cNvPicPr>
           <p:nvPr>
             <p:ph idx="1"/>
           </p:nvPr>
-        </p:nvSpPr>
-        <p:spPr/>
-        <p:txBody>
-          <a:bodyPr/>
-          <a:lstStyle/>
-          <a:p>
-            <a:r>
-              <a:rPr lang="en-US" dirty="0"/>
-              <a:t>Here we will present to you the MCTV Limited Website </a:t>
-            </a:r>
-          </a:p>
-          <a:p>
-            <a:r>
-              <a:rPr lang="en-US" dirty="0"/>
-              <a:t>Which will feature a Home page and 4 individual pages about the workers in the shop </a:t>
-            </a:r>
-          </a:p>
-        </p:txBody>
-      </p:sp>
+        </p:nvPicPr>
+        <p:blipFill>
+          <a:blip r:embed="rId2">
+            <a:extLst>
+              <a:ext uri="{28A0092B-C50C-407E-A947-70E740481C1C}">
+                <a14:useLocalDpi xmlns:a14="http://schemas.microsoft.com/office/drawing/2010/main" val="0"/>
+              </a:ext>
+            </a:extLst>
+          </a:blip>
+          <a:stretch>
+            <a:fillRect/>
+          </a:stretch>
+        </p:blipFill>
+        <p:spPr>
+          <a:xfrm>
+            <a:off x="4122819" y="1825625"/>
+            <a:ext cx="3946362" cy="4351338"/>
+          </a:xfrm>
+        </p:spPr>
+      </p:pic>
       <p:sp>
         <p:nvSpPr>
           <p:cNvPr id="4" name="TextBox 3"/>
@@ -6057,8 +6054,8 @@
         </p:nvSpPr>
         <p:spPr>
           <a:xfrm>
-            <a:off x="10230678" y="658574"/>
-            <a:ext cx="954156" cy="369332"/>
+            <a:off x="10323443" y="658574"/>
+            <a:ext cx="861392" cy="369332"/>
           </a:xfrm>
           <a:prstGeom prst="rect">
             <a:avLst/>
@@ -6073,7 +6070,7 @@
           <a:p>
             <a:r>
               <a:rPr lang="en-GB" dirty="0"/>
-              <a:t>Antonio</a:t>
+              <a:t>Grigor</a:t>
             </a:r>
           </a:p>
         </p:txBody>
@@ -6081,7 +6078,7 @@
     </p:spTree>
     <p:extLst>
       <p:ext uri="{BB962C8B-B14F-4D97-AF65-F5344CB8AC3E}">
-        <p14:creationId xmlns:p14="http://schemas.microsoft.com/office/powerpoint/2010/main" val="3123563747"/>
+        <p14:creationId xmlns:p14="http://schemas.microsoft.com/office/powerpoint/2010/main" val="1389347980"/>
       </p:ext>
     </p:extLst>
   </p:cSld>
@@ -6124,6 +6121,336 @@
           <a:lstStyle/>
           <a:p>
             <a:r>
+              <a:rPr lang="en-IE" dirty="0"/>
+              <a:t>Suggestion Table</a:t>
+            </a:r>
+          </a:p>
+        </p:txBody>
+      </p:sp>
+      <p:pic>
+        <p:nvPicPr>
+          <p:cNvPr id="5" name="Content Placeholder 4"/>
+          <p:cNvPicPr>
+            <a:picLocks noGrp="1" noChangeAspect="1"/>
+          </p:cNvPicPr>
+          <p:nvPr>
+            <p:ph idx="1"/>
+          </p:nvPr>
+        </p:nvPicPr>
+        <p:blipFill>
+          <a:blip r:embed="rId2">
+            <a:extLst>
+              <a:ext uri="{28A0092B-C50C-407E-A947-70E740481C1C}">
+                <a14:useLocalDpi xmlns:a14="http://schemas.microsoft.com/office/drawing/2010/main" val="0"/>
+              </a:ext>
+            </a:extLst>
+          </a:blip>
+          <a:stretch>
+            <a:fillRect/>
+          </a:stretch>
+        </p:blipFill>
+        <p:spPr>
+          <a:xfrm>
+            <a:off x="4095083" y="1825625"/>
+            <a:ext cx="4001833" cy="4351338"/>
+          </a:xfrm>
+        </p:spPr>
+      </p:pic>
+      <p:sp>
+        <p:nvSpPr>
+          <p:cNvPr id="4" name="TextBox 3"/>
+          <p:cNvSpPr txBox="1"/>
+          <p:nvPr/>
+        </p:nvSpPr>
+        <p:spPr>
+          <a:xfrm>
+            <a:off x="10323443" y="658574"/>
+            <a:ext cx="861392" cy="369332"/>
+          </a:xfrm>
+          <a:prstGeom prst="rect">
+            <a:avLst/>
+          </a:prstGeom>
+          <a:noFill/>
+        </p:spPr>
+        <p:txBody>
+          <a:bodyPr wrap="square" rtlCol="0">
+            <a:spAutoFit/>
+          </a:bodyPr>
+          <a:lstStyle/>
+          <a:p>
+            <a:r>
+              <a:rPr lang="en-GB" dirty="0"/>
+              <a:t>Grigor</a:t>
+            </a:r>
+          </a:p>
+        </p:txBody>
+      </p:sp>
+    </p:spTree>
+    <p:extLst>
+      <p:ext uri="{BB962C8B-B14F-4D97-AF65-F5344CB8AC3E}">
+        <p14:creationId xmlns:p14="http://schemas.microsoft.com/office/powerpoint/2010/main" val="2343058775"/>
+      </p:ext>
+    </p:extLst>
+  </p:cSld>
+  <p:clrMapOvr>
+    <a:masterClrMapping/>
+  </p:clrMapOvr>
+</p:sld>
+</file>
+
+<file path=ppt/slides/slide32.xml><?xml version="1.0" encoding="utf-8"?>
+<p:sld xmlns:a="http://schemas.openxmlformats.org/drawingml/2006/main" xmlns:r="http://schemas.openxmlformats.org/officeDocument/2006/relationships" xmlns:p="http://schemas.openxmlformats.org/presentationml/2006/main">
+  <p:cSld>
+    <p:spTree>
+      <p:nvGrpSpPr>
+        <p:cNvPr id="1" name=""/>
+        <p:cNvGrpSpPr/>
+        <p:nvPr/>
+      </p:nvGrpSpPr>
+      <p:grpSpPr>
+        <a:xfrm>
+          <a:off x="0" y="0"/>
+          <a:ext cx="0" cy="0"/>
+          <a:chOff x="0" y="0"/>
+          <a:chExt cx="0" cy="0"/>
+        </a:xfrm>
+      </p:grpSpPr>
+      <p:sp>
+        <p:nvSpPr>
+          <p:cNvPr id="2" name="Title 1"/>
+          <p:cNvSpPr>
+            <a:spLocks noGrp="1"/>
+          </p:cNvSpPr>
+          <p:nvPr>
+            <p:ph type="title"/>
+          </p:nvPr>
+        </p:nvSpPr>
+        <p:spPr/>
+        <p:txBody>
+          <a:bodyPr/>
+          <a:lstStyle/>
+          <a:p>
+            <a:r>
+              <a:rPr lang="en-IE" dirty="0"/>
+              <a:t>Suppliers Table</a:t>
+            </a:r>
+          </a:p>
+        </p:txBody>
+      </p:sp>
+      <p:pic>
+        <p:nvPicPr>
+          <p:cNvPr id="5" name="Content Placeholder 4"/>
+          <p:cNvPicPr>
+            <a:picLocks noGrp="1" noChangeAspect="1"/>
+          </p:cNvPicPr>
+          <p:nvPr>
+            <p:ph idx="1"/>
+          </p:nvPr>
+        </p:nvPicPr>
+        <p:blipFill>
+          <a:blip r:embed="rId2">
+            <a:extLst>
+              <a:ext uri="{28A0092B-C50C-407E-A947-70E740481C1C}">
+                <a14:useLocalDpi xmlns:a14="http://schemas.microsoft.com/office/drawing/2010/main" val="0"/>
+              </a:ext>
+            </a:extLst>
+          </a:blip>
+          <a:stretch>
+            <a:fillRect/>
+          </a:stretch>
+        </p:blipFill>
+        <p:spPr>
+          <a:xfrm>
+            <a:off x="4082957" y="1825625"/>
+            <a:ext cx="4026086" cy="4351338"/>
+          </a:xfrm>
+        </p:spPr>
+      </p:pic>
+      <p:sp>
+        <p:nvSpPr>
+          <p:cNvPr id="4" name="TextBox 3"/>
+          <p:cNvSpPr txBox="1"/>
+          <p:nvPr/>
+        </p:nvSpPr>
+        <p:spPr>
+          <a:xfrm>
+            <a:off x="10323443" y="658574"/>
+            <a:ext cx="861392" cy="369332"/>
+          </a:xfrm>
+          <a:prstGeom prst="rect">
+            <a:avLst/>
+          </a:prstGeom>
+          <a:noFill/>
+        </p:spPr>
+        <p:txBody>
+          <a:bodyPr wrap="square" rtlCol="0">
+            <a:spAutoFit/>
+          </a:bodyPr>
+          <a:lstStyle/>
+          <a:p>
+            <a:r>
+              <a:rPr lang="en-GB" dirty="0"/>
+              <a:t>Grigor</a:t>
+            </a:r>
+          </a:p>
+        </p:txBody>
+      </p:sp>
+    </p:spTree>
+    <p:extLst>
+      <p:ext uri="{BB962C8B-B14F-4D97-AF65-F5344CB8AC3E}">
+        <p14:creationId xmlns:p14="http://schemas.microsoft.com/office/powerpoint/2010/main" val="48437891"/>
+      </p:ext>
+    </p:extLst>
+  </p:cSld>
+  <p:clrMapOvr>
+    <a:masterClrMapping/>
+  </p:clrMapOvr>
+</p:sld>
+</file>
+
+<file path=ppt/slides/slide33.xml><?xml version="1.0" encoding="utf-8"?>
+<p:sld xmlns:a="http://schemas.openxmlformats.org/drawingml/2006/main" xmlns:r="http://schemas.openxmlformats.org/officeDocument/2006/relationships" xmlns:p="http://schemas.openxmlformats.org/presentationml/2006/main">
+  <p:cSld>
+    <p:spTree>
+      <p:nvGrpSpPr>
+        <p:cNvPr id="1" name=""/>
+        <p:cNvGrpSpPr/>
+        <p:nvPr/>
+      </p:nvGrpSpPr>
+      <p:grpSpPr>
+        <a:xfrm>
+          <a:off x="0" y="0"/>
+          <a:ext cx="0" cy="0"/>
+          <a:chOff x="0" y="0"/>
+          <a:chExt cx="0" cy="0"/>
+        </a:xfrm>
+      </p:grpSpPr>
+      <p:sp>
+        <p:nvSpPr>
+          <p:cNvPr id="2" name="Title 1"/>
+          <p:cNvSpPr>
+            <a:spLocks noGrp="1"/>
+          </p:cNvSpPr>
+          <p:nvPr>
+            <p:ph type="title"/>
+          </p:nvPr>
+        </p:nvSpPr>
+        <p:spPr/>
+        <p:txBody>
+          <a:bodyPr/>
+          <a:lstStyle/>
+          <a:p>
+            <a:r>
+              <a:rPr lang="en-GB" dirty="0"/>
+              <a:t>Website</a:t>
+            </a:r>
+            <a:endParaRPr lang="en-US" dirty="0"/>
+          </a:p>
+        </p:txBody>
+      </p:sp>
+      <p:sp>
+        <p:nvSpPr>
+          <p:cNvPr id="3" name="Content Placeholder 2"/>
+          <p:cNvSpPr>
+            <a:spLocks noGrp="1"/>
+          </p:cNvSpPr>
+          <p:nvPr>
+            <p:ph idx="1"/>
+          </p:nvPr>
+        </p:nvSpPr>
+        <p:spPr/>
+        <p:txBody>
+          <a:bodyPr/>
+          <a:lstStyle/>
+          <a:p>
+            <a:r>
+              <a:rPr lang="en-US" dirty="0"/>
+              <a:t>Here we will present to you the MCTV Limited Website </a:t>
+            </a:r>
+          </a:p>
+          <a:p>
+            <a:r>
+              <a:rPr lang="en-US" dirty="0"/>
+              <a:t>Which will feature a Home page and 4 individual pages about the workers in the shop </a:t>
+            </a:r>
+          </a:p>
+        </p:txBody>
+      </p:sp>
+      <p:sp>
+        <p:nvSpPr>
+          <p:cNvPr id="4" name="TextBox 3"/>
+          <p:cNvSpPr txBox="1"/>
+          <p:nvPr/>
+        </p:nvSpPr>
+        <p:spPr>
+          <a:xfrm>
+            <a:off x="10230678" y="658574"/>
+            <a:ext cx="954156" cy="369332"/>
+          </a:xfrm>
+          <a:prstGeom prst="rect">
+            <a:avLst/>
+          </a:prstGeom>
+          <a:noFill/>
+        </p:spPr>
+        <p:txBody>
+          <a:bodyPr wrap="square" rtlCol="0">
+            <a:spAutoFit/>
+          </a:bodyPr>
+          <a:lstStyle/>
+          <a:p>
+            <a:r>
+              <a:rPr lang="en-GB" dirty="0"/>
+              <a:t>Antonio</a:t>
+            </a:r>
+          </a:p>
+        </p:txBody>
+      </p:sp>
+    </p:spTree>
+    <p:extLst>
+      <p:ext uri="{BB962C8B-B14F-4D97-AF65-F5344CB8AC3E}">
+        <p14:creationId xmlns:p14="http://schemas.microsoft.com/office/powerpoint/2010/main" val="3123563747"/>
+      </p:ext>
+    </p:extLst>
+  </p:cSld>
+  <p:clrMapOvr>
+    <a:masterClrMapping/>
+  </p:clrMapOvr>
+</p:sld>
+</file>
+
+<file path=ppt/slides/slide34.xml><?xml version="1.0" encoding="utf-8"?>
+<p:sld xmlns:a="http://schemas.openxmlformats.org/drawingml/2006/main" xmlns:r="http://schemas.openxmlformats.org/officeDocument/2006/relationships" xmlns:p="http://schemas.openxmlformats.org/presentationml/2006/main">
+  <p:cSld>
+    <p:spTree>
+      <p:nvGrpSpPr>
+        <p:cNvPr id="1" name=""/>
+        <p:cNvGrpSpPr/>
+        <p:nvPr/>
+      </p:nvGrpSpPr>
+      <p:grpSpPr>
+        <a:xfrm>
+          <a:off x="0" y="0"/>
+          <a:ext cx="0" cy="0"/>
+          <a:chOff x="0" y="0"/>
+          <a:chExt cx="0" cy="0"/>
+        </a:xfrm>
+      </p:grpSpPr>
+      <p:sp>
+        <p:nvSpPr>
+          <p:cNvPr id="2" name="Title 1"/>
+          <p:cNvSpPr>
+            <a:spLocks noGrp="1"/>
+          </p:cNvSpPr>
+          <p:nvPr>
+            <p:ph type="title"/>
+          </p:nvPr>
+        </p:nvSpPr>
+        <p:spPr/>
+        <p:txBody>
+          <a:bodyPr/>
+          <a:lstStyle/>
+          <a:p>
+            <a:r>
               <a:rPr lang="en-GB" dirty="0"/>
               <a:t>Conclusion</a:t>
             </a:r>
@@ -6213,7 +6540,7 @@
 </p:sld>
 </file>
 
-<file path=ppt/slides/slide32.xml><?xml version="1.0" encoding="utf-8"?>
+<file path=ppt/slides/slide35.xml><?xml version="1.0" encoding="utf-8"?>
 <p:sld xmlns:a="http://schemas.openxmlformats.org/drawingml/2006/main" xmlns:r="http://schemas.openxmlformats.org/officeDocument/2006/relationships" xmlns:p="http://schemas.openxmlformats.org/presentationml/2006/main">
   <p:cSld>
     <p:spTree>

</xml_diff>

<commit_message>
Add and finish changes on Presentation
</commit_message>
<xml_diff>
--- a/MCTV Limited.pptx
+++ b/MCTV Limited.pptx
@@ -4341,9 +4341,10 @@
           <a:lstStyle/>
           <a:p>
             <a:r>
-              <a:rPr lang="en-GB" dirty="0"/>
-              <a:t>Dylan</a:t>
-            </a:r>
+              <a:rPr lang="en-GB" dirty="0" err="1"/>
+              <a:t>Grigor</a:t>
+            </a:r>
+            <a:endParaRPr lang="en-GB" dirty="0"/>
           </a:p>
         </p:txBody>
       </p:sp>
@@ -4451,9 +4452,10 @@
           <a:lstStyle/>
           <a:p>
             <a:r>
-              <a:rPr lang="en-GB" dirty="0"/>
-              <a:t>Dylan</a:t>
-            </a:r>
+              <a:rPr lang="en-GB" dirty="0" err="1"/>
+              <a:t>Grigor</a:t>
+            </a:r>
+            <a:endParaRPr lang="en-GB" dirty="0"/>
           </a:p>
         </p:txBody>
       </p:sp>
@@ -4561,9 +4563,10 @@
           <a:lstStyle/>
           <a:p>
             <a:r>
-              <a:rPr lang="en-GB" dirty="0"/>
-              <a:t>Dylan</a:t>
-            </a:r>
+              <a:rPr lang="en-GB" dirty="0" err="1"/>
+              <a:t>Grigor</a:t>
+            </a:r>
+            <a:endParaRPr lang="en-GB" dirty="0"/>
           </a:p>
         </p:txBody>
       </p:sp>
@@ -4791,9 +4794,10 @@
           <a:lstStyle/>
           <a:p>
             <a:r>
-              <a:rPr lang="en-GB" dirty="0"/>
-              <a:t>Dylan</a:t>
-            </a:r>
+              <a:rPr lang="en-GB" dirty="0" err="1"/>
+              <a:t>Grigor</a:t>
+            </a:r>
+            <a:endParaRPr lang="en-GB" dirty="0"/>
           </a:p>
         </p:txBody>
       </p:sp>
@@ -4901,9 +4905,10 @@
           <a:lstStyle/>
           <a:p>
             <a:r>
-              <a:rPr lang="en-GB" dirty="0"/>
-              <a:t>Dylan</a:t>
-            </a:r>
+              <a:rPr lang="en-GB" dirty="0" err="1"/>
+              <a:t>Grigor</a:t>
+            </a:r>
+            <a:endParaRPr lang="en-GB" dirty="0"/>
           </a:p>
         </p:txBody>
       </p:sp>
@@ -5011,9 +5016,10 @@
           <a:lstStyle/>
           <a:p>
             <a:r>
-              <a:rPr lang="en-GB" dirty="0"/>
-              <a:t>Dylan</a:t>
-            </a:r>
+              <a:rPr lang="en-GB" dirty="0" err="1"/>
+              <a:t>Grigor</a:t>
+            </a:r>
+            <a:endParaRPr lang="en-GB" dirty="0"/>
           </a:p>
         </p:txBody>
       </p:sp>

</xml_diff>

<commit_message>
Finish all changes om Presentation
</commit_message>
<xml_diff>
--- a/MCTV Limited.pptx
+++ b/MCTV Limited.pptx
@@ -38,8 +38,19 @@
     <p:sldId id="286" r:id="rId32"/>
     <p:sldId id="287" r:id="rId33"/>
     <p:sldId id="263" r:id="rId34"/>
-    <p:sldId id="264" r:id="rId35"/>
-    <p:sldId id="265" r:id="rId36"/>
+    <p:sldId id="292" r:id="rId35"/>
+    <p:sldId id="302" r:id="rId36"/>
+    <p:sldId id="293" r:id="rId37"/>
+    <p:sldId id="294" r:id="rId38"/>
+    <p:sldId id="295" r:id="rId39"/>
+    <p:sldId id="296" r:id="rId40"/>
+    <p:sldId id="297" r:id="rId41"/>
+    <p:sldId id="298" r:id="rId42"/>
+    <p:sldId id="299" r:id="rId43"/>
+    <p:sldId id="300" r:id="rId44"/>
+    <p:sldId id="301" r:id="rId45"/>
+    <p:sldId id="264" r:id="rId46"/>
+    <p:sldId id="265" r:id="rId47"/>
   </p:sldIdLst>
   <p:sldSz cx="12192000" cy="6858000"/>
   <p:notesSz cx="6858000" cy="9144000"/>
@@ -3677,7 +3688,7 @@
           <a:p>
             <a:r>
               <a:rPr lang="en-IE" dirty="0"/>
-              <a:t>Suggestion Table</a:t>
+              <a:t>Suggestions Table</a:t>
             </a:r>
           </a:p>
           <a:p>
@@ -3949,8 +3960,12 @@
           </a:p>
           <a:p>
             <a:r>
+              <a:rPr lang="en-IE"/>
+              <a:t>Suggestions </a:t>
+            </a:r>
+            <a:r>
               <a:rPr lang="en-IE" dirty="0"/>
-              <a:t>Suggestion Query</a:t>
+              <a:t>Query</a:t>
             </a:r>
           </a:p>
           <a:p>
@@ -4737,7 +4752,7 @@
           <a:p>
             <a:r>
               <a:rPr lang="en-IE" dirty="0"/>
-              <a:t>Product Form</a:t>
+              <a:t>Products Form</a:t>
             </a:r>
           </a:p>
         </p:txBody>
@@ -4848,7 +4863,7 @@
           <a:p>
             <a:r>
               <a:rPr lang="en-IE" dirty="0"/>
-              <a:t>Suggestion Form</a:t>
+              <a:t>Suggestions Form</a:t>
             </a:r>
           </a:p>
         </p:txBody>
@@ -5226,7 +5241,7 @@
           <a:p>
             <a:r>
               <a:rPr lang="en-IE" dirty="0"/>
-              <a:t>Suggestion Report</a:t>
+              <a:t>Suggestions Report</a:t>
             </a:r>
           </a:p>
           <a:p>
@@ -6018,7 +6033,7 @@
           <a:p>
             <a:r>
               <a:rPr lang="en-IE" dirty="0"/>
-              <a:t>Products Form</a:t>
+              <a:t>Products Table</a:t>
             </a:r>
           </a:p>
         </p:txBody>
@@ -6128,7 +6143,7 @@
           <a:p>
             <a:r>
               <a:rPr lang="en-IE" dirty="0"/>
-              <a:t>Suggestion Table</a:t>
+              <a:t>Suggestions Table</a:t>
             </a:r>
           </a:p>
         </p:txBody>
@@ -6457,49 +6472,9 @@
           <a:lstStyle/>
           <a:p>
             <a:r>
-              <a:rPr lang="en-GB" dirty="0"/>
-              <a:t>Conclusion</a:t>
-            </a:r>
-            <a:endParaRPr lang="en-US" dirty="0"/>
-          </a:p>
-        </p:txBody>
-      </p:sp>
-      <p:sp>
-        <p:nvSpPr>
-          <p:cNvPr id="3" name="Content Placeholder 2"/>
-          <p:cNvSpPr>
-            <a:spLocks noGrp="1"/>
-          </p:cNvSpPr>
-          <p:nvPr>
-            <p:ph idx="1"/>
-          </p:nvPr>
-        </p:nvSpPr>
-        <p:spPr/>
-        <p:txBody>
-          <a:bodyPr/>
-          <a:lstStyle/>
-          <a:p>
-            <a:r>
-              <a:rPr lang="en-US" dirty="0"/>
-              <a:t>MCTV Limited will continue to grow as a company in future </a:t>
-            </a:r>
-          </a:p>
-          <a:p>
-            <a:r>
-              <a:rPr lang="en-US" dirty="0"/>
-              <a:t>We hope that as the company moves to the cloud it will become more efficient. </a:t>
-            </a:r>
-          </a:p>
-          <a:p>
-            <a:r>
-              <a:rPr lang="en-US" dirty="0"/>
-              <a:t>As cloud technology improves further into the future we hope that MCTV limited will follow and become a larger and better company. </a:t>
-            </a:r>
-          </a:p>
-          <a:p>
-            <a:endParaRPr lang="en-US" dirty="0"/>
-          </a:p>
-          <a:p>
+              <a:rPr lang="en-GB" dirty="0" err="1"/>
+              <a:t>Userguide</a:t>
+            </a:r>
             <a:endParaRPr lang="en-US" dirty="0"/>
           </a:p>
         </p:txBody>
@@ -6512,8 +6487,8 @@
         </p:nvSpPr>
         <p:spPr>
           <a:xfrm>
-            <a:off x="10217426" y="658574"/>
-            <a:ext cx="940904" cy="369332"/>
+            <a:off x="10230678" y="658574"/>
+            <a:ext cx="954156" cy="369332"/>
           </a:xfrm>
           <a:prstGeom prst="rect">
             <a:avLst/>
@@ -6533,10 +6508,39 @@
           </a:p>
         </p:txBody>
       </p:sp>
+      <p:pic>
+        <p:nvPicPr>
+          <p:cNvPr id="9" name="Content Placeholder 8"/>
+          <p:cNvPicPr>
+            <a:picLocks noGrp="1" noChangeAspect="1"/>
+          </p:cNvPicPr>
+          <p:nvPr>
+            <p:ph idx="1"/>
+          </p:nvPr>
+        </p:nvPicPr>
+        <p:blipFill>
+          <a:blip r:embed="rId2">
+            <a:extLst>
+              <a:ext uri="{28A0092B-C50C-407E-A947-70E740481C1C}">
+                <a14:useLocalDpi xmlns:a14="http://schemas.microsoft.com/office/drawing/2010/main" val="0"/>
+              </a:ext>
+            </a:extLst>
+          </a:blip>
+          <a:stretch>
+            <a:fillRect/>
+          </a:stretch>
+        </p:blipFill>
+        <p:spPr>
+          <a:xfrm>
+            <a:off x="3171475" y="1825625"/>
+            <a:ext cx="5849049" cy="4351338"/>
+          </a:xfrm>
+        </p:spPr>
+      </p:pic>
     </p:spTree>
     <p:extLst>
       <p:ext uri="{BB962C8B-B14F-4D97-AF65-F5344CB8AC3E}">
-        <p14:creationId xmlns:p14="http://schemas.microsoft.com/office/powerpoint/2010/main" val="2325120104"/>
+        <p14:creationId xmlns:p14="http://schemas.microsoft.com/office/powerpoint/2010/main" val="3506511626"/>
       </p:ext>
     </p:extLst>
   </p:cSld>
@@ -6579,75 +6583,22 @@
           <a:lstStyle/>
           <a:p>
             <a:r>
-              <a:rPr lang="en-GB"/>
-              <a:t>Questions?</a:t>
-            </a:r>
-            <a:endParaRPr lang="en-US" dirty="0"/>
-          </a:p>
-        </p:txBody>
-      </p:sp>
-      <p:sp>
-        <p:nvSpPr>
-          <p:cNvPr id="3" name="Content Placeholder 2"/>
-          <p:cNvSpPr>
-            <a:spLocks noGrp="1"/>
-          </p:cNvSpPr>
-          <p:nvPr>
-            <p:ph idx="1"/>
-          </p:nvPr>
-        </p:nvSpPr>
-        <p:spPr>
-          <a:xfrm>
-            <a:off x="838200" y="1825625"/>
-            <a:ext cx="10515600" cy="4351338"/>
-          </a:xfrm>
-        </p:spPr>
-        <p:txBody>
-          <a:bodyPr/>
-          <a:lstStyle/>
-          <a:p>
-            <a:pPr algn="ctr"/>
-            <a:endParaRPr lang="en-US" dirty="0"/>
-          </a:p>
-          <a:p>
-            <a:pPr marL="0" indent="0" algn="ctr">
-              <a:buNone/>
-            </a:pPr>
-            <a:r>
-              <a:rPr lang="en-US" dirty="0"/>
-              <a:t>Thank you for listening </a:t>
-            </a:r>
-          </a:p>
-          <a:p>
-            <a:pPr marL="0" indent="0" algn="ctr">
-              <a:buNone/>
-            </a:pPr>
-            <a:r>
-              <a:rPr lang="en-US" dirty="0"/>
-              <a:t>Any Questions?</a:t>
-            </a:r>
-          </a:p>
-          <a:p>
-            <a:pPr marL="0" indent="0" algn="ctr">
-              <a:buNone/>
-            </a:pPr>
-            <a:endParaRPr lang="en-US" dirty="0"/>
-          </a:p>
-          <a:p>
-            <a:pPr marL="0" indent="0" algn="ctr">
-              <a:buNone/>
-            </a:pPr>
+              <a:rPr lang="en-GB" dirty="0" err="1"/>
+              <a:t>Userguide</a:t>
+            </a:r>
             <a:endParaRPr lang="en-US" dirty="0"/>
           </a:p>
         </p:txBody>
       </p:sp>
       <p:pic>
         <p:nvPicPr>
-          <p:cNvPr id="1026" name="Picture 2" descr="Image result for questions mark images"/>
+          <p:cNvPr id="5" name="Content Placeholder 4"/>
           <p:cNvPicPr>
-            <a:picLocks noChangeAspect="1" noChangeArrowheads="1"/>
+            <a:picLocks noGrp="1" noChangeAspect="1"/>
           </p:cNvPicPr>
-          <p:nvPr/>
+          <p:nvPr>
+            <p:ph idx="1"/>
+          </p:nvPr>
         </p:nvPicPr>
         <p:blipFill>
           <a:blip r:embed="rId2">
@@ -6657,41 +6608,109 @@
               </a:ext>
             </a:extLst>
           </a:blip>
-          <a:srcRect/>
           <a:stretch>
             <a:fillRect/>
           </a:stretch>
         </p:blipFill>
-        <p:spPr bwMode="auto">
-          <a:xfrm>
-            <a:off x="5028993" y="3642071"/>
-            <a:ext cx="1895475" cy="2409825"/>
+        <p:spPr>
+          <a:xfrm>
+            <a:off x="3048000" y="1924844"/>
+            <a:ext cx="6096000" cy="4152900"/>
+          </a:xfrm>
+        </p:spPr>
+      </p:pic>
+      <p:sp>
+        <p:nvSpPr>
+          <p:cNvPr id="4" name="TextBox 3"/>
+          <p:cNvSpPr txBox="1"/>
+          <p:nvPr/>
+        </p:nvSpPr>
+        <p:spPr>
+          <a:xfrm>
+            <a:off x="10230678" y="658574"/>
+            <a:ext cx="954156" cy="369332"/>
           </a:xfrm>
           <a:prstGeom prst="rect">
             <a:avLst/>
           </a:prstGeom>
           <a:noFill/>
-          <a:extLst>
-            <a:ext uri="{909E8E84-426E-40DD-AFC4-6F175D3DCCD1}">
-              <a14:hiddenFill xmlns:a14="http://schemas.microsoft.com/office/drawing/2010/main">
-                <a:solidFill>
-                  <a:srgbClr val="FFFFFF"/>
-                </a:solidFill>
-              </a14:hiddenFill>
-            </a:ext>
-          </a:extLst>
-        </p:spPr>
-      </p:pic>
-      <p:sp>
-        <p:nvSpPr>
-          <p:cNvPr id="5" name="TextBox 4"/>
+        </p:spPr>
+        <p:txBody>
+          <a:bodyPr wrap="square" rtlCol="0">
+            <a:spAutoFit/>
+          </a:bodyPr>
+          <a:lstStyle/>
+          <a:p>
+            <a:r>
+              <a:rPr lang="en-GB" dirty="0"/>
+              <a:t>Antonio</a:t>
+            </a:r>
+          </a:p>
+        </p:txBody>
+      </p:sp>
+    </p:spTree>
+    <p:extLst>
+      <p:ext uri="{BB962C8B-B14F-4D97-AF65-F5344CB8AC3E}">
+        <p14:creationId xmlns:p14="http://schemas.microsoft.com/office/powerpoint/2010/main" val="2742509863"/>
+      </p:ext>
+    </p:extLst>
+  </p:cSld>
+  <p:clrMapOvr>
+    <a:masterClrMapping/>
+  </p:clrMapOvr>
+</p:sld>
+</file>
+
+<file path=ppt/slides/slide36.xml><?xml version="1.0" encoding="utf-8"?>
+<p:sld xmlns:a="http://schemas.openxmlformats.org/drawingml/2006/main" xmlns:r="http://schemas.openxmlformats.org/officeDocument/2006/relationships" xmlns:p="http://schemas.openxmlformats.org/presentationml/2006/main">
+  <p:cSld>
+    <p:spTree>
+      <p:nvGrpSpPr>
+        <p:cNvPr id="1" name=""/>
+        <p:cNvGrpSpPr/>
+        <p:nvPr/>
+      </p:nvGrpSpPr>
+      <p:grpSpPr>
+        <a:xfrm>
+          <a:off x="0" y="0"/>
+          <a:ext cx="0" cy="0"/>
+          <a:chOff x="0" y="0"/>
+          <a:chExt cx="0" cy="0"/>
+        </a:xfrm>
+      </p:grpSpPr>
+      <p:sp>
+        <p:nvSpPr>
+          <p:cNvPr id="2" name="Title 1"/>
+          <p:cNvSpPr>
+            <a:spLocks noGrp="1"/>
+          </p:cNvSpPr>
+          <p:nvPr>
+            <p:ph type="title"/>
+          </p:nvPr>
+        </p:nvSpPr>
+        <p:spPr/>
+        <p:txBody>
+          <a:bodyPr/>
+          <a:lstStyle/>
+          <a:p>
+            <a:r>
+              <a:rPr lang="en-GB" dirty="0" err="1"/>
+              <a:t>Userguide</a:t>
+            </a:r>
+            <a:endParaRPr lang="en-US" dirty="0"/>
+          </a:p>
+        </p:txBody>
+      </p:sp>
+      <p:sp>
+        <p:nvSpPr>
+          <p:cNvPr id="4" name="TextBox 3"/>
           <p:cNvSpPr txBox="1"/>
           <p:nvPr/>
         </p:nvSpPr>
         <p:spPr>
           <a:xfrm>
-            <a:off x="10204173" y="658574"/>
-            <a:ext cx="1149626" cy="369332"/>
+            <a:off x="10230678" y="658574"/>
+            <a:ext cx="954156" cy="369332"/>
           </a:xfrm>
           <a:prstGeom prst="rect">
             <a:avLst/>
@@ -6706,15 +6725,377 @@
           <a:p>
             <a:r>
               <a:rPr lang="en-GB" dirty="0"/>
-              <a:t>Everyone</a:t>
-            </a:r>
-          </a:p>
-        </p:txBody>
-      </p:sp>
+              <a:t>Antonio</a:t>
+            </a:r>
+          </a:p>
+        </p:txBody>
+      </p:sp>
+      <p:pic>
+        <p:nvPicPr>
+          <p:cNvPr id="6" name="Content Placeholder 5"/>
+          <p:cNvPicPr>
+            <a:picLocks noGrp="1" noChangeAspect="1"/>
+          </p:cNvPicPr>
+          <p:nvPr>
+            <p:ph idx="1"/>
+          </p:nvPr>
+        </p:nvPicPr>
+        <p:blipFill>
+          <a:blip r:embed="rId2">
+            <a:extLst>
+              <a:ext uri="{28A0092B-C50C-407E-A947-70E740481C1C}">
+                <a14:useLocalDpi xmlns:a14="http://schemas.microsoft.com/office/drawing/2010/main" val="0"/>
+              </a:ext>
+            </a:extLst>
+          </a:blip>
+          <a:stretch>
+            <a:fillRect/>
+          </a:stretch>
+        </p:blipFill>
+        <p:spPr>
+          <a:xfrm>
+            <a:off x="4767262" y="2415381"/>
+            <a:ext cx="2657475" cy="3171825"/>
+          </a:xfrm>
+        </p:spPr>
+      </p:pic>
     </p:spTree>
     <p:extLst>
       <p:ext uri="{BB962C8B-B14F-4D97-AF65-F5344CB8AC3E}">
-        <p14:creationId xmlns:p14="http://schemas.microsoft.com/office/powerpoint/2010/main" val="3349935074"/>
+        <p14:creationId xmlns:p14="http://schemas.microsoft.com/office/powerpoint/2010/main" val="2878004487"/>
+      </p:ext>
+    </p:extLst>
+  </p:cSld>
+  <p:clrMapOvr>
+    <a:masterClrMapping/>
+  </p:clrMapOvr>
+</p:sld>
+</file>
+
+<file path=ppt/slides/slide37.xml><?xml version="1.0" encoding="utf-8"?>
+<p:sld xmlns:a="http://schemas.openxmlformats.org/drawingml/2006/main" xmlns:r="http://schemas.openxmlformats.org/officeDocument/2006/relationships" xmlns:p="http://schemas.openxmlformats.org/presentationml/2006/main">
+  <p:cSld>
+    <p:spTree>
+      <p:nvGrpSpPr>
+        <p:cNvPr id="1" name=""/>
+        <p:cNvGrpSpPr/>
+        <p:nvPr/>
+      </p:nvGrpSpPr>
+      <p:grpSpPr>
+        <a:xfrm>
+          <a:off x="0" y="0"/>
+          <a:ext cx="0" cy="0"/>
+          <a:chOff x="0" y="0"/>
+          <a:chExt cx="0" cy="0"/>
+        </a:xfrm>
+      </p:grpSpPr>
+      <p:sp>
+        <p:nvSpPr>
+          <p:cNvPr id="2" name="Title 1"/>
+          <p:cNvSpPr>
+            <a:spLocks noGrp="1"/>
+          </p:cNvSpPr>
+          <p:nvPr>
+            <p:ph type="title"/>
+          </p:nvPr>
+        </p:nvSpPr>
+        <p:spPr/>
+        <p:txBody>
+          <a:bodyPr/>
+          <a:lstStyle/>
+          <a:p>
+            <a:r>
+              <a:rPr lang="en-GB" dirty="0" err="1"/>
+              <a:t>Userguide</a:t>
+            </a:r>
+            <a:endParaRPr lang="en-US" dirty="0"/>
+          </a:p>
+        </p:txBody>
+      </p:sp>
+      <p:sp>
+        <p:nvSpPr>
+          <p:cNvPr id="4" name="TextBox 3"/>
+          <p:cNvSpPr txBox="1"/>
+          <p:nvPr/>
+        </p:nvSpPr>
+        <p:spPr>
+          <a:xfrm>
+            <a:off x="10230678" y="658574"/>
+            <a:ext cx="954156" cy="369332"/>
+          </a:xfrm>
+          <a:prstGeom prst="rect">
+            <a:avLst/>
+          </a:prstGeom>
+          <a:noFill/>
+        </p:spPr>
+        <p:txBody>
+          <a:bodyPr wrap="square" rtlCol="0">
+            <a:spAutoFit/>
+          </a:bodyPr>
+          <a:lstStyle/>
+          <a:p>
+            <a:r>
+              <a:rPr lang="en-GB" dirty="0"/>
+              <a:t>Antonio</a:t>
+            </a:r>
+          </a:p>
+        </p:txBody>
+      </p:sp>
+      <p:pic>
+        <p:nvPicPr>
+          <p:cNvPr id="5" name="Content Placeholder 4"/>
+          <p:cNvPicPr>
+            <a:picLocks noGrp="1" noChangeAspect="1"/>
+          </p:cNvPicPr>
+          <p:nvPr>
+            <p:ph idx="1"/>
+          </p:nvPr>
+        </p:nvPicPr>
+        <p:blipFill>
+          <a:blip r:embed="rId2">
+            <a:extLst>
+              <a:ext uri="{28A0092B-C50C-407E-A947-70E740481C1C}">
+                <a14:useLocalDpi xmlns:a14="http://schemas.microsoft.com/office/drawing/2010/main" val="0"/>
+              </a:ext>
+            </a:extLst>
+          </a:blip>
+          <a:stretch>
+            <a:fillRect/>
+          </a:stretch>
+        </p:blipFill>
+        <p:spPr>
+          <a:xfrm>
+            <a:off x="3005137" y="2148681"/>
+            <a:ext cx="6181725" cy="3705225"/>
+          </a:xfrm>
+        </p:spPr>
+      </p:pic>
+    </p:spTree>
+    <p:extLst>
+      <p:ext uri="{BB962C8B-B14F-4D97-AF65-F5344CB8AC3E}">
+        <p14:creationId xmlns:p14="http://schemas.microsoft.com/office/powerpoint/2010/main" val="54301215"/>
+      </p:ext>
+    </p:extLst>
+  </p:cSld>
+  <p:clrMapOvr>
+    <a:masterClrMapping/>
+  </p:clrMapOvr>
+</p:sld>
+</file>
+
+<file path=ppt/slides/slide38.xml><?xml version="1.0" encoding="utf-8"?>
+<p:sld xmlns:a="http://schemas.openxmlformats.org/drawingml/2006/main" xmlns:r="http://schemas.openxmlformats.org/officeDocument/2006/relationships" xmlns:p="http://schemas.openxmlformats.org/presentationml/2006/main">
+  <p:cSld>
+    <p:spTree>
+      <p:nvGrpSpPr>
+        <p:cNvPr id="1" name=""/>
+        <p:cNvGrpSpPr/>
+        <p:nvPr/>
+      </p:nvGrpSpPr>
+      <p:grpSpPr>
+        <a:xfrm>
+          <a:off x="0" y="0"/>
+          <a:ext cx="0" cy="0"/>
+          <a:chOff x="0" y="0"/>
+          <a:chExt cx="0" cy="0"/>
+        </a:xfrm>
+      </p:grpSpPr>
+      <p:sp>
+        <p:nvSpPr>
+          <p:cNvPr id="2" name="Title 1"/>
+          <p:cNvSpPr>
+            <a:spLocks noGrp="1"/>
+          </p:cNvSpPr>
+          <p:nvPr>
+            <p:ph type="title"/>
+          </p:nvPr>
+        </p:nvSpPr>
+        <p:spPr/>
+        <p:txBody>
+          <a:bodyPr/>
+          <a:lstStyle/>
+          <a:p>
+            <a:r>
+              <a:rPr lang="en-GB" dirty="0" err="1"/>
+              <a:t>Userguide</a:t>
+            </a:r>
+            <a:endParaRPr lang="en-US" dirty="0"/>
+          </a:p>
+        </p:txBody>
+      </p:sp>
+      <p:sp>
+        <p:nvSpPr>
+          <p:cNvPr id="4" name="TextBox 3"/>
+          <p:cNvSpPr txBox="1"/>
+          <p:nvPr/>
+        </p:nvSpPr>
+        <p:spPr>
+          <a:xfrm>
+            <a:off x="10230678" y="658574"/>
+            <a:ext cx="954156" cy="369332"/>
+          </a:xfrm>
+          <a:prstGeom prst="rect">
+            <a:avLst/>
+          </a:prstGeom>
+          <a:noFill/>
+        </p:spPr>
+        <p:txBody>
+          <a:bodyPr wrap="square" rtlCol="0">
+            <a:spAutoFit/>
+          </a:bodyPr>
+          <a:lstStyle/>
+          <a:p>
+            <a:r>
+              <a:rPr lang="en-GB" dirty="0"/>
+              <a:t>Antonio</a:t>
+            </a:r>
+          </a:p>
+        </p:txBody>
+      </p:sp>
+      <p:pic>
+        <p:nvPicPr>
+          <p:cNvPr id="6" name="Content Placeholder 5"/>
+          <p:cNvPicPr>
+            <a:picLocks noGrp="1" noChangeAspect="1"/>
+          </p:cNvPicPr>
+          <p:nvPr>
+            <p:ph idx="1"/>
+          </p:nvPr>
+        </p:nvPicPr>
+        <p:blipFill>
+          <a:blip r:embed="rId2">
+            <a:extLst>
+              <a:ext uri="{28A0092B-C50C-407E-A947-70E740481C1C}">
+                <a14:useLocalDpi xmlns:a14="http://schemas.microsoft.com/office/drawing/2010/main" val="0"/>
+              </a:ext>
+            </a:extLst>
+          </a:blip>
+          <a:stretch>
+            <a:fillRect/>
+          </a:stretch>
+        </p:blipFill>
+        <p:spPr>
+          <a:xfrm>
+            <a:off x="3089621" y="1825625"/>
+            <a:ext cx="6012757" cy="4351338"/>
+          </a:xfrm>
+        </p:spPr>
+      </p:pic>
+    </p:spTree>
+    <p:extLst>
+      <p:ext uri="{BB962C8B-B14F-4D97-AF65-F5344CB8AC3E}">
+        <p14:creationId xmlns:p14="http://schemas.microsoft.com/office/powerpoint/2010/main" val="2695689078"/>
+      </p:ext>
+    </p:extLst>
+  </p:cSld>
+  <p:clrMapOvr>
+    <a:masterClrMapping/>
+  </p:clrMapOvr>
+</p:sld>
+</file>
+
+<file path=ppt/slides/slide39.xml><?xml version="1.0" encoding="utf-8"?>
+<p:sld xmlns:a="http://schemas.openxmlformats.org/drawingml/2006/main" xmlns:r="http://schemas.openxmlformats.org/officeDocument/2006/relationships" xmlns:p="http://schemas.openxmlformats.org/presentationml/2006/main">
+  <p:cSld>
+    <p:spTree>
+      <p:nvGrpSpPr>
+        <p:cNvPr id="1" name=""/>
+        <p:cNvGrpSpPr/>
+        <p:nvPr/>
+      </p:nvGrpSpPr>
+      <p:grpSpPr>
+        <a:xfrm>
+          <a:off x="0" y="0"/>
+          <a:ext cx="0" cy="0"/>
+          <a:chOff x="0" y="0"/>
+          <a:chExt cx="0" cy="0"/>
+        </a:xfrm>
+      </p:grpSpPr>
+      <p:sp>
+        <p:nvSpPr>
+          <p:cNvPr id="2" name="Title 1"/>
+          <p:cNvSpPr>
+            <a:spLocks noGrp="1"/>
+          </p:cNvSpPr>
+          <p:nvPr>
+            <p:ph type="title"/>
+          </p:nvPr>
+        </p:nvSpPr>
+        <p:spPr/>
+        <p:txBody>
+          <a:bodyPr/>
+          <a:lstStyle/>
+          <a:p>
+            <a:r>
+              <a:rPr lang="en-GB" dirty="0" err="1"/>
+              <a:t>Userguide</a:t>
+            </a:r>
+            <a:endParaRPr lang="en-US" dirty="0"/>
+          </a:p>
+        </p:txBody>
+      </p:sp>
+      <p:sp>
+        <p:nvSpPr>
+          <p:cNvPr id="4" name="TextBox 3"/>
+          <p:cNvSpPr txBox="1"/>
+          <p:nvPr/>
+        </p:nvSpPr>
+        <p:spPr>
+          <a:xfrm>
+            <a:off x="10230678" y="658574"/>
+            <a:ext cx="954156" cy="369332"/>
+          </a:xfrm>
+          <a:prstGeom prst="rect">
+            <a:avLst/>
+          </a:prstGeom>
+          <a:noFill/>
+        </p:spPr>
+        <p:txBody>
+          <a:bodyPr wrap="square" rtlCol="0">
+            <a:spAutoFit/>
+          </a:bodyPr>
+          <a:lstStyle/>
+          <a:p>
+            <a:r>
+              <a:rPr lang="en-GB" dirty="0"/>
+              <a:t>Antonio</a:t>
+            </a:r>
+          </a:p>
+        </p:txBody>
+      </p:sp>
+      <p:pic>
+        <p:nvPicPr>
+          <p:cNvPr id="5" name="Content Placeholder 4"/>
+          <p:cNvPicPr>
+            <a:picLocks noGrp="1" noChangeAspect="1"/>
+          </p:cNvPicPr>
+          <p:nvPr>
+            <p:ph idx="1"/>
+          </p:nvPr>
+        </p:nvPicPr>
+        <p:blipFill>
+          <a:blip r:embed="rId2">
+            <a:extLst>
+              <a:ext uri="{28A0092B-C50C-407E-A947-70E740481C1C}">
+                <a14:useLocalDpi xmlns:a14="http://schemas.microsoft.com/office/drawing/2010/main" val="0"/>
+              </a:ext>
+            </a:extLst>
+          </a:blip>
+          <a:stretch>
+            <a:fillRect/>
+          </a:stretch>
+        </p:blipFill>
+        <p:spPr>
+          <a:xfrm>
+            <a:off x="2943225" y="2610644"/>
+            <a:ext cx="6305550" cy="2781300"/>
+          </a:xfrm>
+        </p:spPr>
+      </p:pic>
+    </p:spTree>
+    <p:extLst>
+      <p:ext uri="{BB962C8B-B14F-4D97-AF65-F5344CB8AC3E}">
+        <p14:creationId xmlns:p14="http://schemas.microsoft.com/office/powerpoint/2010/main" val="2173130571"/>
       </p:ext>
     </p:extLst>
   </p:cSld>
@@ -6855,6 +7236,877 @@
     <p:extLst>
       <p:ext uri="{BB962C8B-B14F-4D97-AF65-F5344CB8AC3E}">
         <p14:creationId xmlns:p14="http://schemas.microsoft.com/office/powerpoint/2010/main" val="44115641"/>
+      </p:ext>
+    </p:extLst>
+  </p:cSld>
+  <p:clrMapOvr>
+    <a:masterClrMapping/>
+  </p:clrMapOvr>
+</p:sld>
+</file>
+
+<file path=ppt/slides/slide40.xml><?xml version="1.0" encoding="utf-8"?>
+<p:sld xmlns:a="http://schemas.openxmlformats.org/drawingml/2006/main" xmlns:r="http://schemas.openxmlformats.org/officeDocument/2006/relationships" xmlns:p="http://schemas.openxmlformats.org/presentationml/2006/main">
+  <p:cSld>
+    <p:spTree>
+      <p:nvGrpSpPr>
+        <p:cNvPr id="1" name=""/>
+        <p:cNvGrpSpPr/>
+        <p:nvPr/>
+      </p:nvGrpSpPr>
+      <p:grpSpPr>
+        <a:xfrm>
+          <a:off x="0" y="0"/>
+          <a:ext cx="0" cy="0"/>
+          <a:chOff x="0" y="0"/>
+          <a:chExt cx="0" cy="0"/>
+        </a:xfrm>
+      </p:grpSpPr>
+      <p:sp>
+        <p:nvSpPr>
+          <p:cNvPr id="2" name="Title 1"/>
+          <p:cNvSpPr>
+            <a:spLocks noGrp="1"/>
+          </p:cNvSpPr>
+          <p:nvPr>
+            <p:ph type="title"/>
+          </p:nvPr>
+        </p:nvSpPr>
+        <p:spPr/>
+        <p:txBody>
+          <a:bodyPr/>
+          <a:lstStyle/>
+          <a:p>
+            <a:r>
+              <a:rPr lang="en-GB" dirty="0" err="1"/>
+              <a:t>Userguide</a:t>
+            </a:r>
+            <a:endParaRPr lang="en-US" dirty="0"/>
+          </a:p>
+        </p:txBody>
+      </p:sp>
+      <p:sp>
+        <p:nvSpPr>
+          <p:cNvPr id="4" name="TextBox 3"/>
+          <p:cNvSpPr txBox="1"/>
+          <p:nvPr/>
+        </p:nvSpPr>
+        <p:spPr>
+          <a:xfrm>
+            <a:off x="10230678" y="658574"/>
+            <a:ext cx="954156" cy="369332"/>
+          </a:xfrm>
+          <a:prstGeom prst="rect">
+            <a:avLst/>
+          </a:prstGeom>
+          <a:noFill/>
+        </p:spPr>
+        <p:txBody>
+          <a:bodyPr wrap="square" rtlCol="0">
+            <a:spAutoFit/>
+          </a:bodyPr>
+          <a:lstStyle/>
+          <a:p>
+            <a:r>
+              <a:rPr lang="en-GB" dirty="0"/>
+              <a:t>Antonio</a:t>
+            </a:r>
+          </a:p>
+        </p:txBody>
+      </p:sp>
+      <p:pic>
+        <p:nvPicPr>
+          <p:cNvPr id="6" name="Content Placeholder 5"/>
+          <p:cNvPicPr>
+            <a:picLocks noGrp="1" noChangeAspect="1"/>
+          </p:cNvPicPr>
+          <p:nvPr>
+            <p:ph idx="1"/>
+          </p:nvPr>
+        </p:nvPicPr>
+        <p:blipFill>
+          <a:blip r:embed="rId2">
+            <a:extLst>
+              <a:ext uri="{28A0092B-C50C-407E-A947-70E740481C1C}">
+                <a14:useLocalDpi xmlns:a14="http://schemas.microsoft.com/office/drawing/2010/main" val="0"/>
+              </a:ext>
+            </a:extLst>
+          </a:blip>
+          <a:stretch>
+            <a:fillRect/>
+          </a:stretch>
+        </p:blipFill>
+        <p:spPr>
+          <a:xfrm>
+            <a:off x="2952750" y="2115344"/>
+            <a:ext cx="6286500" cy="3771900"/>
+          </a:xfrm>
+        </p:spPr>
+      </p:pic>
+    </p:spTree>
+    <p:extLst>
+      <p:ext uri="{BB962C8B-B14F-4D97-AF65-F5344CB8AC3E}">
+        <p14:creationId xmlns:p14="http://schemas.microsoft.com/office/powerpoint/2010/main" val="1488884663"/>
+      </p:ext>
+    </p:extLst>
+  </p:cSld>
+  <p:clrMapOvr>
+    <a:masterClrMapping/>
+  </p:clrMapOvr>
+</p:sld>
+</file>
+
+<file path=ppt/slides/slide41.xml><?xml version="1.0" encoding="utf-8"?>
+<p:sld xmlns:a="http://schemas.openxmlformats.org/drawingml/2006/main" xmlns:r="http://schemas.openxmlformats.org/officeDocument/2006/relationships" xmlns:p="http://schemas.openxmlformats.org/presentationml/2006/main">
+  <p:cSld>
+    <p:spTree>
+      <p:nvGrpSpPr>
+        <p:cNvPr id="1" name=""/>
+        <p:cNvGrpSpPr/>
+        <p:nvPr/>
+      </p:nvGrpSpPr>
+      <p:grpSpPr>
+        <a:xfrm>
+          <a:off x="0" y="0"/>
+          <a:ext cx="0" cy="0"/>
+          <a:chOff x="0" y="0"/>
+          <a:chExt cx="0" cy="0"/>
+        </a:xfrm>
+      </p:grpSpPr>
+      <p:sp>
+        <p:nvSpPr>
+          <p:cNvPr id="2" name="Title 1"/>
+          <p:cNvSpPr>
+            <a:spLocks noGrp="1"/>
+          </p:cNvSpPr>
+          <p:nvPr>
+            <p:ph type="title"/>
+          </p:nvPr>
+        </p:nvSpPr>
+        <p:spPr/>
+        <p:txBody>
+          <a:bodyPr/>
+          <a:lstStyle/>
+          <a:p>
+            <a:r>
+              <a:rPr lang="en-GB" dirty="0" err="1"/>
+              <a:t>Userguide</a:t>
+            </a:r>
+            <a:endParaRPr lang="en-US" dirty="0"/>
+          </a:p>
+        </p:txBody>
+      </p:sp>
+      <p:sp>
+        <p:nvSpPr>
+          <p:cNvPr id="4" name="TextBox 3"/>
+          <p:cNvSpPr txBox="1"/>
+          <p:nvPr/>
+        </p:nvSpPr>
+        <p:spPr>
+          <a:xfrm>
+            <a:off x="10230678" y="658574"/>
+            <a:ext cx="954156" cy="369332"/>
+          </a:xfrm>
+          <a:prstGeom prst="rect">
+            <a:avLst/>
+          </a:prstGeom>
+          <a:noFill/>
+        </p:spPr>
+        <p:txBody>
+          <a:bodyPr wrap="square" rtlCol="0">
+            <a:spAutoFit/>
+          </a:bodyPr>
+          <a:lstStyle/>
+          <a:p>
+            <a:r>
+              <a:rPr lang="en-GB" dirty="0"/>
+              <a:t>Antonio</a:t>
+            </a:r>
+          </a:p>
+        </p:txBody>
+      </p:sp>
+      <p:pic>
+        <p:nvPicPr>
+          <p:cNvPr id="5" name="Content Placeholder 4"/>
+          <p:cNvPicPr>
+            <a:picLocks noGrp="1" noChangeAspect="1"/>
+          </p:cNvPicPr>
+          <p:nvPr>
+            <p:ph idx="1"/>
+          </p:nvPr>
+        </p:nvPicPr>
+        <p:blipFill>
+          <a:blip r:embed="rId2">
+            <a:extLst>
+              <a:ext uri="{28A0092B-C50C-407E-A947-70E740481C1C}">
+                <a14:useLocalDpi xmlns:a14="http://schemas.microsoft.com/office/drawing/2010/main" val="0"/>
+              </a:ext>
+            </a:extLst>
+          </a:blip>
+          <a:stretch>
+            <a:fillRect/>
+          </a:stretch>
+        </p:blipFill>
+        <p:spPr>
+          <a:xfrm>
+            <a:off x="3076575" y="1977231"/>
+            <a:ext cx="6038850" cy="4048125"/>
+          </a:xfrm>
+          <a:prstGeom prst="rect">
+            <a:avLst/>
+          </a:prstGeom>
+          <a:ln>
+            <a:noFill/>
+          </a:ln>
+          <a:effectLst>
+            <a:outerShdw blurRad="292100" dist="139700" dir="2700000" algn="tl" rotWithShape="0">
+              <a:srgbClr val="333333">
+                <a:alpha val="65000"/>
+              </a:srgbClr>
+            </a:outerShdw>
+          </a:effectLst>
+        </p:spPr>
+      </p:pic>
+    </p:spTree>
+    <p:extLst>
+      <p:ext uri="{BB962C8B-B14F-4D97-AF65-F5344CB8AC3E}">
+        <p14:creationId xmlns:p14="http://schemas.microsoft.com/office/powerpoint/2010/main" val="1095538928"/>
+      </p:ext>
+    </p:extLst>
+  </p:cSld>
+  <p:clrMapOvr>
+    <a:masterClrMapping/>
+  </p:clrMapOvr>
+</p:sld>
+</file>
+
+<file path=ppt/slides/slide42.xml><?xml version="1.0" encoding="utf-8"?>
+<p:sld xmlns:a="http://schemas.openxmlformats.org/drawingml/2006/main" xmlns:r="http://schemas.openxmlformats.org/officeDocument/2006/relationships" xmlns:p="http://schemas.openxmlformats.org/presentationml/2006/main">
+  <p:cSld>
+    <p:spTree>
+      <p:nvGrpSpPr>
+        <p:cNvPr id="1" name=""/>
+        <p:cNvGrpSpPr/>
+        <p:nvPr/>
+      </p:nvGrpSpPr>
+      <p:grpSpPr>
+        <a:xfrm>
+          <a:off x="0" y="0"/>
+          <a:ext cx="0" cy="0"/>
+          <a:chOff x="0" y="0"/>
+          <a:chExt cx="0" cy="0"/>
+        </a:xfrm>
+      </p:grpSpPr>
+      <p:sp>
+        <p:nvSpPr>
+          <p:cNvPr id="2" name="Title 1"/>
+          <p:cNvSpPr>
+            <a:spLocks noGrp="1"/>
+          </p:cNvSpPr>
+          <p:nvPr>
+            <p:ph type="title"/>
+          </p:nvPr>
+        </p:nvSpPr>
+        <p:spPr/>
+        <p:txBody>
+          <a:bodyPr/>
+          <a:lstStyle/>
+          <a:p>
+            <a:r>
+              <a:rPr lang="en-GB" dirty="0" err="1"/>
+              <a:t>Userguide</a:t>
+            </a:r>
+            <a:endParaRPr lang="en-US" dirty="0"/>
+          </a:p>
+        </p:txBody>
+      </p:sp>
+      <p:sp>
+        <p:nvSpPr>
+          <p:cNvPr id="4" name="TextBox 3"/>
+          <p:cNvSpPr txBox="1"/>
+          <p:nvPr/>
+        </p:nvSpPr>
+        <p:spPr>
+          <a:xfrm>
+            <a:off x="10230678" y="658574"/>
+            <a:ext cx="954156" cy="369332"/>
+          </a:xfrm>
+          <a:prstGeom prst="rect">
+            <a:avLst/>
+          </a:prstGeom>
+          <a:noFill/>
+        </p:spPr>
+        <p:txBody>
+          <a:bodyPr wrap="square" rtlCol="0">
+            <a:spAutoFit/>
+          </a:bodyPr>
+          <a:lstStyle/>
+          <a:p>
+            <a:r>
+              <a:rPr lang="en-GB" dirty="0"/>
+              <a:t>Antonio</a:t>
+            </a:r>
+          </a:p>
+        </p:txBody>
+      </p:sp>
+      <p:pic>
+        <p:nvPicPr>
+          <p:cNvPr id="6" name="Content Placeholder 5"/>
+          <p:cNvPicPr>
+            <a:picLocks noGrp="1" noChangeAspect="1"/>
+          </p:cNvPicPr>
+          <p:nvPr>
+            <p:ph idx="1"/>
+          </p:nvPr>
+        </p:nvPicPr>
+        <p:blipFill>
+          <a:blip r:embed="rId2">
+            <a:extLst>
+              <a:ext uri="{28A0092B-C50C-407E-A947-70E740481C1C}">
+                <a14:useLocalDpi xmlns:a14="http://schemas.microsoft.com/office/drawing/2010/main" val="0"/>
+              </a:ext>
+            </a:extLst>
+          </a:blip>
+          <a:stretch>
+            <a:fillRect/>
+          </a:stretch>
+        </p:blipFill>
+        <p:spPr>
+          <a:xfrm>
+            <a:off x="4077808" y="1825625"/>
+            <a:ext cx="4036384" cy="4351338"/>
+          </a:xfrm>
+        </p:spPr>
+      </p:pic>
+    </p:spTree>
+    <p:extLst>
+      <p:ext uri="{BB962C8B-B14F-4D97-AF65-F5344CB8AC3E}">
+        <p14:creationId xmlns:p14="http://schemas.microsoft.com/office/powerpoint/2010/main" val="2043385618"/>
+      </p:ext>
+    </p:extLst>
+  </p:cSld>
+  <p:clrMapOvr>
+    <a:masterClrMapping/>
+  </p:clrMapOvr>
+</p:sld>
+</file>
+
+<file path=ppt/slides/slide43.xml><?xml version="1.0" encoding="utf-8"?>
+<p:sld xmlns:a="http://schemas.openxmlformats.org/drawingml/2006/main" xmlns:r="http://schemas.openxmlformats.org/officeDocument/2006/relationships" xmlns:p="http://schemas.openxmlformats.org/presentationml/2006/main">
+  <p:cSld>
+    <p:spTree>
+      <p:nvGrpSpPr>
+        <p:cNvPr id="1" name=""/>
+        <p:cNvGrpSpPr/>
+        <p:nvPr/>
+      </p:nvGrpSpPr>
+      <p:grpSpPr>
+        <a:xfrm>
+          <a:off x="0" y="0"/>
+          <a:ext cx="0" cy="0"/>
+          <a:chOff x="0" y="0"/>
+          <a:chExt cx="0" cy="0"/>
+        </a:xfrm>
+      </p:grpSpPr>
+      <p:sp>
+        <p:nvSpPr>
+          <p:cNvPr id="2" name="Title 1"/>
+          <p:cNvSpPr>
+            <a:spLocks noGrp="1"/>
+          </p:cNvSpPr>
+          <p:nvPr>
+            <p:ph type="title"/>
+          </p:nvPr>
+        </p:nvSpPr>
+        <p:spPr/>
+        <p:txBody>
+          <a:bodyPr/>
+          <a:lstStyle/>
+          <a:p>
+            <a:r>
+              <a:rPr lang="en-GB" dirty="0" err="1"/>
+              <a:t>Userguide</a:t>
+            </a:r>
+            <a:endParaRPr lang="en-US" dirty="0"/>
+          </a:p>
+        </p:txBody>
+      </p:sp>
+      <p:sp>
+        <p:nvSpPr>
+          <p:cNvPr id="4" name="TextBox 3"/>
+          <p:cNvSpPr txBox="1"/>
+          <p:nvPr/>
+        </p:nvSpPr>
+        <p:spPr>
+          <a:xfrm>
+            <a:off x="10230678" y="658574"/>
+            <a:ext cx="954156" cy="369332"/>
+          </a:xfrm>
+          <a:prstGeom prst="rect">
+            <a:avLst/>
+          </a:prstGeom>
+          <a:noFill/>
+        </p:spPr>
+        <p:txBody>
+          <a:bodyPr wrap="square" rtlCol="0">
+            <a:spAutoFit/>
+          </a:bodyPr>
+          <a:lstStyle/>
+          <a:p>
+            <a:r>
+              <a:rPr lang="en-GB" dirty="0"/>
+              <a:t>Antonio</a:t>
+            </a:r>
+          </a:p>
+        </p:txBody>
+      </p:sp>
+      <p:pic>
+        <p:nvPicPr>
+          <p:cNvPr id="5" name="Content Placeholder 4"/>
+          <p:cNvPicPr>
+            <a:picLocks noGrp="1" noChangeAspect="1"/>
+          </p:cNvPicPr>
+          <p:nvPr>
+            <p:ph idx="1"/>
+          </p:nvPr>
+        </p:nvPicPr>
+        <p:blipFill>
+          <a:blip r:embed="rId2">
+            <a:extLst>
+              <a:ext uri="{28A0092B-C50C-407E-A947-70E740481C1C}">
+                <a14:useLocalDpi xmlns:a14="http://schemas.microsoft.com/office/drawing/2010/main" val="0"/>
+              </a:ext>
+            </a:extLst>
+          </a:blip>
+          <a:stretch>
+            <a:fillRect/>
+          </a:stretch>
+        </p:blipFill>
+        <p:spPr>
+          <a:xfrm>
+            <a:off x="3829050" y="2443956"/>
+            <a:ext cx="4533900" cy="3114675"/>
+          </a:xfrm>
+        </p:spPr>
+      </p:pic>
+    </p:spTree>
+    <p:extLst>
+      <p:ext uri="{BB962C8B-B14F-4D97-AF65-F5344CB8AC3E}">
+        <p14:creationId xmlns:p14="http://schemas.microsoft.com/office/powerpoint/2010/main" val="3068213998"/>
+      </p:ext>
+    </p:extLst>
+  </p:cSld>
+  <p:clrMapOvr>
+    <a:masterClrMapping/>
+  </p:clrMapOvr>
+</p:sld>
+</file>
+
+<file path=ppt/slides/slide44.xml><?xml version="1.0" encoding="utf-8"?>
+<p:sld xmlns:a="http://schemas.openxmlformats.org/drawingml/2006/main" xmlns:r="http://schemas.openxmlformats.org/officeDocument/2006/relationships" xmlns:p="http://schemas.openxmlformats.org/presentationml/2006/main">
+  <p:cSld>
+    <p:spTree>
+      <p:nvGrpSpPr>
+        <p:cNvPr id="1" name=""/>
+        <p:cNvGrpSpPr/>
+        <p:nvPr/>
+      </p:nvGrpSpPr>
+      <p:grpSpPr>
+        <a:xfrm>
+          <a:off x="0" y="0"/>
+          <a:ext cx="0" cy="0"/>
+          <a:chOff x="0" y="0"/>
+          <a:chExt cx="0" cy="0"/>
+        </a:xfrm>
+      </p:grpSpPr>
+      <p:sp>
+        <p:nvSpPr>
+          <p:cNvPr id="2" name="Title 1"/>
+          <p:cNvSpPr>
+            <a:spLocks noGrp="1"/>
+          </p:cNvSpPr>
+          <p:nvPr>
+            <p:ph type="title"/>
+          </p:nvPr>
+        </p:nvSpPr>
+        <p:spPr/>
+        <p:txBody>
+          <a:bodyPr/>
+          <a:lstStyle/>
+          <a:p>
+            <a:r>
+              <a:rPr lang="en-GB" dirty="0" err="1"/>
+              <a:t>Userguide</a:t>
+            </a:r>
+            <a:endParaRPr lang="en-US" dirty="0"/>
+          </a:p>
+        </p:txBody>
+      </p:sp>
+      <p:sp>
+        <p:nvSpPr>
+          <p:cNvPr id="4" name="TextBox 3"/>
+          <p:cNvSpPr txBox="1"/>
+          <p:nvPr/>
+        </p:nvSpPr>
+        <p:spPr>
+          <a:xfrm>
+            <a:off x="10230678" y="658574"/>
+            <a:ext cx="954156" cy="369332"/>
+          </a:xfrm>
+          <a:prstGeom prst="rect">
+            <a:avLst/>
+          </a:prstGeom>
+          <a:noFill/>
+        </p:spPr>
+        <p:txBody>
+          <a:bodyPr wrap="square" rtlCol="0">
+            <a:spAutoFit/>
+          </a:bodyPr>
+          <a:lstStyle/>
+          <a:p>
+            <a:r>
+              <a:rPr lang="en-GB" dirty="0"/>
+              <a:t>Antonio</a:t>
+            </a:r>
+          </a:p>
+        </p:txBody>
+      </p:sp>
+      <p:pic>
+        <p:nvPicPr>
+          <p:cNvPr id="8" name="Content Placeholder 7"/>
+          <p:cNvPicPr>
+            <a:picLocks noGrp="1" noChangeAspect="1"/>
+          </p:cNvPicPr>
+          <p:nvPr>
+            <p:ph idx="1"/>
+          </p:nvPr>
+        </p:nvPicPr>
+        <p:blipFill>
+          <a:blip r:embed="rId2">
+            <a:extLst>
+              <a:ext uri="{28A0092B-C50C-407E-A947-70E740481C1C}">
+                <a14:useLocalDpi xmlns:a14="http://schemas.microsoft.com/office/drawing/2010/main" val="0"/>
+              </a:ext>
+            </a:extLst>
+          </a:blip>
+          <a:stretch>
+            <a:fillRect/>
+          </a:stretch>
+        </p:blipFill>
+        <p:spPr>
+          <a:xfrm>
+            <a:off x="3375382" y="1825625"/>
+            <a:ext cx="5441236" cy="4351338"/>
+          </a:xfrm>
+        </p:spPr>
+      </p:pic>
+    </p:spTree>
+    <p:extLst>
+      <p:ext uri="{BB962C8B-B14F-4D97-AF65-F5344CB8AC3E}">
+        <p14:creationId xmlns:p14="http://schemas.microsoft.com/office/powerpoint/2010/main" val="3824070766"/>
+      </p:ext>
+    </p:extLst>
+  </p:cSld>
+  <p:clrMapOvr>
+    <a:masterClrMapping/>
+  </p:clrMapOvr>
+</p:sld>
+</file>
+
+<file path=ppt/slides/slide45.xml><?xml version="1.0" encoding="utf-8"?>
+<p:sld xmlns:a="http://schemas.openxmlformats.org/drawingml/2006/main" xmlns:r="http://schemas.openxmlformats.org/officeDocument/2006/relationships" xmlns:p="http://schemas.openxmlformats.org/presentationml/2006/main">
+  <p:cSld>
+    <p:spTree>
+      <p:nvGrpSpPr>
+        <p:cNvPr id="1" name=""/>
+        <p:cNvGrpSpPr/>
+        <p:nvPr/>
+      </p:nvGrpSpPr>
+      <p:grpSpPr>
+        <a:xfrm>
+          <a:off x="0" y="0"/>
+          <a:ext cx="0" cy="0"/>
+          <a:chOff x="0" y="0"/>
+          <a:chExt cx="0" cy="0"/>
+        </a:xfrm>
+      </p:grpSpPr>
+      <p:sp>
+        <p:nvSpPr>
+          <p:cNvPr id="2" name="Title 1"/>
+          <p:cNvSpPr>
+            <a:spLocks noGrp="1"/>
+          </p:cNvSpPr>
+          <p:nvPr>
+            <p:ph type="title"/>
+          </p:nvPr>
+        </p:nvSpPr>
+        <p:spPr/>
+        <p:txBody>
+          <a:bodyPr/>
+          <a:lstStyle/>
+          <a:p>
+            <a:r>
+              <a:rPr lang="en-GB" dirty="0"/>
+              <a:t>Conclusion</a:t>
+            </a:r>
+            <a:endParaRPr lang="en-US" dirty="0"/>
+          </a:p>
+        </p:txBody>
+      </p:sp>
+      <p:sp>
+        <p:nvSpPr>
+          <p:cNvPr id="3" name="Content Placeholder 2"/>
+          <p:cNvSpPr>
+            <a:spLocks noGrp="1"/>
+          </p:cNvSpPr>
+          <p:nvPr>
+            <p:ph idx="1"/>
+          </p:nvPr>
+        </p:nvSpPr>
+        <p:spPr/>
+        <p:txBody>
+          <a:bodyPr/>
+          <a:lstStyle/>
+          <a:p>
+            <a:r>
+              <a:rPr lang="en-US" dirty="0"/>
+              <a:t>MCTV Limited will continue to grow as a company in future </a:t>
+            </a:r>
+          </a:p>
+          <a:p>
+            <a:r>
+              <a:rPr lang="en-US" dirty="0"/>
+              <a:t>It is aimed for the company to become more efficient as it moves to the cloud. </a:t>
+            </a:r>
+          </a:p>
+          <a:p>
+            <a:r>
+              <a:rPr lang="en-US" dirty="0"/>
+              <a:t>As cloud technology improves further into the future MCTV limited will follow and become a larger and better company. </a:t>
+            </a:r>
+          </a:p>
+          <a:p>
+            <a:pPr marL="0" indent="0">
+              <a:buNone/>
+            </a:pPr>
+            <a:endParaRPr lang="en-US" dirty="0"/>
+          </a:p>
+          <a:p>
+            <a:endParaRPr lang="en-US" dirty="0"/>
+          </a:p>
+        </p:txBody>
+      </p:sp>
+      <p:sp>
+        <p:nvSpPr>
+          <p:cNvPr id="4" name="TextBox 3"/>
+          <p:cNvSpPr txBox="1"/>
+          <p:nvPr/>
+        </p:nvSpPr>
+        <p:spPr>
+          <a:xfrm>
+            <a:off x="10217426" y="658574"/>
+            <a:ext cx="940904" cy="369332"/>
+          </a:xfrm>
+          <a:prstGeom prst="rect">
+            <a:avLst/>
+          </a:prstGeom>
+          <a:noFill/>
+        </p:spPr>
+        <p:txBody>
+          <a:bodyPr wrap="square" rtlCol="0">
+            <a:spAutoFit/>
+          </a:bodyPr>
+          <a:lstStyle/>
+          <a:p>
+            <a:r>
+              <a:rPr lang="en-GB" dirty="0"/>
+              <a:t>Antonio</a:t>
+            </a:r>
+          </a:p>
+        </p:txBody>
+      </p:sp>
+    </p:spTree>
+    <p:extLst>
+      <p:ext uri="{BB962C8B-B14F-4D97-AF65-F5344CB8AC3E}">
+        <p14:creationId xmlns:p14="http://schemas.microsoft.com/office/powerpoint/2010/main" val="2325120104"/>
+      </p:ext>
+    </p:extLst>
+  </p:cSld>
+  <p:clrMapOvr>
+    <a:masterClrMapping/>
+  </p:clrMapOvr>
+</p:sld>
+</file>
+
+<file path=ppt/slides/slide46.xml><?xml version="1.0" encoding="utf-8"?>
+<p:sld xmlns:a="http://schemas.openxmlformats.org/drawingml/2006/main" xmlns:r="http://schemas.openxmlformats.org/officeDocument/2006/relationships" xmlns:p="http://schemas.openxmlformats.org/presentationml/2006/main">
+  <p:cSld>
+    <p:spTree>
+      <p:nvGrpSpPr>
+        <p:cNvPr id="1" name=""/>
+        <p:cNvGrpSpPr/>
+        <p:nvPr/>
+      </p:nvGrpSpPr>
+      <p:grpSpPr>
+        <a:xfrm>
+          <a:off x="0" y="0"/>
+          <a:ext cx="0" cy="0"/>
+          <a:chOff x="0" y="0"/>
+          <a:chExt cx="0" cy="0"/>
+        </a:xfrm>
+      </p:grpSpPr>
+      <p:sp>
+        <p:nvSpPr>
+          <p:cNvPr id="2" name="Title 1"/>
+          <p:cNvSpPr>
+            <a:spLocks noGrp="1"/>
+          </p:cNvSpPr>
+          <p:nvPr>
+            <p:ph type="title"/>
+          </p:nvPr>
+        </p:nvSpPr>
+        <p:spPr/>
+        <p:txBody>
+          <a:bodyPr/>
+          <a:lstStyle/>
+          <a:p>
+            <a:r>
+              <a:rPr lang="en-GB"/>
+              <a:t>Questions?</a:t>
+            </a:r>
+            <a:endParaRPr lang="en-US" dirty="0"/>
+          </a:p>
+        </p:txBody>
+      </p:sp>
+      <p:sp>
+        <p:nvSpPr>
+          <p:cNvPr id="3" name="Content Placeholder 2"/>
+          <p:cNvSpPr>
+            <a:spLocks noGrp="1"/>
+          </p:cNvSpPr>
+          <p:nvPr>
+            <p:ph idx="1"/>
+          </p:nvPr>
+        </p:nvSpPr>
+        <p:spPr>
+          <a:xfrm>
+            <a:off x="838200" y="1825625"/>
+            <a:ext cx="10515600" cy="4351338"/>
+          </a:xfrm>
+        </p:spPr>
+        <p:txBody>
+          <a:bodyPr/>
+          <a:lstStyle/>
+          <a:p>
+            <a:pPr algn="ctr"/>
+            <a:endParaRPr lang="en-US" dirty="0"/>
+          </a:p>
+          <a:p>
+            <a:pPr marL="0" indent="0" algn="ctr">
+              <a:buNone/>
+            </a:pPr>
+            <a:r>
+              <a:rPr lang="en-US" dirty="0"/>
+              <a:t>Thank you for listening </a:t>
+            </a:r>
+          </a:p>
+          <a:p>
+            <a:pPr marL="0" indent="0" algn="ctr">
+              <a:buNone/>
+            </a:pPr>
+            <a:r>
+              <a:rPr lang="en-US" dirty="0"/>
+              <a:t>Any Questions?</a:t>
+            </a:r>
+          </a:p>
+          <a:p>
+            <a:pPr marL="0" indent="0" algn="ctr">
+              <a:buNone/>
+            </a:pPr>
+            <a:endParaRPr lang="en-US" dirty="0"/>
+          </a:p>
+          <a:p>
+            <a:pPr marL="0" indent="0" algn="ctr">
+              <a:buNone/>
+            </a:pPr>
+            <a:endParaRPr lang="en-US" dirty="0"/>
+          </a:p>
+        </p:txBody>
+      </p:sp>
+      <p:pic>
+        <p:nvPicPr>
+          <p:cNvPr id="1026" name="Picture 2" descr="Image result for questions mark images"/>
+          <p:cNvPicPr>
+            <a:picLocks noChangeAspect="1" noChangeArrowheads="1"/>
+          </p:cNvPicPr>
+          <p:nvPr/>
+        </p:nvPicPr>
+        <p:blipFill>
+          <a:blip r:embed="rId2">
+            <a:extLst>
+              <a:ext uri="{28A0092B-C50C-407E-A947-70E740481C1C}">
+                <a14:useLocalDpi xmlns:a14="http://schemas.microsoft.com/office/drawing/2010/main" val="0"/>
+              </a:ext>
+            </a:extLst>
+          </a:blip>
+          <a:srcRect/>
+          <a:stretch>
+            <a:fillRect/>
+          </a:stretch>
+        </p:blipFill>
+        <p:spPr bwMode="auto">
+          <a:xfrm>
+            <a:off x="5028993" y="3642071"/>
+            <a:ext cx="1895475" cy="2409825"/>
+          </a:xfrm>
+          <a:prstGeom prst="rect">
+            <a:avLst/>
+          </a:prstGeom>
+          <a:noFill/>
+          <a:extLst>
+            <a:ext uri="{909E8E84-426E-40DD-AFC4-6F175D3DCCD1}">
+              <a14:hiddenFill xmlns:a14="http://schemas.microsoft.com/office/drawing/2010/main">
+                <a:solidFill>
+                  <a:srgbClr val="FFFFFF"/>
+                </a:solidFill>
+              </a14:hiddenFill>
+            </a:ext>
+          </a:extLst>
+        </p:spPr>
+      </p:pic>
+      <p:sp>
+        <p:nvSpPr>
+          <p:cNvPr id="5" name="TextBox 4"/>
+          <p:cNvSpPr txBox="1"/>
+          <p:nvPr/>
+        </p:nvSpPr>
+        <p:spPr>
+          <a:xfrm>
+            <a:off x="10204173" y="658574"/>
+            <a:ext cx="1149626" cy="369332"/>
+          </a:xfrm>
+          <a:prstGeom prst="rect">
+            <a:avLst/>
+          </a:prstGeom>
+          <a:noFill/>
+        </p:spPr>
+        <p:txBody>
+          <a:bodyPr wrap="square" rtlCol="0">
+            <a:spAutoFit/>
+          </a:bodyPr>
+          <a:lstStyle/>
+          <a:p>
+            <a:r>
+              <a:rPr lang="en-GB" dirty="0"/>
+              <a:t>Everyone</a:t>
+            </a:r>
+          </a:p>
+        </p:txBody>
+      </p:sp>
+    </p:spTree>
+    <p:extLst>
+      <p:ext uri="{BB962C8B-B14F-4D97-AF65-F5344CB8AC3E}">
+        <p14:creationId xmlns:p14="http://schemas.microsoft.com/office/powerpoint/2010/main" val="3349935074"/>
       </p:ext>
     </p:extLst>
   </p:cSld>

</xml_diff>